<commit_message>
[FHIR-53085](https://jira.hl7.org/browse/FHIR-53085): Removed CDSHooks related profiles
</commit_message>
<xml_diff>
--- a/images/source/clinicalreasoning-module-resources.pptx
+++ b/images/source/clinicalreasoning-module-resources.pptx
@@ -14,11 +14,12 @@
     <p:sldId id="264" r:id="rId8"/>
     <p:sldId id="4834" r:id="rId9"/>
     <p:sldId id="263" r:id="rId10"/>
-    <p:sldId id="265" r:id="rId11"/>
-    <p:sldId id="267" r:id="rId12"/>
-    <p:sldId id="266" r:id="rId13"/>
-    <p:sldId id="268" r:id="rId14"/>
-    <p:sldId id="269" r:id="rId15"/>
+    <p:sldId id="983" r:id="rId11"/>
+    <p:sldId id="265" r:id="rId12"/>
+    <p:sldId id="267" r:id="rId13"/>
+    <p:sldId id="266" r:id="rId14"/>
+    <p:sldId id="268" r:id="rId15"/>
+    <p:sldId id="269" r:id="rId16"/>
   </p:sldIdLst>
   <p:sldSz cx="12192000" cy="6858000"/>
   <p:notesSz cx="6858000" cy="9144000"/>
@@ -4406,6 +4407,1054 @@
 </file>
 
 <file path=ppt/slides/slide10.xml><?xml version="1.0" encoding="utf-8"?>
+<p:sld xmlns:a="http://schemas.openxmlformats.org/drawingml/2006/main" xmlns:r="http://schemas.openxmlformats.org/officeDocument/2006/relationships" xmlns:p="http://schemas.openxmlformats.org/presentationml/2006/main">
+  <p:cSld>
+    <p:spTree>
+      <p:nvGrpSpPr>
+        <p:cNvPr id="1" name=""/>
+        <p:cNvGrpSpPr/>
+        <p:nvPr/>
+      </p:nvGrpSpPr>
+      <p:grpSpPr>
+        <a:xfrm>
+          <a:off x="0" y="0"/>
+          <a:ext cx="0" cy="0"/>
+          <a:chOff x="0" y="0"/>
+          <a:chExt cx="0" cy="0"/>
+        </a:xfrm>
+      </p:grpSpPr>
+      <p:sp>
+        <p:nvSpPr>
+          <p:cNvPr id="2" name="Title 1">
+            <a:extLst>
+              <a:ext uri="{FF2B5EF4-FFF2-40B4-BE49-F238E27FC236}">
+                <a16:creationId xmlns:a16="http://schemas.microsoft.com/office/drawing/2014/main" id="{295DA97A-2CE9-467C-A8FC-84004D3E557D}"/>
+              </a:ext>
+            </a:extLst>
+          </p:cNvPr>
+          <p:cNvSpPr>
+            <a:spLocks noGrp="1"/>
+          </p:cNvSpPr>
+          <p:nvPr>
+            <p:ph type="title"/>
+          </p:nvPr>
+        </p:nvSpPr>
+        <p:spPr/>
+        <p:txBody>
+          <a:bodyPr/>
+          <a:lstStyle/>
+          <a:p>
+            <a:r>
+              <a:rPr lang="en-US" dirty="0"/>
+              <a:t>Service Integration</a:t>
+            </a:r>
+          </a:p>
+        </p:txBody>
+      </p:sp>
+      <p:sp>
+        <p:nvSpPr>
+          <p:cNvPr id="4" name="Rectangle: Rounded Corners 3">
+            <a:extLst>
+              <a:ext uri="{FF2B5EF4-FFF2-40B4-BE49-F238E27FC236}">
+                <a16:creationId xmlns:a16="http://schemas.microsoft.com/office/drawing/2014/main" id="{780D6ABF-953A-42F3-BC5B-0C003EBABAB0}"/>
+              </a:ext>
+            </a:extLst>
+          </p:cNvPr>
+          <p:cNvSpPr/>
+          <p:nvPr/>
+        </p:nvSpPr>
+        <p:spPr>
+          <a:xfrm>
+            <a:off x="1156687" y="3477654"/>
+            <a:ext cx="1828801" cy="1184607"/>
+          </a:xfrm>
+          <a:prstGeom prst="roundRect">
+            <a:avLst/>
+          </a:prstGeom>
+          <a:noFill/>
+        </p:spPr>
+        <p:style>
+          <a:lnRef idx="2">
+            <a:schemeClr val="accent1">
+              <a:shade val="50000"/>
+            </a:schemeClr>
+          </a:lnRef>
+          <a:fillRef idx="1">
+            <a:schemeClr val="accent1"/>
+          </a:fillRef>
+          <a:effectRef idx="0">
+            <a:schemeClr val="accent1"/>
+          </a:effectRef>
+          <a:fontRef idx="minor">
+            <a:schemeClr val="lt1"/>
+          </a:fontRef>
+        </p:style>
+        <p:txBody>
+          <a:bodyPr rtlCol="0" anchor="ctr"/>
+          <a:lstStyle/>
+          <a:p>
+            <a:pPr algn="ctr"/>
+            <a:r>
+              <a:rPr lang="en-US" b="1" dirty="0">
+                <a:solidFill>
+                  <a:schemeClr val="tx1"/>
+                </a:solidFill>
+              </a:rPr>
+              <a:t>EHR</a:t>
+            </a:r>
+          </a:p>
+          <a:p>
+            <a:pPr algn="ctr"/>
+            <a:r>
+              <a:rPr lang="en-US" b="1" dirty="0">
+                <a:solidFill>
+                  <a:schemeClr val="tx1"/>
+                </a:solidFill>
+              </a:rPr>
+              <a:t>order-select</a:t>
+            </a:r>
+          </a:p>
+        </p:txBody>
+      </p:sp>
+      <p:sp>
+        <p:nvSpPr>
+          <p:cNvPr id="8" name="Flowchart: Multidocument 7">
+            <a:extLst>
+              <a:ext uri="{FF2B5EF4-FFF2-40B4-BE49-F238E27FC236}">
+                <a16:creationId xmlns:a16="http://schemas.microsoft.com/office/drawing/2014/main" id="{EEE428C6-DB47-4CA9-A801-8C595DE9B07D}"/>
+              </a:ext>
+            </a:extLst>
+          </p:cNvPr>
+          <p:cNvSpPr/>
+          <p:nvPr/>
+        </p:nvSpPr>
+        <p:spPr>
+          <a:xfrm>
+            <a:off x="3471864" y="2704545"/>
+            <a:ext cx="585787" cy="657225"/>
+          </a:xfrm>
+          <a:prstGeom prst="flowChartMultidocument">
+            <a:avLst/>
+          </a:prstGeom>
+          <a:noFill/>
+        </p:spPr>
+        <p:style>
+          <a:lnRef idx="2">
+            <a:schemeClr val="accent1">
+              <a:shade val="50000"/>
+            </a:schemeClr>
+          </a:lnRef>
+          <a:fillRef idx="1">
+            <a:schemeClr val="accent1"/>
+          </a:fillRef>
+          <a:effectRef idx="0">
+            <a:schemeClr val="accent1"/>
+          </a:effectRef>
+          <a:fontRef idx="minor">
+            <a:schemeClr val="lt1"/>
+          </a:fontRef>
+        </p:style>
+        <p:txBody>
+          <a:bodyPr rtlCol="0" anchor="ctr"/>
+          <a:lstStyle/>
+          <a:p>
+            <a:pPr algn="ctr"/>
+            <a:endParaRPr lang="en-US" b="1"/>
+          </a:p>
+        </p:txBody>
+      </p:sp>
+      <p:sp>
+        <p:nvSpPr>
+          <p:cNvPr id="9" name="Arrow: Right 8">
+            <a:extLst>
+              <a:ext uri="{FF2B5EF4-FFF2-40B4-BE49-F238E27FC236}">
+                <a16:creationId xmlns:a16="http://schemas.microsoft.com/office/drawing/2014/main" id="{55D37141-C1B0-4F4A-9399-789CE5B21E57}"/>
+              </a:ext>
+            </a:extLst>
+          </p:cNvPr>
+          <p:cNvSpPr/>
+          <p:nvPr/>
+        </p:nvSpPr>
+        <p:spPr>
+          <a:xfrm>
+            <a:off x="3278981" y="3494894"/>
+            <a:ext cx="1107282" cy="277812"/>
+          </a:xfrm>
+          <a:prstGeom prst="rightArrow">
+            <a:avLst/>
+          </a:prstGeom>
+          <a:noFill/>
+        </p:spPr>
+        <p:style>
+          <a:lnRef idx="2">
+            <a:schemeClr val="accent1">
+              <a:shade val="50000"/>
+            </a:schemeClr>
+          </a:lnRef>
+          <a:fillRef idx="1">
+            <a:schemeClr val="accent1"/>
+          </a:fillRef>
+          <a:effectRef idx="0">
+            <a:schemeClr val="accent1"/>
+          </a:effectRef>
+          <a:fontRef idx="minor">
+            <a:schemeClr val="lt1"/>
+          </a:fontRef>
+        </p:style>
+        <p:txBody>
+          <a:bodyPr rtlCol="0" anchor="ctr"/>
+          <a:lstStyle/>
+          <a:p>
+            <a:pPr algn="ctr"/>
+            <a:endParaRPr lang="en-US" b="1"/>
+          </a:p>
+        </p:txBody>
+      </p:sp>
+      <p:sp>
+        <p:nvSpPr>
+          <p:cNvPr id="10" name="Rectangle: Rounded Corners 9">
+            <a:extLst>
+              <a:ext uri="{FF2B5EF4-FFF2-40B4-BE49-F238E27FC236}">
+                <a16:creationId xmlns:a16="http://schemas.microsoft.com/office/drawing/2014/main" id="{BFFBAE0A-ABE2-4996-8B6D-4E412A1004C7}"/>
+              </a:ext>
+            </a:extLst>
+          </p:cNvPr>
+          <p:cNvSpPr/>
+          <p:nvPr/>
+        </p:nvSpPr>
+        <p:spPr>
+          <a:xfrm>
+            <a:off x="5286376" y="1919288"/>
+            <a:ext cx="5710237" cy="4281487"/>
+          </a:xfrm>
+          <a:prstGeom prst="roundRect">
+            <a:avLst>
+              <a:gd name="adj" fmla="val 7657"/>
+            </a:avLst>
+          </a:prstGeom>
+          <a:noFill/>
+        </p:spPr>
+        <p:style>
+          <a:lnRef idx="2">
+            <a:schemeClr val="accent1">
+              <a:shade val="50000"/>
+            </a:schemeClr>
+          </a:lnRef>
+          <a:fillRef idx="1">
+            <a:schemeClr val="accent1"/>
+          </a:fillRef>
+          <a:effectRef idx="0">
+            <a:schemeClr val="accent1"/>
+          </a:effectRef>
+          <a:fontRef idx="minor">
+            <a:schemeClr val="lt1"/>
+          </a:fontRef>
+        </p:style>
+        <p:txBody>
+          <a:bodyPr rtlCol="0" anchor="ctr"/>
+          <a:lstStyle/>
+          <a:p>
+            <a:pPr algn="ctr"/>
+            <a:endParaRPr lang="en-US" b="1"/>
+          </a:p>
+        </p:txBody>
+      </p:sp>
+      <p:sp>
+        <p:nvSpPr>
+          <p:cNvPr id="11" name="TextBox 10">
+            <a:extLst>
+              <a:ext uri="{FF2B5EF4-FFF2-40B4-BE49-F238E27FC236}">
+                <a16:creationId xmlns:a16="http://schemas.microsoft.com/office/drawing/2014/main" id="{0AEB6207-95EA-4D8D-A9AD-B96F228EE367}"/>
+              </a:ext>
+            </a:extLst>
+          </p:cNvPr>
+          <p:cNvSpPr txBox="1"/>
+          <p:nvPr/>
+        </p:nvSpPr>
+        <p:spPr>
+          <a:xfrm>
+            <a:off x="6429376" y="1471613"/>
+            <a:ext cx="3491661" cy="369332"/>
+          </a:xfrm>
+          <a:prstGeom prst="rect">
+            <a:avLst/>
+          </a:prstGeom>
+          <a:noFill/>
+        </p:spPr>
+        <p:txBody>
+          <a:bodyPr wrap="none" rtlCol="0">
+            <a:spAutoFit/>
+          </a:bodyPr>
+          <a:lstStyle/>
+          <a:p>
+            <a:r>
+              <a:rPr lang="en-US" b="1" dirty="0"/>
+              <a:t>Clinical Reasoning Implementation</a:t>
+            </a:r>
+          </a:p>
+        </p:txBody>
+      </p:sp>
+      <p:sp>
+        <p:nvSpPr>
+          <p:cNvPr id="13" name="Flowchart: Document 12">
+            <a:extLst>
+              <a:ext uri="{FF2B5EF4-FFF2-40B4-BE49-F238E27FC236}">
+                <a16:creationId xmlns:a16="http://schemas.microsoft.com/office/drawing/2014/main" id="{81B0C00D-E673-4FA1-ABBD-CF882E7D0D7E}"/>
+              </a:ext>
+            </a:extLst>
+          </p:cNvPr>
+          <p:cNvSpPr/>
+          <p:nvPr/>
+        </p:nvSpPr>
+        <p:spPr>
+          <a:xfrm>
+            <a:off x="6697872" y="2791783"/>
+            <a:ext cx="528638" cy="628650"/>
+          </a:xfrm>
+          <a:prstGeom prst="flowChartDocument">
+            <a:avLst/>
+          </a:prstGeom>
+          <a:noFill/>
+        </p:spPr>
+        <p:style>
+          <a:lnRef idx="2">
+            <a:schemeClr val="accent1">
+              <a:shade val="50000"/>
+            </a:schemeClr>
+          </a:lnRef>
+          <a:fillRef idx="1">
+            <a:schemeClr val="accent1"/>
+          </a:fillRef>
+          <a:effectRef idx="0">
+            <a:schemeClr val="accent1"/>
+          </a:effectRef>
+          <a:fontRef idx="minor">
+            <a:schemeClr val="lt1"/>
+          </a:fontRef>
+        </p:style>
+        <p:txBody>
+          <a:bodyPr rtlCol="0" anchor="ctr"/>
+          <a:lstStyle/>
+          <a:p>
+            <a:pPr algn="ctr"/>
+            <a:endParaRPr lang="en-US" b="1"/>
+          </a:p>
+        </p:txBody>
+      </p:sp>
+      <p:sp>
+        <p:nvSpPr>
+          <p:cNvPr id="14" name="TextBox 13">
+            <a:extLst>
+              <a:ext uri="{FF2B5EF4-FFF2-40B4-BE49-F238E27FC236}">
+                <a16:creationId xmlns:a16="http://schemas.microsoft.com/office/drawing/2014/main" id="{C3427117-F85D-401A-81AF-2339E6B5C595}"/>
+              </a:ext>
+            </a:extLst>
+          </p:cNvPr>
+          <p:cNvSpPr txBox="1"/>
+          <p:nvPr/>
+        </p:nvSpPr>
+        <p:spPr>
+          <a:xfrm>
+            <a:off x="6271628" y="2422451"/>
+            <a:ext cx="1553567" cy="369332"/>
+          </a:xfrm>
+          <a:prstGeom prst="rect">
+            <a:avLst/>
+          </a:prstGeom>
+          <a:noFill/>
+        </p:spPr>
+        <p:txBody>
+          <a:bodyPr wrap="none" rtlCol="0">
+            <a:spAutoFit/>
+          </a:bodyPr>
+          <a:lstStyle/>
+          <a:p>
+            <a:r>
+              <a:rPr lang="en-US" b="1" dirty="0" err="1"/>
+              <a:t>PlanDefinition</a:t>
+            </a:r>
+            <a:endParaRPr lang="en-US" b="1" dirty="0"/>
+          </a:p>
+        </p:txBody>
+      </p:sp>
+      <p:sp>
+        <p:nvSpPr>
+          <p:cNvPr id="15" name="Flowchart: Document 14">
+            <a:extLst>
+              <a:ext uri="{FF2B5EF4-FFF2-40B4-BE49-F238E27FC236}">
+                <a16:creationId xmlns:a16="http://schemas.microsoft.com/office/drawing/2014/main" id="{3EE19766-AA0B-4EA6-A031-4A62671F2502}"/>
+              </a:ext>
+            </a:extLst>
+          </p:cNvPr>
+          <p:cNvSpPr/>
+          <p:nvPr/>
+        </p:nvSpPr>
+        <p:spPr>
+          <a:xfrm>
+            <a:off x="8648178" y="2602132"/>
+            <a:ext cx="528638" cy="628650"/>
+          </a:xfrm>
+          <a:prstGeom prst="flowChartDocument">
+            <a:avLst/>
+          </a:prstGeom>
+          <a:noFill/>
+        </p:spPr>
+        <p:style>
+          <a:lnRef idx="2">
+            <a:schemeClr val="accent1">
+              <a:shade val="50000"/>
+            </a:schemeClr>
+          </a:lnRef>
+          <a:fillRef idx="1">
+            <a:schemeClr val="accent1"/>
+          </a:fillRef>
+          <a:effectRef idx="0">
+            <a:schemeClr val="accent1"/>
+          </a:effectRef>
+          <a:fontRef idx="minor">
+            <a:schemeClr val="lt1"/>
+          </a:fontRef>
+        </p:style>
+        <p:txBody>
+          <a:bodyPr rtlCol="0" anchor="ctr"/>
+          <a:lstStyle/>
+          <a:p>
+            <a:pPr algn="ctr"/>
+            <a:endParaRPr lang="en-US" b="1"/>
+          </a:p>
+        </p:txBody>
+      </p:sp>
+      <p:sp>
+        <p:nvSpPr>
+          <p:cNvPr id="16" name="Flowchart: Document 15">
+            <a:extLst>
+              <a:ext uri="{FF2B5EF4-FFF2-40B4-BE49-F238E27FC236}">
+                <a16:creationId xmlns:a16="http://schemas.microsoft.com/office/drawing/2014/main" id="{398B25E8-8B24-4BCA-B0D9-CDBC5BB739C6}"/>
+              </a:ext>
+            </a:extLst>
+          </p:cNvPr>
+          <p:cNvSpPr/>
+          <p:nvPr/>
+        </p:nvSpPr>
+        <p:spPr>
+          <a:xfrm>
+            <a:off x="8730331" y="2679402"/>
+            <a:ext cx="528638" cy="628650"/>
+          </a:xfrm>
+          <a:prstGeom prst="flowChartDocument">
+            <a:avLst/>
+          </a:prstGeom>
+          <a:solidFill>
+            <a:schemeClr val="bg1"/>
+          </a:solidFill>
+        </p:spPr>
+        <p:style>
+          <a:lnRef idx="2">
+            <a:schemeClr val="accent1">
+              <a:shade val="50000"/>
+            </a:schemeClr>
+          </a:lnRef>
+          <a:fillRef idx="1">
+            <a:schemeClr val="accent1"/>
+          </a:fillRef>
+          <a:effectRef idx="0">
+            <a:schemeClr val="accent1"/>
+          </a:effectRef>
+          <a:fontRef idx="minor">
+            <a:schemeClr val="lt1"/>
+          </a:fontRef>
+        </p:style>
+        <p:txBody>
+          <a:bodyPr rtlCol="0" anchor="ctr"/>
+          <a:lstStyle/>
+          <a:p>
+            <a:pPr algn="ctr"/>
+            <a:endParaRPr lang="en-US" b="1"/>
+          </a:p>
+        </p:txBody>
+      </p:sp>
+      <p:sp>
+        <p:nvSpPr>
+          <p:cNvPr id="17" name="TextBox 16">
+            <a:extLst>
+              <a:ext uri="{FF2B5EF4-FFF2-40B4-BE49-F238E27FC236}">
+                <a16:creationId xmlns:a16="http://schemas.microsoft.com/office/drawing/2014/main" id="{354897F0-87A3-4F7D-8B78-DC6FE14435D4}"/>
+              </a:ext>
+            </a:extLst>
+          </p:cNvPr>
+          <p:cNvSpPr txBox="1"/>
+          <p:nvPr/>
+        </p:nvSpPr>
+        <p:spPr>
+          <a:xfrm>
+            <a:off x="8290162" y="2238137"/>
+            <a:ext cx="1426673" cy="369332"/>
+          </a:xfrm>
+          <a:prstGeom prst="rect">
+            <a:avLst/>
+          </a:prstGeom>
+          <a:noFill/>
+        </p:spPr>
+        <p:txBody>
+          <a:bodyPr wrap="none" rtlCol="0">
+            <a:spAutoFit/>
+          </a:bodyPr>
+          <a:lstStyle/>
+          <a:p>
+            <a:r>
+              <a:rPr lang="en-US" b="1" dirty="0"/>
+              <a:t>CQL Libraries</a:t>
+            </a:r>
+          </a:p>
+        </p:txBody>
+      </p:sp>
+      <p:sp>
+        <p:nvSpPr>
+          <p:cNvPr id="18" name="Rectangle: Rounded Corners 17">
+            <a:extLst>
+              <a:ext uri="{FF2B5EF4-FFF2-40B4-BE49-F238E27FC236}">
+                <a16:creationId xmlns:a16="http://schemas.microsoft.com/office/drawing/2014/main" id="{01F847C9-777F-4540-B9BA-65DD98353492}"/>
+              </a:ext>
+            </a:extLst>
+          </p:cNvPr>
+          <p:cNvSpPr/>
+          <p:nvPr/>
+        </p:nvSpPr>
+        <p:spPr>
+          <a:xfrm>
+            <a:off x="8226279" y="3622135"/>
+            <a:ext cx="1274287" cy="895643"/>
+          </a:xfrm>
+          <a:prstGeom prst="roundRect">
+            <a:avLst/>
+          </a:prstGeom>
+          <a:solidFill>
+            <a:schemeClr val="bg1"/>
+          </a:solidFill>
+        </p:spPr>
+        <p:style>
+          <a:lnRef idx="2">
+            <a:schemeClr val="accent1">
+              <a:shade val="50000"/>
+            </a:schemeClr>
+          </a:lnRef>
+          <a:fillRef idx="1">
+            <a:schemeClr val="accent1"/>
+          </a:fillRef>
+          <a:effectRef idx="0">
+            <a:schemeClr val="accent1"/>
+          </a:effectRef>
+          <a:fontRef idx="minor">
+            <a:schemeClr val="lt1"/>
+          </a:fontRef>
+        </p:style>
+        <p:txBody>
+          <a:bodyPr rtlCol="0" anchor="ctr"/>
+          <a:lstStyle/>
+          <a:p>
+            <a:pPr algn="ctr"/>
+            <a:r>
+              <a:rPr lang="en-US" b="1" dirty="0">
+                <a:solidFill>
+                  <a:schemeClr val="tx1"/>
+                </a:solidFill>
+              </a:rPr>
+              <a:t>$apply operation</a:t>
+            </a:r>
+          </a:p>
+        </p:txBody>
+      </p:sp>
+      <p:sp>
+        <p:nvSpPr>
+          <p:cNvPr id="20" name="Rectangle: Rounded Corners 19">
+            <a:extLst>
+              <a:ext uri="{FF2B5EF4-FFF2-40B4-BE49-F238E27FC236}">
+                <a16:creationId xmlns:a16="http://schemas.microsoft.com/office/drawing/2014/main" id="{AD6895A4-6465-4DD2-9599-5F7FFF6F1B0E}"/>
+              </a:ext>
+            </a:extLst>
+          </p:cNvPr>
+          <p:cNvSpPr/>
+          <p:nvPr/>
+        </p:nvSpPr>
+        <p:spPr>
+          <a:xfrm>
+            <a:off x="4479132" y="3871432"/>
+            <a:ext cx="1614488" cy="369332"/>
+          </a:xfrm>
+          <a:prstGeom prst="roundRect">
+            <a:avLst/>
+          </a:prstGeom>
+          <a:solidFill>
+            <a:schemeClr val="bg1"/>
+          </a:solidFill>
+        </p:spPr>
+        <p:style>
+          <a:lnRef idx="2">
+            <a:schemeClr val="accent1">
+              <a:shade val="50000"/>
+            </a:schemeClr>
+          </a:lnRef>
+          <a:fillRef idx="1">
+            <a:schemeClr val="accent1"/>
+          </a:fillRef>
+          <a:effectRef idx="0">
+            <a:schemeClr val="accent1"/>
+          </a:effectRef>
+          <a:fontRef idx="minor">
+            <a:schemeClr val="lt1"/>
+          </a:fontRef>
+        </p:style>
+        <p:txBody>
+          <a:bodyPr rtlCol="0" anchor="ctr"/>
+          <a:lstStyle/>
+          <a:p>
+            <a:pPr algn="ctr"/>
+            <a:r>
+              <a:rPr lang="en-US" b="1" dirty="0">
+                <a:solidFill>
+                  <a:schemeClr val="tx1"/>
+                </a:solidFill>
+              </a:rPr>
+              <a:t>CDS Hooks API</a:t>
+            </a:r>
+          </a:p>
+        </p:txBody>
+      </p:sp>
+      <p:sp>
+        <p:nvSpPr>
+          <p:cNvPr id="21" name="Arrow: Right 20">
+            <a:extLst>
+              <a:ext uri="{FF2B5EF4-FFF2-40B4-BE49-F238E27FC236}">
+                <a16:creationId xmlns:a16="http://schemas.microsoft.com/office/drawing/2014/main" id="{52AA8393-0F48-4EA0-90A4-645755181D52}"/>
+              </a:ext>
+            </a:extLst>
+          </p:cNvPr>
+          <p:cNvSpPr/>
+          <p:nvPr/>
+        </p:nvSpPr>
+        <p:spPr>
+          <a:xfrm rot="10800000">
+            <a:off x="3278981" y="4341896"/>
+            <a:ext cx="1107282" cy="277812"/>
+          </a:xfrm>
+          <a:prstGeom prst="rightArrow">
+            <a:avLst/>
+          </a:prstGeom>
+          <a:noFill/>
+        </p:spPr>
+        <p:style>
+          <a:lnRef idx="2">
+            <a:schemeClr val="accent1">
+              <a:shade val="50000"/>
+            </a:schemeClr>
+          </a:lnRef>
+          <a:fillRef idx="1">
+            <a:schemeClr val="accent1"/>
+          </a:fillRef>
+          <a:effectRef idx="0">
+            <a:schemeClr val="accent1"/>
+          </a:effectRef>
+          <a:fontRef idx="minor">
+            <a:schemeClr val="lt1"/>
+          </a:fontRef>
+        </p:style>
+        <p:txBody>
+          <a:bodyPr rtlCol="0" anchor="ctr"/>
+          <a:lstStyle/>
+          <a:p>
+            <a:pPr algn="ctr"/>
+            <a:endParaRPr lang="en-US" b="1"/>
+          </a:p>
+        </p:txBody>
+      </p:sp>
+      <p:sp>
+        <p:nvSpPr>
+          <p:cNvPr id="22" name="Flowchart: Document 21">
+            <a:extLst>
+              <a:ext uri="{FF2B5EF4-FFF2-40B4-BE49-F238E27FC236}">
+                <a16:creationId xmlns:a16="http://schemas.microsoft.com/office/drawing/2014/main" id="{DEFC4F3D-1A57-4CA3-AA34-4BECDEC7137E}"/>
+              </a:ext>
+            </a:extLst>
+          </p:cNvPr>
+          <p:cNvSpPr/>
+          <p:nvPr/>
+        </p:nvSpPr>
+        <p:spPr>
+          <a:xfrm>
+            <a:off x="3500438" y="4874573"/>
+            <a:ext cx="528638" cy="628650"/>
+          </a:xfrm>
+          <a:prstGeom prst="flowChartDocument">
+            <a:avLst/>
+          </a:prstGeom>
+          <a:noFill/>
+        </p:spPr>
+        <p:style>
+          <a:lnRef idx="2">
+            <a:schemeClr val="accent1">
+              <a:shade val="50000"/>
+            </a:schemeClr>
+          </a:lnRef>
+          <a:fillRef idx="1">
+            <a:schemeClr val="accent1"/>
+          </a:fillRef>
+          <a:effectRef idx="0">
+            <a:schemeClr val="accent1"/>
+          </a:effectRef>
+          <a:fontRef idx="minor">
+            <a:schemeClr val="lt1"/>
+          </a:fontRef>
+        </p:style>
+        <p:txBody>
+          <a:bodyPr rtlCol="0" anchor="ctr"/>
+          <a:lstStyle/>
+          <a:p>
+            <a:pPr algn="ctr"/>
+            <a:endParaRPr lang="en-US" b="1"/>
+          </a:p>
+        </p:txBody>
+      </p:sp>
+      <p:sp>
+        <p:nvSpPr>
+          <p:cNvPr id="23" name="TextBox 22">
+            <a:extLst>
+              <a:ext uri="{FF2B5EF4-FFF2-40B4-BE49-F238E27FC236}">
+                <a16:creationId xmlns:a16="http://schemas.microsoft.com/office/drawing/2014/main" id="{A03D4B95-7290-476F-8895-967741A93490}"/>
+              </a:ext>
+            </a:extLst>
+          </p:cNvPr>
+          <p:cNvSpPr txBox="1"/>
+          <p:nvPr/>
+        </p:nvSpPr>
+        <p:spPr>
+          <a:xfrm>
+            <a:off x="2992465" y="2063897"/>
+            <a:ext cx="1757530" cy="523220"/>
+          </a:xfrm>
+          <a:prstGeom prst="rect">
+            <a:avLst/>
+          </a:prstGeom>
+          <a:noFill/>
+        </p:spPr>
+        <p:txBody>
+          <a:bodyPr wrap="square" rtlCol="0">
+            <a:spAutoFit/>
+          </a:bodyPr>
+          <a:lstStyle/>
+          <a:p>
+            <a:r>
+              <a:rPr lang="en-US" sz="1400" b="1" dirty="0"/>
+              <a:t>CDS Hooks Request with Patient Data</a:t>
+            </a:r>
+          </a:p>
+        </p:txBody>
+      </p:sp>
+      <p:sp>
+        <p:nvSpPr>
+          <p:cNvPr id="24" name="TextBox 23">
+            <a:extLst>
+              <a:ext uri="{FF2B5EF4-FFF2-40B4-BE49-F238E27FC236}">
+                <a16:creationId xmlns:a16="http://schemas.microsoft.com/office/drawing/2014/main" id="{3F0100BD-640C-4B7A-BC17-0036100050CF}"/>
+              </a:ext>
+            </a:extLst>
+          </p:cNvPr>
+          <p:cNvSpPr txBox="1"/>
+          <p:nvPr/>
+        </p:nvSpPr>
+        <p:spPr>
+          <a:xfrm>
+            <a:off x="2885992" y="5649960"/>
+            <a:ext cx="1757530" cy="307777"/>
+          </a:xfrm>
+          <a:prstGeom prst="rect">
+            <a:avLst/>
+          </a:prstGeom>
+          <a:noFill/>
+        </p:spPr>
+        <p:txBody>
+          <a:bodyPr wrap="square" rtlCol="0">
+            <a:spAutoFit/>
+          </a:bodyPr>
+          <a:lstStyle/>
+          <a:p>
+            <a:r>
+              <a:rPr lang="en-US" sz="1400" b="1" dirty="0"/>
+              <a:t>CDS Hooks Response</a:t>
+            </a:r>
+          </a:p>
+        </p:txBody>
+      </p:sp>
+      <p:sp>
+        <p:nvSpPr>
+          <p:cNvPr id="25" name="Flowchart: Document 24">
+            <a:extLst>
+              <a:ext uri="{FF2B5EF4-FFF2-40B4-BE49-F238E27FC236}">
+                <a16:creationId xmlns:a16="http://schemas.microsoft.com/office/drawing/2014/main" id="{874EAF7C-C08A-4044-9888-FA4E514638E5}"/>
+              </a:ext>
+            </a:extLst>
+          </p:cNvPr>
+          <p:cNvSpPr/>
+          <p:nvPr/>
+        </p:nvSpPr>
+        <p:spPr>
+          <a:xfrm>
+            <a:off x="6697872" y="4725382"/>
+            <a:ext cx="528638" cy="628650"/>
+          </a:xfrm>
+          <a:prstGeom prst="flowChartDocument">
+            <a:avLst/>
+          </a:prstGeom>
+          <a:noFill/>
+        </p:spPr>
+        <p:style>
+          <a:lnRef idx="2">
+            <a:schemeClr val="accent1">
+              <a:shade val="50000"/>
+            </a:schemeClr>
+          </a:lnRef>
+          <a:fillRef idx="1">
+            <a:schemeClr val="accent1"/>
+          </a:fillRef>
+          <a:effectRef idx="0">
+            <a:schemeClr val="accent1"/>
+          </a:effectRef>
+          <a:fontRef idx="minor">
+            <a:schemeClr val="lt1"/>
+          </a:fontRef>
+        </p:style>
+        <p:txBody>
+          <a:bodyPr rtlCol="0" anchor="ctr"/>
+          <a:lstStyle/>
+          <a:p>
+            <a:pPr algn="ctr"/>
+            <a:endParaRPr lang="en-US" b="1"/>
+          </a:p>
+        </p:txBody>
+      </p:sp>
+      <p:sp>
+        <p:nvSpPr>
+          <p:cNvPr id="26" name="TextBox 25">
+            <a:extLst>
+              <a:ext uri="{FF2B5EF4-FFF2-40B4-BE49-F238E27FC236}">
+                <a16:creationId xmlns:a16="http://schemas.microsoft.com/office/drawing/2014/main" id="{965CE2A9-8456-4D13-95AF-FE8513A67127}"/>
+              </a:ext>
+            </a:extLst>
+          </p:cNvPr>
+          <p:cNvSpPr txBox="1"/>
+          <p:nvPr/>
+        </p:nvSpPr>
+        <p:spPr>
+          <a:xfrm>
+            <a:off x="6366681" y="5392131"/>
+            <a:ext cx="1326206" cy="523220"/>
+          </a:xfrm>
+          <a:prstGeom prst="rect">
+            <a:avLst/>
+          </a:prstGeom>
+          <a:noFill/>
+        </p:spPr>
+        <p:txBody>
+          <a:bodyPr wrap="square" rtlCol="0">
+            <a:spAutoFit/>
+          </a:bodyPr>
+          <a:lstStyle/>
+          <a:p>
+            <a:r>
+              <a:rPr lang="en-US" sz="1400" b="1" dirty="0" err="1"/>
+              <a:t>CarePlan</a:t>
+            </a:r>
+            <a:r>
+              <a:rPr lang="en-US" sz="1400" b="1" dirty="0"/>
+              <a:t> with </a:t>
+            </a:r>
+            <a:r>
+              <a:rPr lang="en-US" sz="1400" b="1" dirty="0" err="1"/>
+              <a:t>RequestGroup</a:t>
+            </a:r>
+            <a:endParaRPr lang="en-US" sz="1400" b="1" dirty="0"/>
+          </a:p>
+        </p:txBody>
+      </p:sp>
+      <p:sp>
+        <p:nvSpPr>
+          <p:cNvPr id="27" name="Arrow: Right 26">
+            <a:extLst>
+              <a:ext uri="{FF2B5EF4-FFF2-40B4-BE49-F238E27FC236}">
+                <a16:creationId xmlns:a16="http://schemas.microsoft.com/office/drawing/2014/main" id="{C8348890-E946-4090-8E26-89C2863C5066}"/>
+              </a:ext>
+            </a:extLst>
+          </p:cNvPr>
+          <p:cNvSpPr/>
+          <p:nvPr/>
+        </p:nvSpPr>
+        <p:spPr>
+          <a:xfrm>
+            <a:off x="6476143" y="3657600"/>
+            <a:ext cx="1107282" cy="277812"/>
+          </a:xfrm>
+          <a:prstGeom prst="rightArrow">
+            <a:avLst/>
+          </a:prstGeom>
+          <a:noFill/>
+        </p:spPr>
+        <p:style>
+          <a:lnRef idx="2">
+            <a:schemeClr val="accent1">
+              <a:shade val="50000"/>
+            </a:schemeClr>
+          </a:lnRef>
+          <a:fillRef idx="1">
+            <a:schemeClr val="accent1"/>
+          </a:fillRef>
+          <a:effectRef idx="0">
+            <a:schemeClr val="accent1"/>
+          </a:effectRef>
+          <a:fontRef idx="minor">
+            <a:schemeClr val="lt1"/>
+          </a:fontRef>
+        </p:style>
+        <p:txBody>
+          <a:bodyPr rtlCol="0" anchor="ctr"/>
+          <a:lstStyle/>
+          <a:p>
+            <a:pPr algn="ctr"/>
+            <a:endParaRPr lang="en-US" b="1"/>
+          </a:p>
+        </p:txBody>
+      </p:sp>
+      <p:sp>
+        <p:nvSpPr>
+          <p:cNvPr id="28" name="Arrow: Right 27">
+            <a:extLst>
+              <a:ext uri="{FF2B5EF4-FFF2-40B4-BE49-F238E27FC236}">
+                <a16:creationId xmlns:a16="http://schemas.microsoft.com/office/drawing/2014/main" id="{BB7696F5-47E1-45CB-A1DA-FA3C7217BCCD}"/>
+              </a:ext>
+            </a:extLst>
+          </p:cNvPr>
+          <p:cNvSpPr/>
+          <p:nvPr/>
+        </p:nvSpPr>
+        <p:spPr>
+          <a:xfrm rot="10800000">
+            <a:off x="6476143" y="4118342"/>
+            <a:ext cx="1107282" cy="277812"/>
+          </a:xfrm>
+          <a:prstGeom prst="rightArrow">
+            <a:avLst/>
+          </a:prstGeom>
+          <a:noFill/>
+        </p:spPr>
+        <p:style>
+          <a:lnRef idx="2">
+            <a:schemeClr val="accent1">
+              <a:shade val="50000"/>
+            </a:schemeClr>
+          </a:lnRef>
+          <a:fillRef idx="1">
+            <a:schemeClr val="accent1"/>
+          </a:fillRef>
+          <a:effectRef idx="0">
+            <a:schemeClr val="accent1"/>
+          </a:effectRef>
+          <a:fontRef idx="minor">
+            <a:schemeClr val="lt1"/>
+          </a:fontRef>
+        </p:style>
+        <p:txBody>
+          <a:bodyPr rtlCol="0" anchor="ctr"/>
+          <a:lstStyle/>
+          <a:p>
+            <a:pPr algn="ctr"/>
+            <a:endParaRPr lang="en-US" b="1"/>
+          </a:p>
+        </p:txBody>
+      </p:sp>
+      <p:pic>
+        <p:nvPicPr>
+          <p:cNvPr id="29" name="Picture 28">
+            <a:extLst>
+              <a:ext uri="{FF2B5EF4-FFF2-40B4-BE49-F238E27FC236}">
+                <a16:creationId xmlns:a16="http://schemas.microsoft.com/office/drawing/2014/main" id="{40B6B3DB-E20A-4F70-8BE5-7F337262BD72}"/>
+              </a:ext>
+            </a:extLst>
+          </p:cNvPr>
+          <p:cNvPicPr>
+            <a:picLocks noChangeAspect="1"/>
+          </p:cNvPicPr>
+          <p:nvPr/>
+        </p:nvPicPr>
+        <p:blipFill>
+          <a:blip r:embed="rId2" cstate="print">
+            <a:extLst>
+              <a:ext uri="{28A0092B-C50C-407E-A947-70E740481C1C}">
+                <a14:useLocalDpi xmlns:a14="http://schemas.microsoft.com/office/drawing/2010/main" val="0"/>
+              </a:ext>
+            </a:extLst>
+          </a:blip>
+          <a:stretch>
+            <a:fillRect/>
+          </a:stretch>
+        </p:blipFill>
+        <p:spPr>
+          <a:xfrm>
+            <a:off x="4261217" y="2638806"/>
+            <a:ext cx="628650" cy="628650"/>
+          </a:xfrm>
+          <a:prstGeom prst="rect">
+            <a:avLst/>
+          </a:prstGeom>
+        </p:spPr>
+      </p:pic>
+      <p:pic>
+        <p:nvPicPr>
+          <p:cNvPr id="5" name="Picture 4">
+            <a:extLst>
+              <a:ext uri="{FF2B5EF4-FFF2-40B4-BE49-F238E27FC236}">
+                <a16:creationId xmlns:a16="http://schemas.microsoft.com/office/drawing/2014/main" id="{EA3FF5EB-CD43-473E-824A-9303E1430D95}"/>
+              </a:ext>
+            </a:extLst>
+          </p:cNvPr>
+          <p:cNvPicPr>
+            <a:picLocks noChangeAspect="1"/>
+          </p:cNvPicPr>
+          <p:nvPr/>
+        </p:nvPicPr>
+        <p:blipFill>
+          <a:blip r:embed="rId3" cstate="print">
+            <a:extLst>
+              <a:ext uri="{28A0092B-C50C-407E-A947-70E740481C1C}">
+                <a14:useLocalDpi xmlns:a14="http://schemas.microsoft.com/office/drawing/2010/main" val="0"/>
+              </a:ext>
+            </a:extLst>
+          </a:blip>
+          <a:stretch>
+            <a:fillRect/>
+          </a:stretch>
+        </p:blipFill>
+        <p:spPr>
+          <a:xfrm>
+            <a:off x="4380590" y="4781896"/>
+            <a:ext cx="582680" cy="582680"/>
+          </a:xfrm>
+          <a:prstGeom prst="rect">
+            <a:avLst/>
+          </a:prstGeom>
+        </p:spPr>
+      </p:pic>
+    </p:spTree>
+    <p:extLst>
+      <p:ext uri="{BB962C8B-B14F-4D97-AF65-F5344CB8AC3E}">
+        <p14:creationId xmlns:p14="http://schemas.microsoft.com/office/powerpoint/2010/main" val="2804438943"/>
+      </p:ext>
+    </p:extLst>
+  </p:cSld>
+  <p:clrMapOvr>
+    <a:masterClrMapping/>
+  </p:clrMapOvr>
+</p:sld>
+</file>
+
+<file path=ppt/slides/slide11.xml><?xml version="1.0" encoding="utf-8"?>
 <p:sld xmlns:a="http://schemas.openxmlformats.org/drawingml/2006/main" xmlns:r="http://schemas.openxmlformats.org/officeDocument/2006/relationships" xmlns:p="http://schemas.openxmlformats.org/presentationml/2006/main">
   <p:cSld>
     <p:spTree>
@@ -8724,7 +9773,7 @@
 </p:sld>
 </file>
 
-<file path=ppt/slides/slide11.xml><?xml version="1.0" encoding="utf-8"?>
+<file path=ppt/slides/slide12.xml><?xml version="1.0" encoding="utf-8"?>
 <p:sld xmlns:a="http://schemas.openxmlformats.org/drawingml/2006/main" xmlns:r="http://schemas.openxmlformats.org/officeDocument/2006/relationships" xmlns:p="http://schemas.openxmlformats.org/presentationml/2006/main">
   <p:cSld>
     <p:spTree>
@@ -9033,7 +10082,7 @@
 </p:sld>
 </file>
 
-<file path=ppt/slides/slide12.xml><?xml version="1.0" encoding="utf-8"?>
+<file path=ppt/slides/slide13.xml><?xml version="1.0" encoding="utf-8"?>
 <p:sld xmlns:a="http://schemas.openxmlformats.org/drawingml/2006/main" xmlns:r="http://schemas.openxmlformats.org/officeDocument/2006/relationships" xmlns:p="http://schemas.openxmlformats.org/presentationml/2006/main">
   <p:cSld>
     <p:spTree>
@@ -10811,7 +11860,7 @@
 </p:sld>
 </file>
 
-<file path=ppt/slides/slide13.xml><?xml version="1.0" encoding="utf-8"?>
+<file path=ppt/slides/slide14.xml><?xml version="1.0" encoding="utf-8"?>
 <p:sld xmlns:a="http://schemas.openxmlformats.org/drawingml/2006/main" xmlns:r="http://schemas.openxmlformats.org/officeDocument/2006/relationships" xmlns:p="http://schemas.openxmlformats.org/presentationml/2006/main">
   <p:cSld>
     <p:spTree>
@@ -11119,7 +12168,7 @@
 </p:sld>
 </file>
 
-<file path=ppt/slides/slide14.xml><?xml version="1.0" encoding="utf-8"?>
+<file path=ppt/slides/slide15.xml><?xml version="1.0" encoding="utf-8"?>
 <p:sld xmlns:a="http://schemas.openxmlformats.org/drawingml/2006/main" xmlns:r="http://schemas.openxmlformats.org/officeDocument/2006/relationships" xmlns:p="http://schemas.openxmlformats.org/presentationml/2006/main">
   <p:cSld>
     <p:spTree>

</xml_diff>

<commit_message>
[FHIR-53078](https://jira.hl7.org/browse/FHIR-53078): Additional background documentation
</commit_message>
<xml_diff>
--- a/images/source/clinicalreasoning-module-resources.pptx
+++ b/images/source/clinicalreasoning-module-resources.pptx
@@ -4,6 +4,9 @@
   <p:sldMasterIdLst>
     <p:sldMasterId id="2147483648" r:id="rId1"/>
   </p:sldMasterIdLst>
+  <p:notesMasterIdLst>
+    <p:notesMasterId r:id="rId19"/>
+  </p:notesMasterIdLst>
   <p:sldIdLst>
     <p:sldId id="256" r:id="rId2"/>
     <p:sldId id="257" r:id="rId3"/>
@@ -20,6 +23,8 @@
     <p:sldId id="266" r:id="rId14"/>
     <p:sldId id="268" r:id="rId15"/>
     <p:sldId id="269" r:id="rId16"/>
+    <p:sldId id="4835" r:id="rId17"/>
+    <p:sldId id="4836" r:id="rId18"/>
   </p:sldIdLst>
   <p:sldSz cx="12192000" cy="6858000"/>
   <p:notesSz cx="6858000" cy="9144000"/>
@@ -126,6 +131,712 @@
 </p:presentation>
 </file>
 
+<file path=ppt/notesMasters/notesMaster1.xml><?xml version="1.0" encoding="utf-8"?>
+<p:notesMaster xmlns:a="http://schemas.openxmlformats.org/drawingml/2006/main" xmlns:r="http://schemas.openxmlformats.org/officeDocument/2006/relationships" xmlns:p="http://schemas.openxmlformats.org/presentationml/2006/main">
+  <p:cSld>
+    <p:bg>
+      <p:bgRef idx="1001">
+        <a:schemeClr val="bg1"/>
+      </p:bgRef>
+    </p:bg>
+    <p:spTree>
+      <p:nvGrpSpPr>
+        <p:cNvPr id="1" name=""/>
+        <p:cNvGrpSpPr/>
+        <p:nvPr/>
+      </p:nvGrpSpPr>
+      <p:grpSpPr>
+        <a:xfrm>
+          <a:off x="0" y="0"/>
+          <a:ext cx="0" cy="0"/>
+          <a:chOff x="0" y="0"/>
+          <a:chExt cx="0" cy="0"/>
+        </a:xfrm>
+      </p:grpSpPr>
+      <p:sp>
+        <p:nvSpPr>
+          <p:cNvPr id="2" name="Header Placeholder 1"/>
+          <p:cNvSpPr>
+            <a:spLocks noGrp="1"/>
+          </p:cNvSpPr>
+          <p:nvPr>
+            <p:ph type="hdr" sz="quarter"/>
+          </p:nvPr>
+        </p:nvSpPr>
+        <p:spPr>
+          <a:xfrm>
+            <a:off x="0" y="0"/>
+            <a:ext cx="2971800" cy="458788"/>
+          </a:xfrm>
+          <a:prstGeom prst="rect">
+            <a:avLst/>
+          </a:prstGeom>
+        </p:spPr>
+        <p:txBody>
+          <a:bodyPr vert="horz" lIns="91440" tIns="45720" rIns="91440" bIns="45720" rtlCol="0"/>
+          <a:lstStyle>
+            <a:lvl1pPr algn="l">
+              <a:defRPr sz="1200"/>
+            </a:lvl1pPr>
+          </a:lstStyle>
+          <a:p>
+            <a:endParaRPr lang="en-US"/>
+          </a:p>
+        </p:txBody>
+      </p:sp>
+      <p:sp>
+        <p:nvSpPr>
+          <p:cNvPr id="3" name="Date Placeholder 2"/>
+          <p:cNvSpPr>
+            <a:spLocks noGrp="1"/>
+          </p:cNvSpPr>
+          <p:nvPr>
+            <p:ph type="dt" idx="1"/>
+          </p:nvPr>
+        </p:nvSpPr>
+        <p:spPr>
+          <a:xfrm>
+            <a:off x="3884613" y="0"/>
+            <a:ext cx="2971800" cy="458788"/>
+          </a:xfrm>
+          <a:prstGeom prst="rect">
+            <a:avLst/>
+          </a:prstGeom>
+        </p:spPr>
+        <p:txBody>
+          <a:bodyPr vert="horz" lIns="91440" tIns="45720" rIns="91440" bIns="45720" rtlCol="0"/>
+          <a:lstStyle>
+            <a:lvl1pPr algn="r">
+              <a:defRPr sz="1200"/>
+            </a:lvl1pPr>
+          </a:lstStyle>
+          <a:p>
+            <a:fld id="{7F97AAB3-F70A-42AD-82D8-DC224F64065C}" type="datetimeFigureOut">
+              <a:rPr lang="en-US" smtClean="0"/>
+              <a:t>11/5/2025</a:t>
+            </a:fld>
+            <a:endParaRPr lang="en-US"/>
+          </a:p>
+        </p:txBody>
+      </p:sp>
+      <p:sp>
+        <p:nvSpPr>
+          <p:cNvPr id="4" name="Slide Image Placeholder 3"/>
+          <p:cNvSpPr>
+            <a:spLocks noGrp="1" noRot="1" noChangeAspect="1"/>
+          </p:cNvSpPr>
+          <p:nvPr>
+            <p:ph type="sldImg" idx="2"/>
+          </p:nvPr>
+        </p:nvSpPr>
+        <p:spPr>
+          <a:xfrm>
+            <a:off x="685800" y="1143000"/>
+            <a:ext cx="5486400" cy="3086100"/>
+          </a:xfrm>
+          <a:prstGeom prst="rect">
+            <a:avLst/>
+          </a:prstGeom>
+          <a:noFill/>
+          <a:ln w="12700">
+            <a:solidFill>
+              <a:prstClr val="black"/>
+            </a:solidFill>
+          </a:ln>
+        </p:spPr>
+        <p:txBody>
+          <a:bodyPr vert="horz" lIns="91440" tIns="45720" rIns="91440" bIns="45720" rtlCol="0" anchor="ctr"/>
+          <a:lstStyle/>
+          <a:p>
+            <a:endParaRPr lang="en-US"/>
+          </a:p>
+        </p:txBody>
+      </p:sp>
+      <p:sp>
+        <p:nvSpPr>
+          <p:cNvPr id="5" name="Notes Placeholder 4"/>
+          <p:cNvSpPr>
+            <a:spLocks noGrp="1"/>
+          </p:cNvSpPr>
+          <p:nvPr>
+            <p:ph type="body" sz="quarter" idx="3"/>
+          </p:nvPr>
+        </p:nvSpPr>
+        <p:spPr>
+          <a:xfrm>
+            <a:off x="685800" y="4400550"/>
+            <a:ext cx="5486400" cy="3600450"/>
+          </a:xfrm>
+          <a:prstGeom prst="rect">
+            <a:avLst/>
+          </a:prstGeom>
+        </p:spPr>
+        <p:txBody>
+          <a:bodyPr vert="horz" lIns="91440" tIns="45720" rIns="91440" bIns="45720" rtlCol="0"/>
+          <a:lstStyle/>
+          <a:p>
+            <a:pPr lvl="0"/>
+            <a:r>
+              <a:rPr lang="en-US"/>
+              <a:t>Click to edit Master text styles</a:t>
+            </a:r>
+          </a:p>
+          <a:p>
+            <a:pPr lvl="1"/>
+            <a:r>
+              <a:rPr lang="en-US"/>
+              <a:t>Second level</a:t>
+            </a:r>
+          </a:p>
+          <a:p>
+            <a:pPr lvl="2"/>
+            <a:r>
+              <a:rPr lang="en-US"/>
+              <a:t>Third level</a:t>
+            </a:r>
+          </a:p>
+          <a:p>
+            <a:pPr lvl="3"/>
+            <a:r>
+              <a:rPr lang="en-US"/>
+              <a:t>Fourth level</a:t>
+            </a:r>
+          </a:p>
+          <a:p>
+            <a:pPr lvl="4"/>
+            <a:r>
+              <a:rPr lang="en-US"/>
+              <a:t>Fifth level</a:t>
+            </a:r>
+          </a:p>
+        </p:txBody>
+      </p:sp>
+      <p:sp>
+        <p:nvSpPr>
+          <p:cNvPr id="6" name="Footer Placeholder 5"/>
+          <p:cNvSpPr>
+            <a:spLocks noGrp="1"/>
+          </p:cNvSpPr>
+          <p:nvPr>
+            <p:ph type="ftr" sz="quarter" idx="4"/>
+          </p:nvPr>
+        </p:nvSpPr>
+        <p:spPr>
+          <a:xfrm>
+            <a:off x="0" y="8685213"/>
+            <a:ext cx="2971800" cy="458787"/>
+          </a:xfrm>
+          <a:prstGeom prst="rect">
+            <a:avLst/>
+          </a:prstGeom>
+        </p:spPr>
+        <p:txBody>
+          <a:bodyPr vert="horz" lIns="91440" tIns="45720" rIns="91440" bIns="45720" rtlCol="0" anchor="b"/>
+          <a:lstStyle>
+            <a:lvl1pPr algn="l">
+              <a:defRPr sz="1200"/>
+            </a:lvl1pPr>
+          </a:lstStyle>
+          <a:p>
+            <a:endParaRPr lang="en-US"/>
+          </a:p>
+        </p:txBody>
+      </p:sp>
+      <p:sp>
+        <p:nvSpPr>
+          <p:cNvPr id="7" name="Slide Number Placeholder 6"/>
+          <p:cNvSpPr>
+            <a:spLocks noGrp="1"/>
+          </p:cNvSpPr>
+          <p:nvPr>
+            <p:ph type="sldNum" sz="quarter" idx="5"/>
+          </p:nvPr>
+        </p:nvSpPr>
+        <p:spPr>
+          <a:xfrm>
+            <a:off x="3884613" y="8685213"/>
+            <a:ext cx="2971800" cy="458787"/>
+          </a:xfrm>
+          <a:prstGeom prst="rect">
+            <a:avLst/>
+          </a:prstGeom>
+        </p:spPr>
+        <p:txBody>
+          <a:bodyPr vert="horz" lIns="91440" tIns="45720" rIns="91440" bIns="45720" rtlCol="0" anchor="b"/>
+          <a:lstStyle>
+            <a:lvl1pPr algn="r">
+              <a:defRPr sz="1200"/>
+            </a:lvl1pPr>
+          </a:lstStyle>
+          <a:p>
+            <a:fld id="{BDA1BDA2-00C7-4E33-B11E-2A247E9E3592}" type="slidenum">
+              <a:rPr lang="en-US" smtClean="0"/>
+              <a:t>‹#›</a:t>
+            </a:fld>
+            <a:endParaRPr lang="en-US"/>
+          </a:p>
+        </p:txBody>
+      </p:sp>
+    </p:spTree>
+    <p:extLst>
+      <p:ext uri="{BB962C8B-B14F-4D97-AF65-F5344CB8AC3E}">
+        <p14:creationId xmlns:p14="http://schemas.microsoft.com/office/powerpoint/2010/main" val="2938132203"/>
+      </p:ext>
+    </p:extLst>
+  </p:cSld>
+  <p:clrMap bg1="lt1" tx1="dk1" bg2="lt2" tx2="dk2" accent1="accent1" accent2="accent2" accent3="accent3" accent4="accent4" accent5="accent5" accent6="accent6" hlink="hlink" folHlink="folHlink"/>
+  <p:notesStyle>
+    <a:lvl1pPr marL="0" algn="l" defTabSz="914400" rtl="0" eaLnBrk="1" latinLnBrk="0" hangingPunct="1">
+      <a:defRPr sz="1200" kern="1200">
+        <a:solidFill>
+          <a:schemeClr val="tx1"/>
+        </a:solidFill>
+        <a:latin typeface="+mn-lt"/>
+        <a:ea typeface="+mn-ea"/>
+        <a:cs typeface="+mn-cs"/>
+      </a:defRPr>
+    </a:lvl1pPr>
+    <a:lvl2pPr marL="457200" algn="l" defTabSz="914400" rtl="0" eaLnBrk="1" latinLnBrk="0" hangingPunct="1">
+      <a:defRPr sz="1200" kern="1200">
+        <a:solidFill>
+          <a:schemeClr val="tx1"/>
+        </a:solidFill>
+        <a:latin typeface="+mn-lt"/>
+        <a:ea typeface="+mn-ea"/>
+        <a:cs typeface="+mn-cs"/>
+      </a:defRPr>
+    </a:lvl2pPr>
+    <a:lvl3pPr marL="914400" algn="l" defTabSz="914400" rtl="0" eaLnBrk="1" latinLnBrk="0" hangingPunct="1">
+      <a:defRPr sz="1200" kern="1200">
+        <a:solidFill>
+          <a:schemeClr val="tx1"/>
+        </a:solidFill>
+        <a:latin typeface="+mn-lt"/>
+        <a:ea typeface="+mn-ea"/>
+        <a:cs typeface="+mn-cs"/>
+      </a:defRPr>
+    </a:lvl3pPr>
+    <a:lvl4pPr marL="1371600" algn="l" defTabSz="914400" rtl="0" eaLnBrk="1" latinLnBrk="0" hangingPunct="1">
+      <a:defRPr sz="1200" kern="1200">
+        <a:solidFill>
+          <a:schemeClr val="tx1"/>
+        </a:solidFill>
+        <a:latin typeface="+mn-lt"/>
+        <a:ea typeface="+mn-ea"/>
+        <a:cs typeface="+mn-cs"/>
+      </a:defRPr>
+    </a:lvl4pPr>
+    <a:lvl5pPr marL="1828800" algn="l" defTabSz="914400" rtl="0" eaLnBrk="1" latinLnBrk="0" hangingPunct="1">
+      <a:defRPr sz="1200" kern="1200">
+        <a:solidFill>
+          <a:schemeClr val="tx1"/>
+        </a:solidFill>
+        <a:latin typeface="+mn-lt"/>
+        <a:ea typeface="+mn-ea"/>
+        <a:cs typeface="+mn-cs"/>
+      </a:defRPr>
+    </a:lvl5pPr>
+    <a:lvl6pPr marL="2286000" algn="l" defTabSz="914400" rtl="0" eaLnBrk="1" latinLnBrk="0" hangingPunct="1">
+      <a:defRPr sz="1200" kern="1200">
+        <a:solidFill>
+          <a:schemeClr val="tx1"/>
+        </a:solidFill>
+        <a:latin typeface="+mn-lt"/>
+        <a:ea typeface="+mn-ea"/>
+        <a:cs typeface="+mn-cs"/>
+      </a:defRPr>
+    </a:lvl6pPr>
+    <a:lvl7pPr marL="2743200" algn="l" defTabSz="914400" rtl="0" eaLnBrk="1" latinLnBrk="0" hangingPunct="1">
+      <a:defRPr sz="1200" kern="1200">
+        <a:solidFill>
+          <a:schemeClr val="tx1"/>
+        </a:solidFill>
+        <a:latin typeface="+mn-lt"/>
+        <a:ea typeface="+mn-ea"/>
+        <a:cs typeface="+mn-cs"/>
+      </a:defRPr>
+    </a:lvl7pPr>
+    <a:lvl8pPr marL="3200400" algn="l" defTabSz="914400" rtl="0" eaLnBrk="1" latinLnBrk="0" hangingPunct="1">
+      <a:defRPr sz="1200" kern="1200">
+        <a:solidFill>
+          <a:schemeClr val="tx1"/>
+        </a:solidFill>
+        <a:latin typeface="+mn-lt"/>
+        <a:ea typeface="+mn-ea"/>
+        <a:cs typeface="+mn-cs"/>
+      </a:defRPr>
+    </a:lvl8pPr>
+    <a:lvl9pPr marL="3657600" algn="l" defTabSz="914400" rtl="0" eaLnBrk="1" latinLnBrk="0" hangingPunct="1">
+      <a:defRPr sz="1200" kern="1200">
+        <a:solidFill>
+          <a:schemeClr val="tx1"/>
+        </a:solidFill>
+        <a:latin typeface="+mn-lt"/>
+        <a:ea typeface="+mn-ea"/>
+        <a:cs typeface="+mn-cs"/>
+      </a:defRPr>
+    </a:lvl9pPr>
+  </p:notesStyle>
+</p:notesMaster>
+</file>
+
+<file path=ppt/notesSlides/notesSlide1.xml><?xml version="1.0" encoding="utf-8"?>
+<p:notes xmlns:a="http://schemas.openxmlformats.org/drawingml/2006/main" xmlns:r="http://schemas.openxmlformats.org/officeDocument/2006/relationships" xmlns:p="http://schemas.openxmlformats.org/presentationml/2006/main" showMasterSp="0" showMasterPhAnim="0">
+  <p:cSld>
+    <p:spTree>
+      <p:nvGrpSpPr>
+        <p:cNvPr id="1" name="Shape 80"/>
+        <p:cNvGrpSpPr/>
+        <p:nvPr/>
+      </p:nvGrpSpPr>
+      <p:grpSpPr>
+        <a:xfrm>
+          <a:off x="0" y="0"/>
+          <a:ext cx="0" cy="0"/>
+          <a:chOff x="0" y="0"/>
+          <a:chExt cx="0" cy="0"/>
+        </a:xfrm>
+      </p:grpSpPr>
+      <p:sp>
+        <p:nvSpPr>
+          <p:cNvPr id="81" name="Google Shape;81;g398762fd04e_2_2:notes"/>
+          <p:cNvSpPr>
+            <a:spLocks noGrp="1" noRot="1" noChangeAspect="1"/>
+          </p:cNvSpPr>
+          <p:nvPr>
+            <p:ph type="sldImg" idx="2"/>
+          </p:nvPr>
+        </p:nvSpPr>
+        <p:spPr>
+          <a:xfrm>
+            <a:off x="381300" y="685800"/>
+            <a:ext cx="6096000" cy="3429000"/>
+          </a:xfrm>
+          <a:custGeom>
+            <a:avLst/>
+            <a:gdLst/>
+            <a:ahLst/>
+            <a:cxnLst/>
+            <a:rect l="l" t="t" r="r" b="b"/>
+            <a:pathLst>
+              <a:path w="120000" h="120000" extrusionOk="0">
+                <a:moveTo>
+                  <a:pt x="0" y="0"/>
+                </a:moveTo>
+                <a:lnTo>
+                  <a:pt x="120000" y="0"/>
+                </a:lnTo>
+                <a:lnTo>
+                  <a:pt x="120000" y="120000"/>
+                </a:lnTo>
+                <a:lnTo>
+                  <a:pt x="0" y="120000"/>
+                </a:lnTo>
+                <a:close/>
+              </a:path>
+            </a:pathLst>
+          </a:custGeom>
+        </p:spPr>
+      </p:sp>
+      <p:sp>
+        <p:nvSpPr>
+          <p:cNvPr id="82" name="Google Shape;82;g398762fd04e_2_2:notes"/>
+          <p:cNvSpPr txBox="1">
+            <a:spLocks noGrp="1"/>
+          </p:cNvSpPr>
+          <p:nvPr>
+            <p:ph type="body" idx="1"/>
+          </p:nvPr>
+        </p:nvSpPr>
+        <p:spPr>
+          <a:xfrm>
+            <a:off x="685800" y="4343400"/>
+            <a:ext cx="5486400" cy="4114800"/>
+          </a:xfrm>
+          <a:prstGeom prst="rect">
+            <a:avLst/>
+          </a:prstGeom>
+        </p:spPr>
+        <p:txBody>
+          <a:bodyPr spcFirstLastPara="1" wrap="square" lIns="91425" tIns="91425" rIns="91425" bIns="91425" anchor="t" anchorCtr="0">
+            <a:noAutofit/>
+          </a:bodyPr>
+          <a:lstStyle/>
+          <a:p>
+            <a:pPr marL="0" lvl="0" indent="0" algn="l" rtl="0">
+              <a:spcBef>
+                <a:spcPts val="0"/>
+              </a:spcBef>
+              <a:spcAft>
+                <a:spcPts val="0"/>
+              </a:spcAft>
+              <a:buNone/>
+            </a:pPr>
+            <a:endParaRPr/>
+          </a:p>
+        </p:txBody>
+      </p:sp>
+    </p:spTree>
+  </p:cSld>
+  <p:clrMapOvr>
+    <a:masterClrMapping/>
+  </p:clrMapOvr>
+</p:notes>
+</file>
+
+<file path=ppt/notesSlides/notesSlide2.xml><?xml version="1.0" encoding="utf-8"?>
+<p:notes xmlns:a="http://schemas.openxmlformats.org/drawingml/2006/main" xmlns:r="http://schemas.openxmlformats.org/officeDocument/2006/relationships" xmlns:p="http://schemas.openxmlformats.org/presentationml/2006/main" showMasterSp="0" showMasterPhAnim="0">
+  <p:cSld>
+    <p:spTree>
+      <p:nvGrpSpPr>
+        <p:cNvPr id="1" name="Shape 86"/>
+        <p:cNvGrpSpPr/>
+        <p:nvPr/>
+      </p:nvGrpSpPr>
+      <p:grpSpPr>
+        <a:xfrm>
+          <a:off x="0" y="0"/>
+          <a:ext cx="0" cy="0"/>
+          <a:chOff x="0" y="0"/>
+          <a:chExt cx="0" cy="0"/>
+        </a:xfrm>
+      </p:grpSpPr>
+      <p:sp>
+        <p:nvSpPr>
+          <p:cNvPr id="87" name="Google Shape;87;g36fabb257ff_0_9:notes"/>
+          <p:cNvSpPr>
+            <a:spLocks noGrp="1" noRot="1" noChangeAspect="1"/>
+          </p:cNvSpPr>
+          <p:nvPr>
+            <p:ph type="sldImg" idx="2"/>
+          </p:nvPr>
+        </p:nvSpPr>
+        <p:spPr>
+          <a:xfrm>
+            <a:off x="381300" y="685800"/>
+            <a:ext cx="6096000" cy="3429000"/>
+          </a:xfrm>
+          <a:custGeom>
+            <a:avLst/>
+            <a:gdLst/>
+            <a:ahLst/>
+            <a:cxnLst/>
+            <a:rect l="l" t="t" r="r" b="b"/>
+            <a:pathLst>
+              <a:path w="120000" h="120000" extrusionOk="0">
+                <a:moveTo>
+                  <a:pt x="0" y="0"/>
+                </a:moveTo>
+                <a:lnTo>
+                  <a:pt x="120000" y="0"/>
+                </a:lnTo>
+                <a:lnTo>
+                  <a:pt x="120000" y="120000"/>
+                </a:lnTo>
+                <a:lnTo>
+                  <a:pt x="0" y="120000"/>
+                </a:lnTo>
+                <a:close/>
+              </a:path>
+            </a:pathLst>
+          </a:custGeom>
+        </p:spPr>
+      </p:sp>
+      <p:sp>
+        <p:nvSpPr>
+          <p:cNvPr id="88" name="Google Shape;88;g36fabb257ff_0_9:notes"/>
+          <p:cNvSpPr txBox="1">
+            <a:spLocks noGrp="1"/>
+          </p:cNvSpPr>
+          <p:nvPr>
+            <p:ph type="body" idx="1"/>
+          </p:nvPr>
+        </p:nvSpPr>
+        <p:spPr>
+          <a:xfrm>
+            <a:off x="685800" y="4343400"/>
+            <a:ext cx="5486400" cy="4114800"/>
+          </a:xfrm>
+          <a:prstGeom prst="rect">
+            <a:avLst/>
+          </a:prstGeom>
+        </p:spPr>
+        <p:txBody>
+          <a:bodyPr spcFirstLastPara="1" wrap="square" lIns="91425" tIns="91425" rIns="91425" bIns="91425" anchor="t" anchorCtr="0">
+            <a:noAutofit/>
+          </a:bodyPr>
+          <a:lstStyle/>
+          <a:p>
+            <a:pPr marL="0" lvl="0" indent="0" algn="l" rtl="0">
+              <a:spcBef>
+                <a:spcPts val="0"/>
+              </a:spcBef>
+              <a:spcAft>
+                <a:spcPts val="0"/>
+              </a:spcAft>
+              <a:buNone/>
+            </a:pPr>
+            <a:r>
+              <a:rPr lang="en"/>
+              <a:t>Circle text generator:</a:t>
+            </a:r>
+            <a:endParaRPr/>
+          </a:p>
+          <a:p>
+            <a:pPr marL="0" lvl="0" indent="0" algn="l" rtl="0">
+              <a:spcBef>
+                <a:spcPts val="0"/>
+              </a:spcBef>
+              <a:spcAft>
+                <a:spcPts val="0"/>
+              </a:spcAft>
+              <a:buNone/>
+            </a:pPr>
+            <a:endParaRPr/>
+          </a:p>
+          <a:p>
+            <a:pPr marL="0" lvl="0" indent="0" algn="l" rtl="0">
+              <a:spcBef>
+                <a:spcPts val="0"/>
+              </a:spcBef>
+              <a:spcAft>
+                <a:spcPts val="0"/>
+              </a:spcAft>
+              <a:buNone/>
+            </a:pPr>
+            <a:r>
+              <a:rPr lang="en" u="sng">
+                <a:solidFill>
+                  <a:schemeClr val="hlink"/>
+                </a:solidFill>
+                <a:hlinkClick r:id="rId3"/>
+              </a:rPr>
+              <a:t>https://inkpx.com/templates/qr4/text-in-circle</a:t>
+            </a:r>
+            <a:endParaRPr/>
+          </a:p>
+          <a:p>
+            <a:pPr marL="0" lvl="0" indent="0" algn="l" rtl="0">
+              <a:spcBef>
+                <a:spcPts val="0"/>
+              </a:spcBef>
+              <a:spcAft>
+                <a:spcPts val="0"/>
+              </a:spcAft>
+              <a:buNone/>
+            </a:pPr>
+            <a:endParaRPr/>
+          </a:p>
+          <a:p>
+            <a:pPr marL="0" lvl="0" indent="0" algn="l" rtl="0">
+              <a:spcBef>
+                <a:spcPts val="0"/>
+              </a:spcBef>
+              <a:spcAft>
+                <a:spcPts val="0"/>
+              </a:spcAft>
+              <a:buNone/>
+            </a:pPr>
+            <a:r>
+              <a:rPr lang="en"/>
+              <a:t>(copy/paste - don’t download)</a:t>
+            </a:r>
+            <a:endParaRPr/>
+          </a:p>
+          <a:p>
+            <a:pPr marL="0" lvl="0" indent="0" algn="l" rtl="0">
+              <a:spcBef>
+                <a:spcPts val="0"/>
+              </a:spcBef>
+              <a:spcAft>
+                <a:spcPts val="0"/>
+              </a:spcAft>
+              <a:buNone/>
+            </a:pPr>
+            <a:r>
+              <a:rPr lang="en" b="1"/>
+              <a:t>Asap - Italic</a:t>
+            </a:r>
+            <a:r>
+              <a:rPr lang="en"/>
+              <a:t> (font for Action-to-Data) . . . use default for others</a:t>
+            </a:r>
+            <a:endParaRPr/>
+          </a:p>
+          <a:p>
+            <a:pPr marL="0" lvl="0" indent="0" algn="l" rtl="0">
+              <a:spcBef>
+                <a:spcPts val="0"/>
+              </a:spcBef>
+              <a:spcAft>
+                <a:spcPts val="0"/>
+              </a:spcAft>
+              <a:buNone/>
+            </a:pPr>
+            <a:r>
+              <a:rPr lang="en"/>
+              <a:t>… use “fill” or “stroke” only, not both to keep edges cleaner. . . play with bold font to get desired width</a:t>
+            </a:r>
+            <a:endParaRPr/>
+          </a:p>
+          <a:p>
+            <a:pPr marL="0" lvl="0" indent="0" algn="l" rtl="0">
+              <a:spcBef>
+                <a:spcPts val="0"/>
+              </a:spcBef>
+              <a:spcAft>
+                <a:spcPts val="0"/>
+              </a:spcAft>
+              <a:buNone/>
+            </a:pPr>
+            <a:r>
+              <a:rPr lang="en"/>
+              <a:t>…. Use font “size” to lock dimensions</a:t>
+            </a:r>
+            <a:endParaRPr/>
+          </a:p>
+          <a:p>
+            <a:pPr marL="0" lvl="0" indent="0" algn="l" rtl="0">
+              <a:spcBef>
+                <a:spcPts val="0"/>
+              </a:spcBef>
+              <a:spcAft>
+                <a:spcPts val="0"/>
+              </a:spcAft>
+              <a:buNone/>
+            </a:pPr>
+            <a:r>
+              <a:rPr lang="en"/>
+              <a:t>…edit color hex code to match</a:t>
+            </a:r>
+            <a:endParaRPr/>
+          </a:p>
+          <a:p>
+            <a:pPr marL="0" lvl="0" indent="0" algn="l" rtl="0">
+              <a:spcBef>
+                <a:spcPts val="0"/>
+              </a:spcBef>
+              <a:spcAft>
+                <a:spcPts val="0"/>
+              </a:spcAft>
+              <a:buNone/>
+            </a:pPr>
+            <a:r>
+              <a:rPr lang="en"/>
+              <a:t>Use different paths to get text to flip to bottom half of circle</a:t>
+            </a:r>
+            <a:endParaRPr/>
+          </a:p>
+        </p:txBody>
+      </p:sp>
+    </p:spTree>
+  </p:cSld>
+  <p:clrMapOvr>
+    <a:masterClrMapping/>
+  </p:clrMapOvr>
+</p:notes>
+</file>
+
 <file path=ppt/slideLayouts/slideLayout1.xml><?xml version="1.0" encoding="utf-8"?>
 <p:sldLayout xmlns:a="http://schemas.openxmlformats.org/drawingml/2006/main" xmlns:r="http://schemas.openxmlformats.org/officeDocument/2006/relationships" xmlns:p="http://schemas.openxmlformats.org/presentationml/2006/main" type="title" preserve="1">
   <p:cSld name="Title Slide">
@@ -255,7 +966,7 @@
           <a:p>
             <a:fld id="{79B19490-57C7-44C6-A80B-21AF9873DCB2}" type="datetimeFigureOut">
               <a:rPr lang="en-US" smtClean="0"/>
-              <a:t>10/31/2025</a:t>
+              <a:t>11/5/2025</a:t>
             </a:fld>
             <a:endParaRPr lang="en-US"/>
           </a:p>
@@ -423,7 +1134,7 @@
           <a:p>
             <a:fld id="{79B19490-57C7-44C6-A80B-21AF9873DCB2}" type="datetimeFigureOut">
               <a:rPr lang="en-US" smtClean="0"/>
-              <a:t>10/31/2025</a:t>
+              <a:t>11/5/2025</a:t>
             </a:fld>
             <a:endParaRPr lang="en-US"/>
           </a:p>
@@ -601,7 +1312,7 @@
           <a:p>
             <a:fld id="{79B19490-57C7-44C6-A80B-21AF9873DCB2}" type="datetimeFigureOut">
               <a:rPr lang="en-US" smtClean="0"/>
-              <a:t>10/31/2025</a:t>
+              <a:t>11/5/2025</a:t>
             </a:fld>
             <a:endParaRPr lang="en-US"/>
           </a:p>
@@ -1608,6 +2319,365 @@
 </p:sldLayout>
 </file>
 
+<file path=ppt/slideLayouts/slideLayout13.xml><?xml version="1.0" encoding="utf-8"?>
+<p:sldLayout xmlns:a="http://schemas.openxmlformats.org/drawingml/2006/main" xmlns:r="http://schemas.openxmlformats.org/officeDocument/2006/relationships" xmlns:p="http://schemas.openxmlformats.org/presentationml/2006/main" matchingName="Title and body" type="tx">
+  <p:cSld name="Title and body">
+    <p:spTree>
+      <p:nvGrpSpPr>
+        <p:cNvPr id="1" name="Shape 16"/>
+        <p:cNvGrpSpPr/>
+        <p:nvPr/>
+      </p:nvGrpSpPr>
+      <p:grpSpPr>
+        <a:xfrm>
+          <a:off x="0" y="0"/>
+          <a:ext cx="0" cy="0"/>
+          <a:chOff x="0" y="0"/>
+          <a:chExt cx="0" cy="0"/>
+        </a:xfrm>
+      </p:grpSpPr>
+      <p:sp>
+        <p:nvSpPr>
+          <p:cNvPr id="17" name="Google Shape;17;p4"/>
+          <p:cNvSpPr txBox="1">
+            <a:spLocks noGrp="1"/>
+          </p:cNvSpPr>
+          <p:nvPr>
+            <p:ph type="title"/>
+          </p:nvPr>
+        </p:nvSpPr>
+        <p:spPr>
+          <a:xfrm>
+            <a:off x="415600" y="593367"/>
+            <a:ext cx="11360800" cy="763600"/>
+          </a:xfrm>
+          <a:prstGeom prst="rect">
+            <a:avLst/>
+          </a:prstGeom>
+        </p:spPr>
+        <p:txBody>
+          <a:bodyPr spcFirstLastPara="1" wrap="square" lIns="91425" tIns="91425" rIns="91425" bIns="91425" anchor="t" anchorCtr="0">
+            <a:normAutofit/>
+          </a:bodyPr>
+          <a:lstStyle>
+            <a:lvl1pPr lvl="0">
+              <a:spcBef>
+                <a:spcPts val="0"/>
+              </a:spcBef>
+              <a:spcAft>
+                <a:spcPts val="0"/>
+              </a:spcAft>
+              <a:buSzPts val="2800"/>
+              <a:buNone/>
+              <a:defRPr/>
+            </a:lvl1pPr>
+            <a:lvl2pPr lvl="1">
+              <a:spcBef>
+                <a:spcPts val="0"/>
+              </a:spcBef>
+              <a:spcAft>
+                <a:spcPts val="0"/>
+              </a:spcAft>
+              <a:buSzPts val="2800"/>
+              <a:buNone/>
+              <a:defRPr/>
+            </a:lvl2pPr>
+            <a:lvl3pPr lvl="2">
+              <a:spcBef>
+                <a:spcPts val="0"/>
+              </a:spcBef>
+              <a:spcAft>
+                <a:spcPts val="0"/>
+              </a:spcAft>
+              <a:buSzPts val="2800"/>
+              <a:buNone/>
+              <a:defRPr/>
+            </a:lvl3pPr>
+            <a:lvl4pPr lvl="3">
+              <a:spcBef>
+                <a:spcPts val="0"/>
+              </a:spcBef>
+              <a:spcAft>
+                <a:spcPts val="0"/>
+              </a:spcAft>
+              <a:buSzPts val="2800"/>
+              <a:buNone/>
+              <a:defRPr/>
+            </a:lvl4pPr>
+            <a:lvl5pPr lvl="4">
+              <a:spcBef>
+                <a:spcPts val="0"/>
+              </a:spcBef>
+              <a:spcAft>
+                <a:spcPts val="0"/>
+              </a:spcAft>
+              <a:buSzPts val="2800"/>
+              <a:buNone/>
+              <a:defRPr/>
+            </a:lvl5pPr>
+            <a:lvl6pPr lvl="5">
+              <a:spcBef>
+                <a:spcPts val="0"/>
+              </a:spcBef>
+              <a:spcAft>
+                <a:spcPts val="0"/>
+              </a:spcAft>
+              <a:buSzPts val="2800"/>
+              <a:buNone/>
+              <a:defRPr/>
+            </a:lvl6pPr>
+            <a:lvl7pPr lvl="6">
+              <a:spcBef>
+                <a:spcPts val="0"/>
+              </a:spcBef>
+              <a:spcAft>
+                <a:spcPts val="0"/>
+              </a:spcAft>
+              <a:buSzPts val="2800"/>
+              <a:buNone/>
+              <a:defRPr/>
+            </a:lvl7pPr>
+            <a:lvl8pPr lvl="7">
+              <a:spcBef>
+                <a:spcPts val="0"/>
+              </a:spcBef>
+              <a:spcAft>
+                <a:spcPts val="0"/>
+              </a:spcAft>
+              <a:buSzPts val="2800"/>
+              <a:buNone/>
+              <a:defRPr/>
+            </a:lvl8pPr>
+            <a:lvl9pPr lvl="8">
+              <a:spcBef>
+                <a:spcPts val="0"/>
+              </a:spcBef>
+              <a:spcAft>
+                <a:spcPts val="0"/>
+              </a:spcAft>
+              <a:buSzPts val="2800"/>
+              <a:buNone/>
+              <a:defRPr/>
+            </a:lvl9pPr>
+          </a:lstStyle>
+          <a:p>
+            <a:endParaRPr/>
+          </a:p>
+        </p:txBody>
+      </p:sp>
+      <p:sp>
+        <p:nvSpPr>
+          <p:cNvPr id="18" name="Google Shape;18;p4"/>
+          <p:cNvSpPr txBox="1">
+            <a:spLocks noGrp="1"/>
+          </p:cNvSpPr>
+          <p:nvPr>
+            <p:ph type="body" idx="1"/>
+          </p:nvPr>
+        </p:nvSpPr>
+        <p:spPr>
+          <a:xfrm>
+            <a:off x="415600" y="1536633"/>
+            <a:ext cx="11360800" cy="4555200"/>
+          </a:xfrm>
+          <a:prstGeom prst="rect">
+            <a:avLst/>
+          </a:prstGeom>
+        </p:spPr>
+        <p:txBody>
+          <a:bodyPr spcFirstLastPara="1" wrap="square" lIns="91425" tIns="91425" rIns="91425" bIns="91425" anchor="t" anchorCtr="0">
+            <a:normAutofit/>
+          </a:bodyPr>
+          <a:lstStyle>
+            <a:lvl1pPr marL="609585" lvl="0" indent="-457189">
+              <a:spcBef>
+                <a:spcPts val="0"/>
+              </a:spcBef>
+              <a:spcAft>
+                <a:spcPts val="0"/>
+              </a:spcAft>
+              <a:buSzPts val="1800"/>
+              <a:buChar char="●"/>
+              <a:defRPr/>
+            </a:lvl1pPr>
+            <a:lvl2pPr marL="1219170" lvl="1" indent="-423323">
+              <a:spcBef>
+                <a:spcPts val="0"/>
+              </a:spcBef>
+              <a:spcAft>
+                <a:spcPts val="0"/>
+              </a:spcAft>
+              <a:buSzPts val="1400"/>
+              <a:buChar char="○"/>
+              <a:defRPr/>
+            </a:lvl2pPr>
+            <a:lvl3pPr marL="1828754" lvl="2" indent="-423323">
+              <a:spcBef>
+                <a:spcPts val="0"/>
+              </a:spcBef>
+              <a:spcAft>
+                <a:spcPts val="0"/>
+              </a:spcAft>
+              <a:buSzPts val="1400"/>
+              <a:buChar char="■"/>
+              <a:defRPr/>
+            </a:lvl3pPr>
+            <a:lvl4pPr marL="2438339" lvl="3" indent="-423323">
+              <a:spcBef>
+                <a:spcPts val="0"/>
+              </a:spcBef>
+              <a:spcAft>
+                <a:spcPts val="0"/>
+              </a:spcAft>
+              <a:buSzPts val="1400"/>
+              <a:buChar char="●"/>
+              <a:defRPr/>
+            </a:lvl4pPr>
+            <a:lvl5pPr marL="3047924" lvl="4" indent="-423323">
+              <a:spcBef>
+                <a:spcPts val="0"/>
+              </a:spcBef>
+              <a:spcAft>
+                <a:spcPts val="0"/>
+              </a:spcAft>
+              <a:buSzPts val="1400"/>
+              <a:buChar char="○"/>
+              <a:defRPr/>
+            </a:lvl5pPr>
+            <a:lvl6pPr marL="3657509" lvl="5" indent="-423323">
+              <a:spcBef>
+                <a:spcPts val="0"/>
+              </a:spcBef>
+              <a:spcAft>
+                <a:spcPts val="0"/>
+              </a:spcAft>
+              <a:buSzPts val="1400"/>
+              <a:buChar char="■"/>
+              <a:defRPr/>
+            </a:lvl6pPr>
+            <a:lvl7pPr marL="4267093" lvl="6" indent="-423323">
+              <a:spcBef>
+                <a:spcPts val="0"/>
+              </a:spcBef>
+              <a:spcAft>
+                <a:spcPts val="0"/>
+              </a:spcAft>
+              <a:buSzPts val="1400"/>
+              <a:buChar char="●"/>
+              <a:defRPr/>
+            </a:lvl7pPr>
+            <a:lvl8pPr marL="4876678" lvl="7" indent="-423323">
+              <a:spcBef>
+                <a:spcPts val="0"/>
+              </a:spcBef>
+              <a:spcAft>
+                <a:spcPts val="0"/>
+              </a:spcAft>
+              <a:buSzPts val="1400"/>
+              <a:buChar char="○"/>
+              <a:defRPr/>
+            </a:lvl8pPr>
+            <a:lvl9pPr marL="5486263" lvl="8" indent="-423323">
+              <a:spcBef>
+                <a:spcPts val="0"/>
+              </a:spcBef>
+              <a:spcAft>
+                <a:spcPts val="0"/>
+              </a:spcAft>
+              <a:buSzPts val="1400"/>
+              <a:buChar char="■"/>
+              <a:defRPr/>
+            </a:lvl9pPr>
+          </a:lstStyle>
+          <a:p>
+            <a:endParaRPr/>
+          </a:p>
+        </p:txBody>
+      </p:sp>
+      <p:sp>
+        <p:nvSpPr>
+          <p:cNvPr id="19" name="Google Shape;19;p4"/>
+          <p:cNvSpPr txBox="1">
+            <a:spLocks noGrp="1"/>
+          </p:cNvSpPr>
+          <p:nvPr>
+            <p:ph type="sldNum" idx="12"/>
+          </p:nvPr>
+        </p:nvSpPr>
+        <p:spPr>
+          <a:xfrm>
+            <a:off x="11296611" y="6217623"/>
+            <a:ext cx="731600" cy="524800"/>
+          </a:xfrm>
+          <a:prstGeom prst="rect">
+            <a:avLst/>
+          </a:prstGeom>
+        </p:spPr>
+        <p:txBody>
+          <a:bodyPr spcFirstLastPara="1" wrap="square" lIns="91425" tIns="91425" rIns="91425" bIns="91425" anchor="ctr" anchorCtr="0">
+            <a:normAutofit/>
+          </a:bodyPr>
+          <a:lstStyle>
+            <a:lvl1pPr lvl="0">
+              <a:buNone/>
+              <a:defRPr/>
+            </a:lvl1pPr>
+            <a:lvl2pPr lvl="1">
+              <a:buNone/>
+              <a:defRPr/>
+            </a:lvl2pPr>
+            <a:lvl3pPr lvl="2">
+              <a:buNone/>
+              <a:defRPr/>
+            </a:lvl3pPr>
+            <a:lvl4pPr lvl="3">
+              <a:buNone/>
+              <a:defRPr/>
+            </a:lvl4pPr>
+            <a:lvl5pPr lvl="4">
+              <a:buNone/>
+              <a:defRPr/>
+            </a:lvl5pPr>
+            <a:lvl6pPr lvl="5">
+              <a:buNone/>
+              <a:defRPr/>
+            </a:lvl6pPr>
+            <a:lvl7pPr lvl="6">
+              <a:buNone/>
+              <a:defRPr/>
+            </a:lvl7pPr>
+            <a:lvl8pPr lvl="7">
+              <a:buNone/>
+              <a:defRPr/>
+            </a:lvl8pPr>
+            <a:lvl9pPr lvl="8">
+              <a:buNone/>
+              <a:defRPr/>
+            </a:lvl9pPr>
+          </a:lstStyle>
+          <a:p>
+            <a:fld id="{00000000-1234-1234-1234-123412341234}" type="slidenum">
+              <a:rPr lang="en" smtClean="0"/>
+              <a:pPr/>
+              <a:t>‹#›</a:t>
+            </a:fld>
+            <a:endParaRPr lang="en"/>
+          </a:p>
+        </p:txBody>
+      </p:sp>
+    </p:spTree>
+    <p:extLst>
+      <p:ext uri="{BB962C8B-B14F-4D97-AF65-F5344CB8AC3E}">
+        <p14:creationId xmlns:p14="http://schemas.microsoft.com/office/powerpoint/2010/main" val="1075453057"/>
+      </p:ext>
+    </p:extLst>
+  </p:cSld>
+  <p:clrMapOvr>
+    <a:masterClrMapping/>
+  </p:clrMapOvr>
+</p:sldLayout>
+</file>
+
 <file path=ppt/slideLayouts/slideLayout2.xml><?xml version="1.0" encoding="utf-8"?>
 <p:sldLayout xmlns:a="http://schemas.openxmlformats.org/drawingml/2006/main" xmlns:r="http://schemas.openxmlformats.org/officeDocument/2006/relationships" xmlns:p="http://schemas.openxmlformats.org/presentationml/2006/main" type="obj" preserve="1">
   <p:cSld name="Title and Content">
@@ -1715,7 +2785,7 @@
           <a:p>
             <a:fld id="{79B19490-57C7-44C6-A80B-21AF9873DCB2}" type="datetimeFigureOut">
               <a:rPr lang="en-US" smtClean="0"/>
-              <a:t>10/31/2025</a:t>
+              <a:t>11/5/2025</a:t>
             </a:fld>
             <a:endParaRPr lang="en-US"/>
           </a:p>
@@ -1960,7 +3030,7 @@
           <a:p>
             <a:fld id="{79B19490-57C7-44C6-A80B-21AF9873DCB2}" type="datetimeFigureOut">
               <a:rPr lang="en-US" smtClean="0"/>
-              <a:t>10/31/2025</a:t>
+              <a:t>11/5/2025</a:t>
             </a:fld>
             <a:endParaRPr lang="en-US"/>
           </a:p>
@@ -2189,7 +3259,7 @@
           <a:p>
             <a:fld id="{79B19490-57C7-44C6-A80B-21AF9873DCB2}" type="datetimeFigureOut">
               <a:rPr lang="en-US" smtClean="0"/>
-              <a:t>10/31/2025</a:t>
+              <a:t>11/5/2025</a:t>
             </a:fld>
             <a:endParaRPr lang="en-US"/>
           </a:p>
@@ -2553,7 +3623,7 @@
           <a:p>
             <a:fld id="{79B19490-57C7-44C6-A80B-21AF9873DCB2}" type="datetimeFigureOut">
               <a:rPr lang="en-US" smtClean="0"/>
-              <a:t>10/31/2025</a:t>
+              <a:t>11/5/2025</a:t>
             </a:fld>
             <a:endParaRPr lang="en-US"/>
           </a:p>
@@ -2670,7 +3740,7 @@
           <a:p>
             <a:fld id="{79B19490-57C7-44C6-A80B-21AF9873DCB2}" type="datetimeFigureOut">
               <a:rPr lang="en-US" smtClean="0"/>
-              <a:t>10/31/2025</a:t>
+              <a:t>11/5/2025</a:t>
             </a:fld>
             <a:endParaRPr lang="en-US"/>
           </a:p>
@@ -2765,7 +3835,7 @@
           <a:p>
             <a:fld id="{79B19490-57C7-44C6-A80B-21AF9873DCB2}" type="datetimeFigureOut">
               <a:rPr lang="en-US" smtClean="0"/>
-              <a:t>10/31/2025</a:t>
+              <a:t>11/5/2025</a:t>
             </a:fld>
             <a:endParaRPr lang="en-US"/>
           </a:p>
@@ -3040,7 +4110,7 @@
           <a:p>
             <a:fld id="{79B19490-57C7-44C6-A80B-21AF9873DCB2}" type="datetimeFigureOut">
               <a:rPr lang="en-US" smtClean="0"/>
-              <a:t>10/31/2025</a:t>
+              <a:t>11/5/2025</a:t>
             </a:fld>
             <a:endParaRPr lang="en-US"/>
           </a:p>
@@ -3292,7 +4362,7 @@
           <a:p>
             <a:fld id="{79B19490-57C7-44C6-A80B-21AF9873DCB2}" type="datetimeFigureOut">
               <a:rPr lang="en-US" smtClean="0"/>
-              <a:t>10/31/2025</a:t>
+              <a:t>11/5/2025</a:t>
             </a:fld>
             <a:endParaRPr lang="en-US"/>
           </a:p>
@@ -3503,7 +4573,7 @@
           <a:p>
             <a:fld id="{79B19490-57C7-44C6-A80B-21AF9873DCB2}" type="datetimeFigureOut">
               <a:rPr lang="en-US" smtClean="0"/>
-              <a:t>10/31/2025</a:t>
+              <a:t>11/5/2025</a:t>
             </a:fld>
             <a:endParaRPr lang="en-US"/>
           </a:p>
@@ -3608,6 +4678,7 @@
     <p:sldLayoutId id="2147483658" r:id="rId10"/>
     <p:sldLayoutId id="2147483659" r:id="rId11"/>
     <p:sldLayoutId id="2147483660" r:id="rId12"/>
+    <p:sldLayoutId id="2147483661" r:id="rId13"/>
   </p:sldLayoutIdLst>
   <p:txStyles>
     <p:titleStyle>
@@ -13681,6 +14752,1488 @@
         <p14:creationId xmlns:p14="http://schemas.microsoft.com/office/powerpoint/2010/main" val="1944501779"/>
       </p:ext>
     </p:extLst>
+  </p:cSld>
+  <p:clrMapOvr>
+    <a:masterClrMapping/>
+  </p:clrMapOvr>
+</p:sld>
+</file>
+
+<file path=ppt/slides/slide16.xml><?xml version="1.0" encoding="utf-8"?>
+<p:sld xmlns:a="http://schemas.openxmlformats.org/drawingml/2006/main" xmlns:r="http://schemas.openxmlformats.org/officeDocument/2006/relationships" xmlns:p="http://schemas.openxmlformats.org/presentationml/2006/main">
+  <p:cSld>
+    <p:spTree>
+      <p:nvGrpSpPr>
+        <p:cNvPr id="1" name="Shape 83"/>
+        <p:cNvGrpSpPr/>
+        <p:nvPr/>
+      </p:nvGrpSpPr>
+      <p:grpSpPr>
+        <a:xfrm>
+          <a:off x="0" y="0"/>
+          <a:ext cx="0" cy="0"/>
+          <a:chOff x="0" y="0"/>
+          <a:chExt cx="0" cy="0"/>
+        </a:xfrm>
+      </p:grpSpPr>
+      <p:sp>
+        <p:nvSpPr>
+          <p:cNvPr id="84" name="Google Shape;84;p18"/>
+          <p:cNvSpPr txBox="1"/>
+          <p:nvPr/>
+        </p:nvSpPr>
+        <p:spPr>
+          <a:xfrm>
+            <a:off x="166567" y="5999767"/>
+            <a:ext cx="1655200" cy="615513"/>
+          </a:xfrm>
+          <a:prstGeom prst="rect">
+            <a:avLst/>
+          </a:prstGeom>
+          <a:noFill/>
+          <a:ln>
+            <a:noFill/>
+          </a:ln>
+        </p:spPr>
+        <p:txBody>
+          <a:bodyPr spcFirstLastPara="1" wrap="square" lIns="121900" tIns="121900" rIns="121900" bIns="121900" anchor="t" anchorCtr="0">
+            <a:spAutoFit/>
+          </a:bodyPr>
+          <a:lstStyle/>
+          <a:p>
+            <a:r>
+              <a:rPr lang="en" sz="2400">
+                <a:solidFill>
+                  <a:schemeClr val="dk2"/>
+                </a:solidFill>
+              </a:rPr>
+              <a:t>Image</a:t>
+            </a:r>
+            <a:endParaRPr sz="2400">
+              <a:solidFill>
+                <a:schemeClr val="dk2"/>
+              </a:solidFill>
+            </a:endParaRPr>
+          </a:p>
+        </p:txBody>
+      </p:sp>
+      <p:pic>
+        <p:nvPicPr>
+          <p:cNvPr id="85" name="Google Shape;85;p18"/>
+          <p:cNvPicPr preferRelativeResize="0"/>
+          <p:nvPr/>
+        </p:nvPicPr>
+        <p:blipFill rotWithShape="1">
+          <a:blip r:embed="rId3">
+            <a:alphaModFix/>
+          </a:blip>
+          <a:srcRect l="4460" t="2674" r="12316" b="2834"/>
+          <a:stretch/>
+        </p:blipFill>
+        <p:spPr>
+          <a:xfrm>
+            <a:off x="2951585" y="284600"/>
+            <a:ext cx="6288831" cy="6288800"/>
+          </a:xfrm>
+          <a:prstGeom prst="rect">
+            <a:avLst/>
+          </a:prstGeom>
+          <a:noFill/>
+          <a:ln>
+            <a:noFill/>
+          </a:ln>
+        </p:spPr>
+      </p:pic>
+    </p:spTree>
+  </p:cSld>
+  <p:clrMapOvr>
+    <a:masterClrMapping/>
+  </p:clrMapOvr>
+</p:sld>
+</file>
+
+<file path=ppt/slides/slide17.xml><?xml version="1.0" encoding="utf-8"?>
+<p:sld xmlns:a="http://schemas.openxmlformats.org/drawingml/2006/main" xmlns:r="http://schemas.openxmlformats.org/officeDocument/2006/relationships" xmlns:p="http://schemas.openxmlformats.org/presentationml/2006/main">
+  <p:cSld>
+    <p:spTree>
+      <p:nvGrpSpPr>
+        <p:cNvPr id="1" name="Shape 89"/>
+        <p:cNvGrpSpPr/>
+        <p:nvPr/>
+      </p:nvGrpSpPr>
+      <p:grpSpPr>
+        <a:xfrm>
+          <a:off x="0" y="0"/>
+          <a:ext cx="0" cy="0"/>
+          <a:chOff x="0" y="0"/>
+          <a:chExt cx="0" cy="0"/>
+        </a:xfrm>
+      </p:grpSpPr>
+      <p:grpSp>
+        <p:nvGrpSpPr>
+          <p:cNvPr id="90" name="Google Shape;90;p19"/>
+          <p:cNvGrpSpPr/>
+          <p:nvPr/>
+        </p:nvGrpSpPr>
+        <p:grpSpPr>
+          <a:xfrm>
+            <a:off x="2759543" y="230268"/>
+            <a:ext cx="6716496" cy="6866960"/>
+            <a:chOff x="2069657" y="172701"/>
+            <a:chExt cx="5037372" cy="5150220"/>
+          </a:xfrm>
+        </p:grpSpPr>
+        <p:grpSp>
+          <p:nvGrpSpPr>
+            <p:cNvPr id="91" name="Google Shape;91;p19"/>
+            <p:cNvGrpSpPr/>
+            <p:nvPr/>
+          </p:nvGrpSpPr>
+          <p:grpSpPr>
+            <a:xfrm>
+              <a:off x="2069657" y="172701"/>
+              <a:ext cx="5037372" cy="5150220"/>
+              <a:chOff x="2069657" y="172701"/>
+              <a:chExt cx="5037372" cy="5150220"/>
+            </a:xfrm>
+          </p:grpSpPr>
+          <p:grpSp>
+            <p:nvGrpSpPr>
+              <p:cNvPr id="92" name="Google Shape;92;p19"/>
+              <p:cNvGrpSpPr/>
+              <p:nvPr/>
+            </p:nvGrpSpPr>
+            <p:grpSpPr>
+              <a:xfrm>
+                <a:off x="2151781" y="172701"/>
+                <a:ext cx="4955248" cy="5150220"/>
+                <a:chOff x="4408792" y="172701"/>
+                <a:chExt cx="4955248" cy="5150220"/>
+              </a:xfrm>
+            </p:grpSpPr>
+            <p:sp>
+              <p:nvSpPr>
+                <p:cNvPr id="93" name="Google Shape;93;p19"/>
+                <p:cNvSpPr/>
+                <p:nvPr/>
+              </p:nvSpPr>
+              <p:spPr>
+                <a:xfrm>
+                  <a:off x="4742875" y="746400"/>
+                  <a:ext cx="3886200" cy="3886200"/>
+                </a:xfrm>
+                <a:prstGeom prst="ellipse">
+                  <a:avLst/>
+                </a:prstGeom>
+                <a:noFill/>
+                <a:ln w="11150" cap="flat" cmpd="sng">
+                  <a:solidFill>
+                    <a:schemeClr val="dk2"/>
+                  </a:solidFill>
+                  <a:prstDash val="dot"/>
+                  <a:round/>
+                  <a:headEnd type="none" w="sm" len="sm"/>
+                  <a:tailEnd type="none" w="sm" len="sm"/>
+                </a:ln>
+              </p:spPr>
+              <p:txBody>
+                <a:bodyPr spcFirstLastPara="1" wrap="square" lIns="142300" tIns="142300" rIns="142300" bIns="142300" anchor="ctr" anchorCtr="0">
+                  <a:noAutofit/>
+                </a:bodyPr>
+                <a:lstStyle/>
+                <a:p>
+                  <a:pPr algn="ctr"/>
+                  <a:endParaRPr sz="2179"/>
+                </a:p>
+              </p:txBody>
+            </p:sp>
+            <p:sp>
+              <p:nvSpPr>
+                <p:cNvPr id="94" name="Google Shape;94;p19"/>
+                <p:cNvSpPr/>
+                <p:nvPr/>
+              </p:nvSpPr>
+              <p:spPr>
+                <a:xfrm>
+                  <a:off x="4857175" y="860700"/>
+                  <a:ext cx="3657600" cy="3657600"/>
+                </a:xfrm>
+                <a:prstGeom prst="flowChartOr">
+                  <a:avLst/>
+                </a:prstGeom>
+                <a:solidFill>
+                  <a:srgbClr val="C0CCE0"/>
+                </a:solidFill>
+                <a:ln w="28575" cap="flat" cmpd="sng">
+                  <a:solidFill>
+                    <a:schemeClr val="lt1"/>
+                  </a:solidFill>
+                  <a:prstDash val="solid"/>
+                  <a:round/>
+                  <a:headEnd type="none" w="sm" len="sm"/>
+                  <a:tailEnd type="none" w="sm" len="sm"/>
+                </a:ln>
+              </p:spPr>
+              <p:txBody>
+                <a:bodyPr spcFirstLastPara="1" wrap="square" lIns="121900" tIns="121900" rIns="121900" bIns="121900" anchor="ctr" anchorCtr="0">
+                  <a:noAutofit/>
+                </a:bodyPr>
+                <a:lstStyle/>
+                <a:p>
+                  <a:pPr algn="ctr"/>
+                  <a:endParaRPr sz="2400"/>
+                </a:p>
+              </p:txBody>
+            </p:sp>
+            <p:sp>
+              <p:nvSpPr>
+                <p:cNvPr id="95" name="Google Shape;95;p19"/>
+                <p:cNvSpPr/>
+                <p:nvPr/>
+              </p:nvSpPr>
+              <p:spPr>
+                <a:xfrm flipH="1">
+                  <a:off x="4857187" y="854784"/>
+                  <a:ext cx="3657600" cy="3657600"/>
+                </a:xfrm>
+                <a:prstGeom prst="pie">
+                  <a:avLst>
+                    <a:gd name="adj1" fmla="val 10768123"/>
+                    <a:gd name="adj2" fmla="val 16200000"/>
+                  </a:avLst>
+                </a:prstGeom>
+                <a:solidFill>
+                  <a:srgbClr val="CAD1D8"/>
+                </a:solidFill>
+                <a:ln w="29775" cap="flat" cmpd="sng">
+                  <a:solidFill>
+                    <a:schemeClr val="lt1"/>
+                  </a:solidFill>
+                  <a:prstDash val="solid"/>
+                  <a:round/>
+                  <a:headEnd type="none" w="sm" len="sm"/>
+                  <a:tailEnd type="none" w="sm" len="sm"/>
+                </a:ln>
+              </p:spPr>
+              <p:txBody>
+                <a:bodyPr spcFirstLastPara="1" wrap="square" lIns="339100" tIns="339100" rIns="339100" bIns="339100" anchor="ctr" anchorCtr="0">
+                  <a:noAutofit/>
+                </a:bodyPr>
+                <a:lstStyle/>
+                <a:p>
+                  <a:pPr algn="ctr"/>
+                  <a:endParaRPr sz="5192"/>
+                </a:p>
+              </p:txBody>
+            </p:sp>
+            <p:sp>
+              <p:nvSpPr>
+                <p:cNvPr id="96" name="Google Shape;96;p19"/>
+                <p:cNvSpPr/>
+                <p:nvPr/>
+              </p:nvSpPr>
+              <p:spPr>
+                <a:xfrm rot="10800000" flipH="1">
+                  <a:off x="4857186" y="860709"/>
+                  <a:ext cx="3657600" cy="3657600"/>
+                </a:xfrm>
+                <a:prstGeom prst="pie">
+                  <a:avLst>
+                    <a:gd name="adj1" fmla="val 10768123"/>
+                    <a:gd name="adj2" fmla="val 16200000"/>
+                  </a:avLst>
+                </a:prstGeom>
+                <a:solidFill>
+                  <a:srgbClr val="E4EDDB"/>
+                </a:solidFill>
+                <a:ln w="29775" cap="flat" cmpd="sng">
+                  <a:solidFill>
+                    <a:schemeClr val="lt1"/>
+                  </a:solidFill>
+                  <a:prstDash val="solid"/>
+                  <a:round/>
+                  <a:headEnd type="none" w="sm" len="sm"/>
+                  <a:tailEnd type="none" w="sm" len="sm"/>
+                </a:ln>
+              </p:spPr>
+              <p:txBody>
+                <a:bodyPr spcFirstLastPara="1" wrap="square" lIns="339100" tIns="339100" rIns="339100" bIns="339100" anchor="ctr" anchorCtr="0">
+                  <a:noAutofit/>
+                </a:bodyPr>
+                <a:lstStyle/>
+                <a:p>
+                  <a:pPr algn="ctr"/>
+                  <a:endParaRPr sz="5192"/>
+                </a:p>
+              </p:txBody>
+            </p:sp>
+            <p:sp>
+              <p:nvSpPr>
+                <p:cNvPr id="97" name="Google Shape;97;p19"/>
+                <p:cNvSpPr/>
+                <p:nvPr/>
+              </p:nvSpPr>
+              <p:spPr>
+                <a:xfrm rot="10800000">
+                  <a:off x="4857187" y="860709"/>
+                  <a:ext cx="3657600" cy="3657600"/>
+                </a:xfrm>
+                <a:prstGeom prst="pie">
+                  <a:avLst>
+                    <a:gd name="adj1" fmla="val 10768123"/>
+                    <a:gd name="adj2" fmla="val 16200000"/>
+                  </a:avLst>
+                </a:prstGeom>
+                <a:solidFill>
+                  <a:srgbClr val="FEE1D3"/>
+                </a:solidFill>
+                <a:ln w="29775" cap="flat" cmpd="sng">
+                  <a:solidFill>
+                    <a:schemeClr val="lt1"/>
+                  </a:solidFill>
+                  <a:prstDash val="solid"/>
+                  <a:round/>
+                  <a:headEnd type="none" w="sm" len="sm"/>
+                  <a:tailEnd type="none" w="sm" len="sm"/>
+                </a:ln>
+              </p:spPr>
+              <p:txBody>
+                <a:bodyPr spcFirstLastPara="1" wrap="square" lIns="339100" tIns="339100" rIns="339100" bIns="339100" anchor="ctr" anchorCtr="0">
+                  <a:noAutofit/>
+                </a:bodyPr>
+                <a:lstStyle/>
+                <a:p>
+                  <a:pPr algn="ctr"/>
+                  <a:endParaRPr sz="5192"/>
+                </a:p>
+              </p:txBody>
+            </p:sp>
+            <p:sp>
+              <p:nvSpPr>
+                <p:cNvPr id="98" name="Google Shape;98;p19"/>
+                <p:cNvSpPr/>
+                <p:nvPr/>
+              </p:nvSpPr>
+              <p:spPr>
+                <a:xfrm>
+                  <a:off x="5085775" y="1089300"/>
+                  <a:ext cx="3200400" cy="3200400"/>
+                </a:xfrm>
+                <a:prstGeom prst="flowChartOr">
+                  <a:avLst/>
+                </a:prstGeom>
+                <a:solidFill>
+                  <a:srgbClr val="305698"/>
+                </a:solidFill>
+                <a:ln w="25000" cap="flat" cmpd="sng">
+                  <a:solidFill>
+                    <a:schemeClr val="lt1"/>
+                  </a:solidFill>
+                  <a:prstDash val="solid"/>
+                  <a:round/>
+                  <a:headEnd type="none" w="sm" len="sm"/>
+                  <a:tailEnd type="none" w="sm" len="sm"/>
+                </a:ln>
+              </p:spPr>
+              <p:txBody>
+                <a:bodyPr spcFirstLastPara="1" wrap="square" lIns="106667" tIns="106667" rIns="106667" bIns="106667" anchor="ctr" anchorCtr="0">
+                  <a:noAutofit/>
+                </a:bodyPr>
+                <a:lstStyle/>
+                <a:p>
+                  <a:pPr algn="ctr"/>
+                  <a:endParaRPr sz="1632"/>
+                </a:p>
+              </p:txBody>
+            </p:sp>
+            <p:sp>
+              <p:nvSpPr>
+                <p:cNvPr id="99" name="Google Shape;99;p19"/>
+                <p:cNvSpPr/>
+                <p:nvPr/>
+              </p:nvSpPr>
+              <p:spPr>
+                <a:xfrm flipH="1">
+                  <a:off x="5085787" y="1089309"/>
+                  <a:ext cx="3200400" cy="3200400"/>
+                </a:xfrm>
+                <a:prstGeom prst="pie">
+                  <a:avLst>
+                    <a:gd name="adj1" fmla="val 10768123"/>
+                    <a:gd name="adj2" fmla="val 16200000"/>
+                  </a:avLst>
+                </a:prstGeom>
+                <a:solidFill>
+                  <a:srgbClr val="1F295B"/>
+                </a:solidFill>
+                <a:ln w="26050" cap="flat" cmpd="sng">
+                  <a:solidFill>
+                    <a:schemeClr val="lt1"/>
+                  </a:solidFill>
+                  <a:prstDash val="solid"/>
+                  <a:round/>
+                  <a:headEnd type="none" w="sm" len="sm"/>
+                  <a:tailEnd type="none" w="sm" len="sm"/>
+                </a:ln>
+              </p:spPr>
+              <p:txBody>
+                <a:bodyPr spcFirstLastPara="1" wrap="square" lIns="296733" tIns="296733" rIns="296733" bIns="296733" anchor="ctr" anchorCtr="0">
+                  <a:noAutofit/>
+                </a:bodyPr>
+                <a:lstStyle/>
+                <a:p>
+                  <a:pPr algn="ctr"/>
+                  <a:endParaRPr sz="4543"/>
+                </a:p>
+              </p:txBody>
+            </p:sp>
+            <p:sp>
+              <p:nvSpPr>
+                <p:cNvPr id="100" name="Google Shape;100;p19"/>
+                <p:cNvSpPr/>
+                <p:nvPr/>
+              </p:nvSpPr>
+              <p:spPr>
+                <a:xfrm rot="10800000" flipH="1">
+                  <a:off x="5085786" y="1089309"/>
+                  <a:ext cx="3200400" cy="3200400"/>
+                </a:xfrm>
+                <a:prstGeom prst="pie">
+                  <a:avLst>
+                    <a:gd name="adj1" fmla="val 10768123"/>
+                    <a:gd name="adj2" fmla="val 16200000"/>
+                  </a:avLst>
+                </a:prstGeom>
+                <a:solidFill>
+                  <a:srgbClr val="71AD49"/>
+                </a:solidFill>
+                <a:ln w="26050" cap="flat" cmpd="sng">
+                  <a:solidFill>
+                    <a:schemeClr val="lt1"/>
+                  </a:solidFill>
+                  <a:prstDash val="solid"/>
+                  <a:round/>
+                  <a:headEnd type="none" w="sm" len="sm"/>
+                  <a:tailEnd type="none" w="sm" len="sm"/>
+                </a:ln>
+              </p:spPr>
+              <p:txBody>
+                <a:bodyPr spcFirstLastPara="1" wrap="square" lIns="296733" tIns="296733" rIns="296733" bIns="296733" anchor="ctr" anchorCtr="0">
+                  <a:noAutofit/>
+                </a:bodyPr>
+                <a:lstStyle/>
+                <a:p>
+                  <a:pPr algn="ctr"/>
+                  <a:endParaRPr sz="4543"/>
+                </a:p>
+              </p:txBody>
+            </p:sp>
+            <p:sp>
+              <p:nvSpPr>
+                <p:cNvPr id="101" name="Google Shape;101;p19"/>
+                <p:cNvSpPr/>
+                <p:nvPr/>
+              </p:nvSpPr>
+              <p:spPr>
+                <a:xfrm rot="10800000">
+                  <a:off x="5085787" y="1083384"/>
+                  <a:ext cx="3200400" cy="3200400"/>
+                </a:xfrm>
+                <a:prstGeom prst="pie">
+                  <a:avLst>
+                    <a:gd name="adj1" fmla="val 10768123"/>
+                    <a:gd name="adj2" fmla="val 16200000"/>
+                  </a:avLst>
+                </a:prstGeom>
+                <a:solidFill>
+                  <a:srgbClr val="EE7B2F"/>
+                </a:solidFill>
+                <a:ln w="26050" cap="flat" cmpd="sng">
+                  <a:solidFill>
+                    <a:schemeClr val="lt1"/>
+                  </a:solidFill>
+                  <a:prstDash val="solid"/>
+                  <a:round/>
+                  <a:headEnd type="none" w="sm" len="sm"/>
+                  <a:tailEnd type="none" w="sm" len="sm"/>
+                </a:ln>
+              </p:spPr>
+              <p:txBody>
+                <a:bodyPr spcFirstLastPara="1" wrap="square" lIns="296733" tIns="296733" rIns="296733" bIns="296733" anchor="ctr" anchorCtr="0">
+                  <a:noAutofit/>
+                </a:bodyPr>
+                <a:lstStyle/>
+                <a:p>
+                  <a:pPr algn="ctr"/>
+                  <a:endParaRPr sz="4543"/>
+                </a:p>
+              </p:txBody>
+            </p:sp>
+            <p:pic>
+              <p:nvPicPr>
+                <p:cNvPr id="102" name="Google Shape;102;p19" title="EBM (1).png"/>
+                <p:cNvPicPr preferRelativeResize="0"/>
+                <p:nvPr/>
+              </p:nvPicPr>
+              <p:blipFill>
+                <a:blip r:embed="rId3">
+                  <a:alphaModFix/>
+                </a:blip>
+                <a:stretch>
+                  <a:fillRect/>
+                </a:stretch>
+              </p:blipFill>
+              <p:spPr>
+                <a:xfrm>
+                  <a:off x="5540875" y="1538475"/>
+                  <a:ext cx="2290200" cy="2290200"/>
+                </a:xfrm>
+                <a:prstGeom prst="ellipse">
+                  <a:avLst/>
+                </a:prstGeom>
+                <a:noFill/>
+                <a:ln>
+                  <a:noFill/>
+                </a:ln>
+              </p:spPr>
+            </p:pic>
+            <p:pic>
+              <p:nvPicPr>
+                <p:cNvPr id="103" name="Google Shape;103;p19"/>
+                <p:cNvPicPr preferRelativeResize="0"/>
+                <p:nvPr/>
+              </p:nvPicPr>
+              <p:blipFill>
+                <a:blip r:embed="rId4">
+                  <a:alphaModFix/>
+                </a:blip>
+                <a:stretch>
+                  <a:fillRect/>
+                </a:stretch>
+              </p:blipFill>
+              <p:spPr>
+                <a:xfrm rot="1769116">
+                  <a:off x="4927740" y="910274"/>
+                  <a:ext cx="2861725" cy="2861725"/>
+                </a:xfrm>
+                <a:prstGeom prst="rect">
+                  <a:avLst/>
+                </a:prstGeom>
+                <a:noFill/>
+                <a:ln>
+                  <a:noFill/>
+                </a:ln>
+              </p:spPr>
+            </p:pic>
+            <p:pic>
+              <p:nvPicPr>
+                <p:cNvPr id="104" name="Google Shape;104;p19"/>
+                <p:cNvPicPr preferRelativeResize="0"/>
+                <p:nvPr/>
+              </p:nvPicPr>
+              <p:blipFill>
+                <a:blip r:embed="rId5">
+                  <a:alphaModFix/>
+                </a:blip>
+                <a:stretch>
+                  <a:fillRect/>
+                </a:stretch>
+              </p:blipFill>
+              <p:spPr>
+                <a:xfrm rot="6693886">
+                  <a:off x="5773310" y="913823"/>
+                  <a:ext cx="2527642" cy="2527642"/>
+                </a:xfrm>
+                <a:prstGeom prst="rect">
+                  <a:avLst/>
+                </a:prstGeom>
+                <a:noFill/>
+                <a:ln>
+                  <a:noFill/>
+                </a:ln>
+              </p:spPr>
+            </p:pic>
+            <p:pic>
+              <p:nvPicPr>
+                <p:cNvPr id="105" name="Google Shape;105;p19"/>
+                <p:cNvPicPr preferRelativeResize="0"/>
+                <p:nvPr/>
+              </p:nvPicPr>
+              <p:blipFill>
+                <a:blip r:embed="rId6">
+                  <a:alphaModFix/>
+                </a:blip>
+                <a:stretch>
+                  <a:fillRect/>
+                </a:stretch>
+              </p:blipFill>
+              <p:spPr>
+                <a:xfrm rot="-2029044">
+                  <a:off x="5238118" y="2466140"/>
+                  <a:ext cx="3624800" cy="2018875"/>
+                </a:xfrm>
+                <a:prstGeom prst="rect">
+                  <a:avLst/>
+                </a:prstGeom>
+                <a:noFill/>
+                <a:ln>
+                  <a:noFill/>
+                </a:ln>
+              </p:spPr>
+            </p:pic>
+            <p:pic>
+              <p:nvPicPr>
+                <p:cNvPr id="106" name="Google Shape;106;p19"/>
+                <p:cNvPicPr preferRelativeResize="0"/>
+                <p:nvPr/>
+              </p:nvPicPr>
+              <p:blipFill>
+                <a:blip r:embed="rId7">
+                  <a:alphaModFix/>
+                </a:blip>
+                <a:stretch>
+                  <a:fillRect/>
+                </a:stretch>
+              </p:blipFill>
+              <p:spPr>
+                <a:xfrm rot="-7729510">
+                  <a:off x="5542292" y="1232118"/>
+                  <a:ext cx="3708895" cy="2065714"/>
+                </a:xfrm>
+                <a:prstGeom prst="rect">
+                  <a:avLst/>
+                </a:prstGeom>
+                <a:noFill/>
+                <a:ln>
+                  <a:noFill/>
+                </a:ln>
+              </p:spPr>
+            </p:pic>
+          </p:grpSp>
+          <p:sp>
+            <p:nvSpPr>
+              <p:cNvPr id="107" name="Google Shape;107;p19"/>
+              <p:cNvSpPr txBox="1"/>
+              <p:nvPr/>
+            </p:nvSpPr>
+            <p:spPr>
+              <a:xfrm rot="18002361">
+                <a:off x="2857100" y="1967627"/>
+                <a:ext cx="803644" cy="153841"/>
+              </a:xfrm>
+              <a:prstGeom prst="rect">
+                <a:avLst/>
+              </a:prstGeom>
+              <a:noFill/>
+              <a:ln>
+                <a:noFill/>
+              </a:ln>
+            </p:spPr>
+            <p:txBody>
+              <a:bodyPr spcFirstLastPara="1" wrap="square" lIns="0" tIns="0" rIns="0" bIns="0" anchor="t" anchorCtr="0">
+                <a:spAutoFit/>
+              </a:bodyPr>
+              <a:lstStyle/>
+              <a:p>
+                <a:r>
+                  <a:rPr lang="en" sz="1333">
+                    <a:solidFill>
+                      <a:schemeClr val="lt1"/>
+                    </a:solidFill>
+                  </a:rPr>
+                  <a:t>Measurement</a:t>
+                </a:r>
+                <a:endParaRPr sz="1333">
+                  <a:solidFill>
+                    <a:schemeClr val="lt1"/>
+                  </a:solidFill>
+                </a:endParaRPr>
+              </a:p>
+            </p:txBody>
+          </p:sp>
+          <p:sp>
+            <p:nvSpPr>
+              <p:cNvPr id="108" name="Google Shape;108;p19"/>
+              <p:cNvSpPr txBox="1"/>
+              <p:nvPr/>
+            </p:nvSpPr>
+            <p:spPr>
+              <a:xfrm rot="20399580">
+                <a:off x="3642409" y="1372598"/>
+                <a:ext cx="553291" cy="153841"/>
+              </a:xfrm>
+              <a:prstGeom prst="rect">
+                <a:avLst/>
+              </a:prstGeom>
+              <a:noFill/>
+              <a:ln>
+                <a:noFill/>
+              </a:ln>
+            </p:spPr>
+            <p:txBody>
+              <a:bodyPr spcFirstLastPara="1" wrap="square" lIns="0" tIns="0" rIns="0" bIns="0" anchor="t" anchorCtr="0">
+                <a:spAutoFit/>
+              </a:bodyPr>
+              <a:lstStyle/>
+              <a:p>
+                <a:r>
+                  <a:rPr lang="en" sz="1333">
+                    <a:solidFill>
+                      <a:schemeClr val="lt1"/>
+                    </a:solidFill>
+                  </a:rPr>
+                  <a:t>Analysis</a:t>
+                </a:r>
+                <a:endParaRPr sz="1333">
+                  <a:solidFill>
+                    <a:schemeClr val="lt1"/>
+                  </a:solidFill>
+                </a:endParaRPr>
+              </a:p>
+            </p:txBody>
+          </p:sp>
+          <p:sp>
+            <p:nvSpPr>
+              <p:cNvPr id="109" name="Google Shape;109;p19"/>
+              <p:cNvSpPr txBox="1"/>
+              <p:nvPr/>
+            </p:nvSpPr>
+            <p:spPr>
+              <a:xfrm rot="1193697">
+                <a:off x="4649927" y="1372599"/>
+                <a:ext cx="632977" cy="153841"/>
+              </a:xfrm>
+              <a:prstGeom prst="rect">
+                <a:avLst/>
+              </a:prstGeom>
+              <a:noFill/>
+              <a:ln>
+                <a:noFill/>
+              </a:ln>
+            </p:spPr>
+            <p:txBody>
+              <a:bodyPr spcFirstLastPara="1" wrap="square" lIns="0" tIns="0" rIns="0" bIns="0" anchor="t" anchorCtr="0">
+                <a:spAutoFit/>
+              </a:bodyPr>
+              <a:lstStyle/>
+              <a:p>
+                <a:r>
+                  <a:rPr lang="en" sz="1333">
+                    <a:solidFill>
+                      <a:schemeClr val="lt1"/>
+                    </a:solidFill>
+                  </a:rPr>
+                  <a:t>Guidelines</a:t>
+                </a:r>
+                <a:endParaRPr sz="1333">
+                  <a:solidFill>
+                    <a:schemeClr val="lt1"/>
+                  </a:solidFill>
+                </a:endParaRPr>
+              </a:p>
+            </p:txBody>
+          </p:sp>
+          <p:sp>
+            <p:nvSpPr>
+              <p:cNvPr id="110" name="Google Shape;110;p19"/>
+              <p:cNvSpPr txBox="1"/>
+              <p:nvPr/>
+            </p:nvSpPr>
+            <p:spPr>
+              <a:xfrm rot="3598626">
+                <a:off x="5337240" y="1900018"/>
+                <a:ext cx="582796" cy="307681"/>
+              </a:xfrm>
+              <a:prstGeom prst="rect">
+                <a:avLst/>
+              </a:prstGeom>
+              <a:noFill/>
+              <a:ln>
+                <a:noFill/>
+              </a:ln>
+            </p:spPr>
+            <p:txBody>
+              <a:bodyPr spcFirstLastPara="1" wrap="square" lIns="0" tIns="0" rIns="0" bIns="0" anchor="t" anchorCtr="0">
+                <a:spAutoFit/>
+              </a:bodyPr>
+              <a:lstStyle/>
+              <a:p>
+                <a:pPr algn="ctr"/>
+                <a:r>
+                  <a:rPr lang="en" sz="1333">
+                    <a:solidFill>
+                      <a:schemeClr val="lt1"/>
+                    </a:solidFill>
+                  </a:rPr>
+                  <a:t>Decision</a:t>
+                </a:r>
+                <a:endParaRPr sz="1333">
+                  <a:solidFill>
+                    <a:schemeClr val="lt1"/>
+                  </a:solidFill>
+                </a:endParaRPr>
+              </a:p>
+              <a:p>
+                <a:pPr algn="ctr"/>
+                <a:r>
+                  <a:rPr lang="en" sz="1333">
+                    <a:solidFill>
+                      <a:schemeClr val="lt1"/>
+                    </a:solidFill>
+                  </a:rPr>
+                  <a:t>Support</a:t>
+                </a:r>
+                <a:endParaRPr sz="1333">
+                  <a:solidFill>
+                    <a:schemeClr val="lt1"/>
+                  </a:solidFill>
+                </a:endParaRPr>
+              </a:p>
+            </p:txBody>
+          </p:sp>
+          <p:sp>
+            <p:nvSpPr>
+              <p:cNvPr id="111" name="Google Shape;111;p19"/>
+              <p:cNvSpPr txBox="1"/>
+              <p:nvPr/>
+            </p:nvSpPr>
+            <p:spPr>
+              <a:xfrm rot="1193697">
+                <a:off x="3588541" y="3850856"/>
+                <a:ext cx="632977" cy="153841"/>
+              </a:xfrm>
+              <a:prstGeom prst="rect">
+                <a:avLst/>
+              </a:prstGeom>
+              <a:noFill/>
+              <a:ln>
+                <a:noFill/>
+              </a:ln>
+            </p:spPr>
+            <p:txBody>
+              <a:bodyPr spcFirstLastPara="1" wrap="square" lIns="0" tIns="0" rIns="0" bIns="0" anchor="t" anchorCtr="0">
+                <a:spAutoFit/>
+              </a:bodyPr>
+              <a:lstStyle/>
+              <a:p>
+                <a:r>
+                  <a:rPr lang="en" sz="1333">
+                    <a:solidFill>
+                      <a:schemeClr val="lt1"/>
+                    </a:solidFill>
+                  </a:rPr>
+                  <a:t>Collection</a:t>
+                </a:r>
+                <a:endParaRPr sz="1333">
+                  <a:solidFill>
+                    <a:schemeClr val="lt1"/>
+                  </a:solidFill>
+                </a:endParaRPr>
+              </a:p>
+            </p:txBody>
+          </p:sp>
+          <p:sp>
+            <p:nvSpPr>
+              <p:cNvPr id="112" name="Google Shape;112;p19"/>
+              <p:cNvSpPr txBox="1"/>
+              <p:nvPr/>
+            </p:nvSpPr>
+            <p:spPr>
+              <a:xfrm rot="3598626">
+                <a:off x="2952757" y="3228270"/>
+                <a:ext cx="582796" cy="153841"/>
+              </a:xfrm>
+              <a:prstGeom prst="rect">
+                <a:avLst/>
+              </a:prstGeom>
+              <a:noFill/>
+              <a:ln>
+                <a:noFill/>
+              </a:ln>
+            </p:spPr>
+            <p:txBody>
+              <a:bodyPr spcFirstLastPara="1" wrap="square" lIns="0" tIns="0" rIns="0" bIns="0" anchor="t" anchorCtr="0">
+                <a:spAutoFit/>
+              </a:bodyPr>
+              <a:lstStyle/>
+              <a:p>
+                <a:pPr algn="ctr"/>
+                <a:r>
+                  <a:rPr lang="en" sz="1333">
+                    <a:solidFill>
+                      <a:schemeClr val="lt1"/>
+                    </a:solidFill>
+                  </a:rPr>
+                  <a:t>Reporting</a:t>
+                </a:r>
+                <a:endParaRPr sz="1333">
+                  <a:solidFill>
+                    <a:schemeClr val="lt1"/>
+                  </a:solidFill>
+                </a:endParaRPr>
+              </a:p>
+            </p:txBody>
+          </p:sp>
+          <p:sp>
+            <p:nvSpPr>
+              <p:cNvPr id="113" name="Google Shape;113;p19"/>
+              <p:cNvSpPr txBox="1"/>
+              <p:nvPr/>
+            </p:nvSpPr>
+            <p:spPr>
+              <a:xfrm rot="18000994">
+                <a:off x="5169158" y="3116484"/>
+                <a:ext cx="918140" cy="307681"/>
+              </a:xfrm>
+              <a:prstGeom prst="rect">
+                <a:avLst/>
+              </a:prstGeom>
+              <a:noFill/>
+              <a:ln>
+                <a:noFill/>
+              </a:ln>
+            </p:spPr>
+            <p:txBody>
+              <a:bodyPr spcFirstLastPara="1" wrap="square" lIns="0" tIns="0" rIns="0" bIns="0" anchor="t" anchorCtr="0">
+                <a:spAutoFit/>
+              </a:bodyPr>
+              <a:lstStyle/>
+              <a:p>
+                <a:pPr algn="ctr"/>
+                <a:r>
+                  <a:rPr lang="en" sz="1333">
+                    <a:solidFill>
+                      <a:schemeClr val="lt1"/>
+                    </a:solidFill>
+                  </a:rPr>
+                  <a:t>Workflow</a:t>
+                </a:r>
+                <a:endParaRPr sz="1333">
+                  <a:solidFill>
+                    <a:schemeClr val="lt1"/>
+                  </a:solidFill>
+                </a:endParaRPr>
+              </a:p>
+              <a:p>
+                <a:pPr algn="ctr"/>
+                <a:r>
+                  <a:rPr lang="en" sz="1333">
+                    <a:solidFill>
+                      <a:schemeClr val="lt1"/>
+                    </a:solidFill>
+                  </a:rPr>
+                  <a:t>Implementation</a:t>
+                </a:r>
+                <a:endParaRPr sz="1333">
+                  <a:solidFill>
+                    <a:schemeClr val="lt1"/>
+                  </a:solidFill>
+                </a:endParaRPr>
+              </a:p>
+            </p:txBody>
+          </p:sp>
+          <p:sp>
+            <p:nvSpPr>
+              <p:cNvPr id="114" name="Google Shape;114;p19"/>
+              <p:cNvSpPr txBox="1"/>
+              <p:nvPr/>
+            </p:nvSpPr>
+            <p:spPr>
+              <a:xfrm rot="20399580">
+                <a:off x="4686624" y="3787167"/>
+                <a:ext cx="553291" cy="307681"/>
+              </a:xfrm>
+              <a:prstGeom prst="rect">
+                <a:avLst/>
+              </a:prstGeom>
+              <a:noFill/>
+              <a:ln>
+                <a:noFill/>
+              </a:ln>
+            </p:spPr>
+            <p:txBody>
+              <a:bodyPr spcFirstLastPara="1" wrap="square" lIns="0" tIns="0" rIns="0" bIns="0" anchor="t" anchorCtr="0">
+                <a:spAutoFit/>
+              </a:bodyPr>
+              <a:lstStyle/>
+              <a:p>
+                <a:pPr algn="ctr"/>
+                <a:r>
+                  <a:rPr lang="en" sz="1333">
+                    <a:solidFill>
+                      <a:schemeClr val="lt1"/>
+                    </a:solidFill>
+                  </a:rPr>
+                  <a:t>Clinical</a:t>
+                </a:r>
+                <a:endParaRPr sz="1333">
+                  <a:solidFill>
+                    <a:schemeClr val="lt1"/>
+                  </a:solidFill>
+                </a:endParaRPr>
+              </a:p>
+              <a:p>
+                <a:pPr algn="ctr"/>
+                <a:r>
+                  <a:rPr lang="en" sz="1333">
+                    <a:solidFill>
+                      <a:schemeClr val="lt1"/>
+                    </a:solidFill>
+                  </a:rPr>
+                  <a:t>Care</a:t>
+                </a:r>
+                <a:endParaRPr sz="1333">
+                  <a:solidFill>
+                    <a:schemeClr val="lt1"/>
+                  </a:solidFill>
+                </a:endParaRPr>
+              </a:p>
+            </p:txBody>
+          </p:sp>
+          <p:sp>
+            <p:nvSpPr>
+              <p:cNvPr id="115" name="Google Shape;115;p19"/>
+              <p:cNvSpPr/>
+              <p:nvPr/>
+            </p:nvSpPr>
+            <p:spPr>
+              <a:xfrm rot="5400000">
+                <a:off x="4343136" y="702075"/>
+                <a:ext cx="91500" cy="91500"/>
+              </a:xfrm>
+              <a:prstGeom prst="triangle">
+                <a:avLst>
+                  <a:gd name="adj" fmla="val 50000"/>
+                </a:avLst>
+              </a:prstGeom>
+              <a:solidFill>
+                <a:schemeClr val="dk2"/>
+              </a:solidFill>
+              <a:ln w="19050" cap="flat" cmpd="sng">
+                <a:solidFill>
+                  <a:schemeClr val="lt1"/>
+                </a:solidFill>
+                <a:prstDash val="solid"/>
+                <a:round/>
+                <a:headEnd type="none" w="sm" len="sm"/>
+                <a:tailEnd type="none" w="sm" len="sm"/>
+              </a:ln>
+            </p:spPr>
+            <p:txBody>
+              <a:bodyPr spcFirstLastPara="1" wrap="square" lIns="112000" tIns="112000" rIns="112000" bIns="112000" anchor="ctr" anchorCtr="0">
+                <a:noAutofit/>
+              </a:bodyPr>
+              <a:lstStyle/>
+              <a:p>
+                <a:pPr algn="ctr"/>
+                <a:endParaRPr sz="1716"/>
+              </a:p>
+            </p:txBody>
+          </p:sp>
+          <p:sp>
+            <p:nvSpPr>
+              <p:cNvPr id="116" name="Google Shape;116;p19"/>
+              <p:cNvSpPr/>
+              <p:nvPr/>
+            </p:nvSpPr>
+            <p:spPr>
+              <a:xfrm rot="10800000">
+                <a:off x="6326363" y="2583344"/>
+                <a:ext cx="91500" cy="91500"/>
+              </a:xfrm>
+              <a:prstGeom prst="triangle">
+                <a:avLst>
+                  <a:gd name="adj" fmla="val 50000"/>
+                </a:avLst>
+              </a:prstGeom>
+              <a:solidFill>
+                <a:schemeClr val="dk2"/>
+              </a:solidFill>
+              <a:ln w="19050" cap="flat" cmpd="sng">
+                <a:solidFill>
+                  <a:schemeClr val="lt1"/>
+                </a:solidFill>
+                <a:prstDash val="solid"/>
+                <a:round/>
+                <a:headEnd type="none" w="sm" len="sm"/>
+                <a:tailEnd type="none" w="sm" len="sm"/>
+              </a:ln>
+            </p:spPr>
+            <p:txBody>
+              <a:bodyPr spcFirstLastPara="1" wrap="square" lIns="112000" tIns="112000" rIns="112000" bIns="112000" anchor="ctr" anchorCtr="0">
+                <a:noAutofit/>
+              </a:bodyPr>
+              <a:lstStyle/>
+              <a:p>
+                <a:pPr algn="ctr"/>
+                <a:endParaRPr sz="1716"/>
+              </a:p>
+            </p:txBody>
+          </p:sp>
+          <p:sp>
+            <p:nvSpPr>
+              <p:cNvPr id="117" name="Google Shape;117;p19"/>
+              <p:cNvSpPr/>
+              <p:nvPr/>
+            </p:nvSpPr>
+            <p:spPr>
+              <a:xfrm rot="-5400000" flipH="1">
+                <a:off x="4418193" y="4584446"/>
+                <a:ext cx="91500" cy="91500"/>
+              </a:xfrm>
+              <a:prstGeom prst="triangle">
+                <a:avLst>
+                  <a:gd name="adj" fmla="val 50000"/>
+                </a:avLst>
+              </a:prstGeom>
+              <a:solidFill>
+                <a:schemeClr val="dk2"/>
+              </a:solidFill>
+              <a:ln w="19050" cap="flat" cmpd="sng">
+                <a:solidFill>
+                  <a:schemeClr val="lt1"/>
+                </a:solidFill>
+                <a:prstDash val="solid"/>
+                <a:round/>
+                <a:headEnd type="none" w="sm" len="sm"/>
+                <a:tailEnd type="none" w="sm" len="sm"/>
+              </a:ln>
+            </p:spPr>
+            <p:txBody>
+              <a:bodyPr spcFirstLastPara="1" wrap="square" lIns="112000" tIns="112000" rIns="112000" bIns="112000" anchor="ctr" anchorCtr="0">
+                <a:noAutofit/>
+              </a:bodyPr>
+              <a:lstStyle/>
+              <a:p>
+                <a:pPr algn="ctr"/>
+                <a:endParaRPr sz="1716"/>
+              </a:p>
+            </p:txBody>
+          </p:sp>
+          <p:pic>
+            <p:nvPicPr>
+              <p:cNvPr id="118" name="Google Shape;118;p19"/>
+              <p:cNvPicPr preferRelativeResize="0"/>
+              <p:nvPr/>
+            </p:nvPicPr>
+            <p:blipFill>
+              <a:blip r:embed="rId8">
+                <a:alphaModFix/>
+              </a:blip>
+              <a:stretch>
+                <a:fillRect/>
+              </a:stretch>
+            </p:blipFill>
+            <p:spPr>
+              <a:xfrm rot="6898124">
+                <a:off x="3891347" y="1671880"/>
+                <a:ext cx="3200360" cy="1781578"/>
+              </a:xfrm>
+              <a:prstGeom prst="rect">
+                <a:avLst/>
+              </a:prstGeom>
+              <a:noFill/>
+              <a:ln>
+                <a:noFill/>
+              </a:ln>
+            </p:spPr>
+          </p:pic>
+          <p:pic>
+            <p:nvPicPr>
+              <p:cNvPr id="119" name="Google Shape;119;p19"/>
+              <p:cNvPicPr preferRelativeResize="0"/>
+              <p:nvPr/>
+            </p:nvPicPr>
+            <p:blipFill>
+              <a:blip r:embed="rId9">
+                <a:alphaModFix/>
+              </a:blip>
+              <a:stretch>
+                <a:fillRect/>
+              </a:stretch>
+            </p:blipFill>
+            <p:spPr>
+              <a:xfrm rot="-765429">
+                <a:off x="2069657" y="1028243"/>
+                <a:ext cx="3198703" cy="1781556"/>
+              </a:xfrm>
+              <a:prstGeom prst="rect">
+                <a:avLst/>
+              </a:prstGeom>
+              <a:noFill/>
+              <a:ln>
+                <a:noFill/>
+              </a:ln>
+            </p:spPr>
+          </p:pic>
+          <p:pic>
+            <p:nvPicPr>
+              <p:cNvPr id="120" name="Google Shape;120;p19"/>
+              <p:cNvPicPr preferRelativeResize="0"/>
+              <p:nvPr/>
+            </p:nvPicPr>
+            <p:blipFill>
+              <a:blip r:embed="rId10">
+                <a:alphaModFix/>
+              </a:blip>
+              <a:stretch>
+                <a:fillRect/>
+              </a:stretch>
+            </p:blipFill>
+            <p:spPr>
+              <a:xfrm rot="-5890520">
+                <a:off x="3799275" y="2316050"/>
+                <a:ext cx="3198702" cy="1781556"/>
+              </a:xfrm>
+              <a:prstGeom prst="rect">
+                <a:avLst/>
+              </a:prstGeom>
+              <a:noFill/>
+              <a:ln>
+                <a:noFill/>
+              </a:ln>
+            </p:spPr>
+          </p:pic>
+        </p:grpSp>
+        <p:pic>
+          <p:nvPicPr>
+            <p:cNvPr id="121" name="Google Shape;121;p19" title="EBM (1).png"/>
+            <p:cNvPicPr preferRelativeResize="0"/>
+            <p:nvPr/>
+          </p:nvPicPr>
+          <p:blipFill>
+            <a:blip r:embed="rId3">
+              <a:alphaModFix/>
+            </a:blip>
+            <a:stretch>
+              <a:fillRect/>
+            </a:stretch>
+          </p:blipFill>
+          <p:spPr>
+            <a:xfrm flipH="1">
+              <a:off x="3291667" y="1539771"/>
+              <a:ext cx="2286000" cy="2286000"/>
+            </a:xfrm>
+            <a:prstGeom prst="ellipse">
+              <a:avLst/>
+            </a:prstGeom>
+            <a:noFill/>
+            <a:ln>
+              <a:noFill/>
+            </a:ln>
+          </p:spPr>
+        </p:pic>
+        <p:sp>
+          <p:nvSpPr>
+            <p:cNvPr id="122" name="Google Shape;122;p19"/>
+            <p:cNvSpPr txBox="1"/>
+            <p:nvPr/>
+          </p:nvSpPr>
+          <p:spPr>
+            <a:xfrm rot="21596460">
+              <a:off x="4003728" y="3244542"/>
+              <a:ext cx="582600" cy="123159"/>
+            </a:xfrm>
+            <a:prstGeom prst="rect">
+              <a:avLst/>
+            </a:prstGeom>
+            <a:noFill/>
+            <a:ln>
+              <a:noFill/>
+            </a:ln>
+          </p:spPr>
+          <p:txBody>
+            <a:bodyPr spcFirstLastPara="1" wrap="square" lIns="0" tIns="0" rIns="0" bIns="0" anchor="t" anchorCtr="0">
+              <a:spAutoFit/>
+            </a:bodyPr>
+            <a:lstStyle/>
+            <a:p>
+              <a:pPr algn="ctr"/>
+              <a:r>
+                <a:rPr lang="en" sz="1067">
+                  <a:solidFill>
+                    <a:srgbClr val="808080"/>
+                  </a:solidFill>
+                </a:rPr>
+                <a:t>Patient</a:t>
+              </a:r>
+              <a:endParaRPr sz="1067">
+                <a:solidFill>
+                  <a:srgbClr val="808080"/>
+                </a:solidFill>
+              </a:endParaRPr>
+            </a:p>
+          </p:txBody>
+        </p:sp>
+        <p:sp>
+          <p:nvSpPr>
+            <p:cNvPr id="123" name="Google Shape;123;p19"/>
+            <p:cNvSpPr txBox="1"/>
+            <p:nvPr/>
+          </p:nvSpPr>
+          <p:spPr>
+            <a:xfrm rot="21596460">
+              <a:off x="4586328" y="3060357"/>
+              <a:ext cx="582600" cy="123159"/>
+            </a:xfrm>
+            <a:prstGeom prst="rect">
+              <a:avLst/>
+            </a:prstGeom>
+            <a:noFill/>
+            <a:ln>
+              <a:noFill/>
+            </a:ln>
+          </p:spPr>
+          <p:txBody>
+            <a:bodyPr spcFirstLastPara="1" wrap="square" lIns="0" tIns="0" rIns="0" bIns="0" anchor="t" anchorCtr="0">
+              <a:spAutoFit/>
+            </a:bodyPr>
+            <a:lstStyle/>
+            <a:p>
+              <a:pPr algn="ctr"/>
+              <a:r>
+                <a:rPr lang="en" sz="1067">
+                  <a:solidFill>
+                    <a:srgbClr val="808080"/>
+                  </a:solidFill>
+                </a:rPr>
+                <a:t>Provider</a:t>
+              </a:r>
+              <a:endParaRPr sz="1067">
+                <a:solidFill>
+                  <a:srgbClr val="808080"/>
+                </a:solidFill>
+              </a:endParaRPr>
+            </a:p>
+          </p:txBody>
+        </p:sp>
+        <p:sp>
+          <p:nvSpPr>
+            <p:cNvPr id="124" name="Google Shape;124;p19"/>
+            <p:cNvSpPr txBox="1"/>
+            <p:nvPr/>
+          </p:nvSpPr>
+          <p:spPr>
+            <a:xfrm rot="21596460">
+              <a:off x="3743260" y="2228200"/>
+              <a:ext cx="582600" cy="123159"/>
+            </a:xfrm>
+            <a:prstGeom prst="rect">
+              <a:avLst/>
+            </a:prstGeom>
+            <a:noFill/>
+            <a:ln>
+              <a:noFill/>
+            </a:ln>
+          </p:spPr>
+          <p:txBody>
+            <a:bodyPr spcFirstLastPara="1" wrap="square" lIns="0" tIns="0" rIns="0" bIns="0" anchor="t" anchorCtr="0">
+              <a:spAutoFit/>
+            </a:bodyPr>
+            <a:lstStyle/>
+            <a:p>
+              <a:pPr algn="ctr"/>
+              <a:r>
+                <a:rPr lang="en" sz="1067">
+                  <a:solidFill>
+                    <a:srgbClr val="808080"/>
+                  </a:solidFill>
+                </a:rPr>
+                <a:t>Population</a:t>
+              </a:r>
+              <a:endParaRPr sz="1067">
+                <a:solidFill>
+                  <a:srgbClr val="808080"/>
+                </a:solidFill>
+              </a:endParaRPr>
+            </a:p>
+          </p:txBody>
+        </p:sp>
+        <p:sp>
+          <p:nvSpPr>
+            <p:cNvPr id="125" name="Google Shape;125;p19"/>
+            <p:cNvSpPr txBox="1"/>
+            <p:nvPr/>
+          </p:nvSpPr>
+          <p:spPr>
+            <a:xfrm rot="21596460">
+              <a:off x="4421602" y="2063498"/>
+              <a:ext cx="582600" cy="123159"/>
+            </a:xfrm>
+            <a:prstGeom prst="rect">
+              <a:avLst/>
+            </a:prstGeom>
+            <a:noFill/>
+            <a:ln>
+              <a:noFill/>
+            </a:ln>
+          </p:spPr>
+          <p:txBody>
+            <a:bodyPr spcFirstLastPara="1" wrap="square" lIns="0" tIns="0" rIns="0" bIns="0" anchor="t" anchorCtr="0">
+              <a:spAutoFit/>
+            </a:bodyPr>
+            <a:lstStyle/>
+            <a:p>
+              <a:pPr algn="ctr"/>
+              <a:r>
+                <a:rPr lang="en" sz="1067">
+                  <a:solidFill>
+                    <a:srgbClr val="808080"/>
+                  </a:solidFill>
+                </a:rPr>
+                <a:t>Public</a:t>
+              </a:r>
+              <a:endParaRPr sz="1067">
+                <a:solidFill>
+                  <a:srgbClr val="808080"/>
+                </a:solidFill>
+              </a:endParaRPr>
+            </a:p>
+          </p:txBody>
+        </p:sp>
+      </p:grpSp>
+      <p:sp>
+        <p:nvSpPr>
+          <p:cNvPr id="126" name="Google Shape;126;p19"/>
+          <p:cNvSpPr txBox="1"/>
+          <p:nvPr/>
+        </p:nvSpPr>
+        <p:spPr>
+          <a:xfrm>
+            <a:off x="176100" y="6095267"/>
+            <a:ext cx="1655200" cy="615513"/>
+          </a:xfrm>
+          <a:prstGeom prst="rect">
+            <a:avLst/>
+          </a:prstGeom>
+          <a:noFill/>
+          <a:ln>
+            <a:noFill/>
+          </a:ln>
+        </p:spPr>
+        <p:txBody>
+          <a:bodyPr spcFirstLastPara="1" wrap="square" lIns="121900" tIns="121900" rIns="121900" bIns="121900" anchor="t" anchorCtr="0">
+            <a:spAutoFit/>
+          </a:bodyPr>
+          <a:lstStyle/>
+          <a:p>
+            <a:r>
+              <a:rPr lang="en" sz="2400">
+                <a:solidFill>
+                  <a:schemeClr val="dk2"/>
+                </a:solidFill>
+              </a:rPr>
+              <a:t>Editable</a:t>
+            </a:r>
+            <a:endParaRPr sz="2400">
+              <a:solidFill>
+                <a:schemeClr val="dk2"/>
+              </a:solidFill>
+            </a:endParaRPr>
+          </a:p>
+        </p:txBody>
+      </p:sp>
+    </p:spTree>
   </p:cSld>
   <p:clrMapOvr>
     <a:masterClrMapping/>
@@ -21215,4 +23768,299 @@
     </a:ext>
   </a:extLst>
 </a:theme>
+</file>
+
+<file path=ppt/theme/theme2.xml><?xml version="1.0" encoding="utf-8"?>
+<a:theme xmlns:a="http://schemas.openxmlformats.org/drawingml/2006/main" name="Office Theme">
+  <a:themeElements>
+    <a:clrScheme name="Office">
+      <a:dk1>
+        <a:sysClr val="windowText" lastClr="000000"/>
+      </a:dk1>
+      <a:lt1>
+        <a:sysClr val="window" lastClr="FFFFFF"/>
+      </a:lt1>
+      <a:dk2>
+        <a:srgbClr val="44546A"/>
+      </a:dk2>
+      <a:lt2>
+        <a:srgbClr val="E7E6E6"/>
+      </a:lt2>
+      <a:accent1>
+        <a:srgbClr val="4472C4"/>
+      </a:accent1>
+      <a:accent2>
+        <a:srgbClr val="ED7D31"/>
+      </a:accent2>
+      <a:accent3>
+        <a:srgbClr val="A5A5A5"/>
+      </a:accent3>
+      <a:accent4>
+        <a:srgbClr val="FFC000"/>
+      </a:accent4>
+      <a:accent5>
+        <a:srgbClr val="5B9BD5"/>
+      </a:accent5>
+      <a:accent6>
+        <a:srgbClr val="70AD47"/>
+      </a:accent6>
+      <a:hlink>
+        <a:srgbClr val="0563C1"/>
+      </a:hlink>
+      <a:folHlink>
+        <a:srgbClr val="954F72"/>
+      </a:folHlink>
+    </a:clrScheme>
+    <a:fontScheme name="Office">
+      <a:majorFont>
+        <a:latin typeface="Calibri Light" panose="020F0302020204030204"/>
+        <a:ea typeface=""/>
+        <a:cs typeface=""/>
+        <a:font script="Jpan" typeface="游ゴシック Light"/>
+        <a:font script="Hang" typeface="맑은 고딕"/>
+        <a:font script="Hans" typeface="等线 Light"/>
+        <a:font script="Hant" typeface="新細明體"/>
+        <a:font script="Arab" typeface="Times New Roman"/>
+        <a:font script="Hebr" typeface="Times New Roman"/>
+        <a:font script="Thai" typeface="Angsana New"/>
+        <a:font script="Ethi" typeface="Nyala"/>
+        <a:font script="Beng" typeface="Vrinda"/>
+        <a:font script="Gujr" typeface="Shruti"/>
+        <a:font script="Khmr" typeface="MoolBoran"/>
+        <a:font script="Knda" typeface="Tunga"/>
+        <a:font script="Guru" typeface="Raavi"/>
+        <a:font script="Cans" typeface="Euphemia"/>
+        <a:font script="Cher" typeface="Plantagenet Cherokee"/>
+        <a:font script="Yiii" typeface="Microsoft Yi Baiti"/>
+        <a:font script="Tibt" typeface="Microsoft Himalaya"/>
+        <a:font script="Thaa" typeface="MV Boli"/>
+        <a:font script="Deva" typeface="Mangal"/>
+        <a:font script="Telu" typeface="Gautami"/>
+        <a:font script="Taml" typeface="Latha"/>
+        <a:font script="Syrc" typeface="Estrangelo Edessa"/>
+        <a:font script="Orya" typeface="Kalinga"/>
+        <a:font script="Mlym" typeface="Kartika"/>
+        <a:font script="Laoo" typeface="DokChampa"/>
+        <a:font script="Sinh" typeface="Iskoola Pota"/>
+        <a:font script="Mong" typeface="Mongolian Baiti"/>
+        <a:font script="Viet" typeface="Times New Roman"/>
+        <a:font script="Uigh" typeface="Microsoft Uighur"/>
+        <a:font script="Geor" typeface="Sylfaen"/>
+        <a:font script="Armn" typeface="Arial"/>
+        <a:font script="Bugi" typeface="Leelawadee UI"/>
+        <a:font script="Bopo" typeface="Microsoft JhengHei"/>
+        <a:font script="Java" typeface="Javanese Text"/>
+        <a:font script="Lisu" typeface="Segoe UI"/>
+        <a:font script="Mymr" typeface="Myanmar Text"/>
+        <a:font script="Nkoo" typeface="Ebrima"/>
+        <a:font script="Olck" typeface="Nirmala UI"/>
+        <a:font script="Osma" typeface="Ebrima"/>
+        <a:font script="Phag" typeface="Phagspa"/>
+        <a:font script="Syrn" typeface="Estrangelo Edessa"/>
+        <a:font script="Syrj" typeface="Estrangelo Edessa"/>
+        <a:font script="Syre" typeface="Estrangelo Edessa"/>
+        <a:font script="Sora" typeface="Nirmala UI"/>
+        <a:font script="Tale" typeface="Microsoft Tai Le"/>
+        <a:font script="Talu" typeface="Microsoft New Tai Lue"/>
+        <a:font script="Tfng" typeface="Ebrima"/>
+      </a:majorFont>
+      <a:minorFont>
+        <a:latin typeface="Calibri" panose="020F0502020204030204"/>
+        <a:ea typeface=""/>
+        <a:cs typeface=""/>
+        <a:font script="Jpan" typeface="游ゴシック"/>
+        <a:font script="Hang" typeface="맑은 고딕"/>
+        <a:font script="Hans" typeface="等线"/>
+        <a:font script="Hant" typeface="新細明體"/>
+        <a:font script="Arab" typeface="Arial"/>
+        <a:font script="Hebr" typeface="Arial"/>
+        <a:font script="Thai" typeface="Cordia New"/>
+        <a:font script="Ethi" typeface="Nyala"/>
+        <a:font script="Beng" typeface="Vrinda"/>
+        <a:font script="Gujr" typeface="Shruti"/>
+        <a:font script="Khmr" typeface="DaunPenh"/>
+        <a:font script="Knda" typeface="Tunga"/>
+        <a:font script="Guru" typeface="Raavi"/>
+        <a:font script="Cans" typeface="Euphemia"/>
+        <a:font script="Cher" typeface="Plantagenet Cherokee"/>
+        <a:font script="Yiii" typeface="Microsoft Yi Baiti"/>
+        <a:font script="Tibt" typeface="Microsoft Himalaya"/>
+        <a:font script="Thaa" typeface="MV Boli"/>
+        <a:font script="Deva" typeface="Mangal"/>
+        <a:font script="Telu" typeface="Gautami"/>
+        <a:font script="Taml" typeface="Latha"/>
+        <a:font script="Syrc" typeface="Estrangelo Edessa"/>
+        <a:font script="Orya" typeface="Kalinga"/>
+        <a:font script="Mlym" typeface="Kartika"/>
+        <a:font script="Laoo" typeface="DokChampa"/>
+        <a:font script="Sinh" typeface="Iskoola Pota"/>
+        <a:font script="Mong" typeface="Mongolian Baiti"/>
+        <a:font script="Viet" typeface="Arial"/>
+        <a:font script="Uigh" typeface="Microsoft Uighur"/>
+        <a:font script="Geor" typeface="Sylfaen"/>
+        <a:font script="Armn" typeface="Arial"/>
+        <a:font script="Bugi" typeface="Leelawadee UI"/>
+        <a:font script="Bopo" typeface="Microsoft JhengHei"/>
+        <a:font script="Java" typeface="Javanese Text"/>
+        <a:font script="Lisu" typeface="Segoe UI"/>
+        <a:font script="Mymr" typeface="Myanmar Text"/>
+        <a:font script="Nkoo" typeface="Ebrima"/>
+        <a:font script="Olck" typeface="Nirmala UI"/>
+        <a:font script="Osma" typeface="Ebrima"/>
+        <a:font script="Phag" typeface="Phagspa"/>
+        <a:font script="Syrn" typeface="Estrangelo Edessa"/>
+        <a:font script="Syrj" typeface="Estrangelo Edessa"/>
+        <a:font script="Syre" typeface="Estrangelo Edessa"/>
+        <a:font script="Sora" typeface="Nirmala UI"/>
+        <a:font script="Tale" typeface="Microsoft Tai Le"/>
+        <a:font script="Talu" typeface="Microsoft New Tai Lue"/>
+        <a:font script="Tfng" typeface="Ebrima"/>
+      </a:minorFont>
+    </a:fontScheme>
+    <a:fmtScheme name="Office">
+      <a:fillStyleLst>
+        <a:solidFill>
+          <a:schemeClr val="phClr"/>
+        </a:solidFill>
+        <a:gradFill rotWithShape="1">
+          <a:gsLst>
+            <a:gs pos="0">
+              <a:schemeClr val="phClr">
+                <a:lumMod val="110000"/>
+                <a:satMod val="105000"/>
+                <a:tint val="67000"/>
+              </a:schemeClr>
+            </a:gs>
+            <a:gs pos="50000">
+              <a:schemeClr val="phClr">
+                <a:lumMod val="105000"/>
+                <a:satMod val="103000"/>
+                <a:tint val="73000"/>
+              </a:schemeClr>
+            </a:gs>
+            <a:gs pos="100000">
+              <a:schemeClr val="phClr">
+                <a:lumMod val="105000"/>
+                <a:satMod val="109000"/>
+                <a:tint val="81000"/>
+              </a:schemeClr>
+            </a:gs>
+          </a:gsLst>
+          <a:lin ang="5400000" scaled="0"/>
+        </a:gradFill>
+        <a:gradFill rotWithShape="1">
+          <a:gsLst>
+            <a:gs pos="0">
+              <a:schemeClr val="phClr">
+                <a:satMod val="103000"/>
+                <a:lumMod val="102000"/>
+                <a:tint val="94000"/>
+              </a:schemeClr>
+            </a:gs>
+            <a:gs pos="50000">
+              <a:schemeClr val="phClr">
+                <a:satMod val="110000"/>
+                <a:lumMod val="100000"/>
+                <a:shade val="100000"/>
+              </a:schemeClr>
+            </a:gs>
+            <a:gs pos="100000">
+              <a:schemeClr val="phClr">
+                <a:lumMod val="99000"/>
+                <a:satMod val="120000"/>
+                <a:shade val="78000"/>
+              </a:schemeClr>
+            </a:gs>
+          </a:gsLst>
+          <a:lin ang="5400000" scaled="0"/>
+        </a:gradFill>
+      </a:fillStyleLst>
+      <a:lnStyleLst>
+        <a:ln w="6350" cap="flat" cmpd="sng" algn="ctr">
+          <a:solidFill>
+            <a:schemeClr val="phClr"/>
+          </a:solidFill>
+          <a:prstDash val="solid"/>
+          <a:miter lim="800000"/>
+        </a:ln>
+        <a:ln w="12700" cap="flat" cmpd="sng" algn="ctr">
+          <a:solidFill>
+            <a:schemeClr val="phClr"/>
+          </a:solidFill>
+          <a:prstDash val="solid"/>
+          <a:miter lim="800000"/>
+        </a:ln>
+        <a:ln w="19050" cap="flat" cmpd="sng" algn="ctr">
+          <a:solidFill>
+            <a:schemeClr val="phClr"/>
+          </a:solidFill>
+          <a:prstDash val="solid"/>
+          <a:miter lim="800000"/>
+        </a:ln>
+      </a:lnStyleLst>
+      <a:effectStyleLst>
+        <a:effectStyle>
+          <a:effectLst/>
+        </a:effectStyle>
+        <a:effectStyle>
+          <a:effectLst/>
+        </a:effectStyle>
+        <a:effectStyle>
+          <a:effectLst>
+            <a:outerShdw blurRad="57150" dist="19050" dir="5400000" algn="ctr" rotWithShape="0">
+              <a:srgbClr val="000000">
+                <a:alpha val="63000"/>
+              </a:srgbClr>
+            </a:outerShdw>
+          </a:effectLst>
+        </a:effectStyle>
+      </a:effectStyleLst>
+      <a:bgFillStyleLst>
+        <a:solidFill>
+          <a:schemeClr val="phClr"/>
+        </a:solidFill>
+        <a:solidFill>
+          <a:schemeClr val="phClr">
+            <a:tint val="95000"/>
+            <a:satMod val="170000"/>
+          </a:schemeClr>
+        </a:solidFill>
+        <a:gradFill rotWithShape="1">
+          <a:gsLst>
+            <a:gs pos="0">
+              <a:schemeClr val="phClr">
+                <a:tint val="93000"/>
+                <a:satMod val="150000"/>
+                <a:shade val="98000"/>
+                <a:lumMod val="102000"/>
+              </a:schemeClr>
+            </a:gs>
+            <a:gs pos="50000">
+              <a:schemeClr val="phClr">
+                <a:tint val="98000"/>
+                <a:satMod val="130000"/>
+                <a:shade val="90000"/>
+                <a:lumMod val="103000"/>
+              </a:schemeClr>
+            </a:gs>
+            <a:gs pos="100000">
+              <a:schemeClr val="phClr">
+                <a:shade val="63000"/>
+                <a:satMod val="120000"/>
+              </a:schemeClr>
+            </a:gs>
+          </a:gsLst>
+          <a:lin ang="5400000" scaled="0"/>
+        </a:gradFill>
+      </a:bgFillStyleLst>
+    </a:fmtScheme>
+  </a:themeElements>
+  <a:objectDefaults/>
+  <a:extraClrSchemeLst/>
+  <a:extLst>
+    <a:ext uri="{05A4C25C-085E-4340-85A3-A5531E510DB2}">
+      <thm15:themeFamily xmlns:thm15="http://schemas.microsoft.com/office/thememl/2012/main" name="Office Theme" id="{62F939B6-93AF-4DB8-9C6B-D6C7DFDC589F}" vid="{4A3C46E8-61CC-4603-A589-7422A47A8E4A}"/>
+    </a:ext>
+  </a:extLst>
+</a:theme>
 </file>
</xml_diff>

<commit_message>
QA: Missing entries in CR module index; corrected ecosystem diagram and description
</commit_message>
<xml_diff>
--- a/images/source/clinicalreasoning-module-resources.pptx
+++ b/images/source/clinicalreasoning-module-resources.pptx
@@ -5,7 +5,7 @@
     <p:sldMasterId id="2147483648" r:id="rId1"/>
   </p:sldMasterIdLst>
   <p:notesMasterIdLst>
-    <p:notesMasterId r:id="rId19"/>
+    <p:notesMasterId r:id="rId20"/>
   </p:notesMasterIdLst>
   <p:sldIdLst>
     <p:sldId id="256" r:id="rId2"/>
@@ -18,13 +18,14 @@
     <p:sldId id="4834" r:id="rId9"/>
     <p:sldId id="263" r:id="rId10"/>
     <p:sldId id="983" r:id="rId11"/>
-    <p:sldId id="265" r:id="rId12"/>
-    <p:sldId id="267" r:id="rId13"/>
-    <p:sldId id="266" r:id="rId14"/>
-    <p:sldId id="268" r:id="rId15"/>
-    <p:sldId id="269" r:id="rId16"/>
-    <p:sldId id="4835" r:id="rId17"/>
-    <p:sldId id="4836" r:id="rId18"/>
+    <p:sldId id="3799" r:id="rId12"/>
+    <p:sldId id="265" r:id="rId13"/>
+    <p:sldId id="267" r:id="rId14"/>
+    <p:sldId id="266" r:id="rId15"/>
+    <p:sldId id="268" r:id="rId16"/>
+    <p:sldId id="269" r:id="rId17"/>
+    <p:sldId id="4835" r:id="rId18"/>
+    <p:sldId id="4836" r:id="rId19"/>
   </p:sldIdLst>
   <p:sldSz cx="12192000" cy="6858000"/>
   <p:notesSz cx="6858000" cy="9144000"/>
@@ -213,7 +214,7 @@
           <a:p>
             <a:fld id="{7F97AAB3-F70A-42AD-82D8-DC224F64065C}" type="datetimeFigureOut">
               <a:rPr lang="en-US" smtClean="0"/>
-              <a:t>11/5/2025</a:t>
+              <a:t>11/8/2025</a:t>
             </a:fld>
             <a:endParaRPr lang="en-US"/>
           </a:p>
@@ -499,7 +500,7 @@
       </p:grpSpPr>
       <p:sp>
         <p:nvSpPr>
-          <p:cNvPr id="81" name="Google Shape;81;g398762fd04e_2_2:notes"/>
+          <p:cNvPr id="81" name="Google Shape;81;g3a0fcf5ac6f_0_0:notes"/>
           <p:cNvSpPr>
             <a:spLocks noGrp="1" noRot="1" noChangeAspect="1"/>
           </p:cNvSpPr>
@@ -540,7 +541,7 @@
       </p:sp>
       <p:sp>
         <p:nvSpPr>
-          <p:cNvPr id="82" name="Google Shape;82;g398762fd04e_2_2:notes"/>
+          <p:cNvPr id="82" name="Google Shape;82;g3a0fcf5ac6f_0_0:notes"/>
           <p:cNvSpPr txBox="1">
             <a:spLocks noGrp="1"/>
           </p:cNvSpPr>
@@ -572,6 +573,151 @@
               </a:spcAft>
               <a:buNone/>
             </a:pPr>
+            <a:r>
+              <a:rPr lang="en"/>
+              <a:t>Circle text generator:</a:t>
+            </a:r>
+            <a:endParaRPr/>
+          </a:p>
+          <a:p>
+            <a:pPr marL="0" lvl="0" indent="0" algn="l" rtl="0">
+              <a:spcBef>
+                <a:spcPts val="0"/>
+              </a:spcBef>
+              <a:spcAft>
+                <a:spcPts val="0"/>
+              </a:spcAft>
+              <a:buNone/>
+            </a:pPr>
+            <a:endParaRPr/>
+          </a:p>
+          <a:p>
+            <a:pPr marL="0" lvl="0" indent="0" algn="l" rtl="0">
+              <a:spcBef>
+                <a:spcPts val="0"/>
+              </a:spcBef>
+              <a:spcAft>
+                <a:spcPts val="0"/>
+              </a:spcAft>
+              <a:buNone/>
+            </a:pPr>
+            <a:r>
+              <a:rPr lang="en" u="sng">
+                <a:solidFill>
+                  <a:schemeClr val="hlink"/>
+                </a:solidFill>
+                <a:hlinkClick r:id="rId3"/>
+              </a:rPr>
+              <a:t>https://inkpx.com/templates/qr4/text-in-circle</a:t>
+            </a:r>
+            <a:endParaRPr/>
+          </a:p>
+          <a:p>
+            <a:pPr marL="0" lvl="0" indent="0" algn="l" rtl="0">
+              <a:spcBef>
+                <a:spcPts val="0"/>
+              </a:spcBef>
+              <a:spcAft>
+                <a:spcPts val="0"/>
+              </a:spcAft>
+              <a:buNone/>
+            </a:pPr>
+            <a:endParaRPr/>
+          </a:p>
+          <a:p>
+            <a:pPr marL="0" lvl="0" indent="0" algn="l" rtl="0">
+              <a:spcBef>
+                <a:spcPts val="0"/>
+              </a:spcBef>
+              <a:spcAft>
+                <a:spcPts val="0"/>
+              </a:spcAft>
+              <a:buNone/>
+            </a:pPr>
+            <a:r>
+              <a:rPr lang="en"/>
+              <a:t>(copy/paste - don’t download)</a:t>
+            </a:r>
+            <a:endParaRPr/>
+          </a:p>
+          <a:p>
+            <a:pPr marL="0" lvl="0" indent="0" algn="l" rtl="0">
+              <a:spcBef>
+                <a:spcPts val="0"/>
+              </a:spcBef>
+              <a:spcAft>
+                <a:spcPts val="0"/>
+              </a:spcAft>
+              <a:buNone/>
+            </a:pPr>
+            <a:r>
+              <a:rPr lang="en"/>
+              <a:t>(font for Action-to-Data) . . . use default for others</a:t>
+            </a:r>
+            <a:endParaRPr/>
+          </a:p>
+          <a:p>
+            <a:pPr marL="0" lvl="0" indent="0" algn="l" rtl="0">
+              <a:spcBef>
+                <a:spcPts val="0"/>
+              </a:spcBef>
+              <a:spcAft>
+                <a:spcPts val="0"/>
+              </a:spcAft>
+              <a:buNone/>
+            </a:pPr>
+            <a:r>
+              <a:rPr lang="en"/>
+              <a:t>… use “fill” or “stroke” only, not both to keep edges cleaner. . . play with bold font to get desired width</a:t>
+            </a:r>
+            <a:endParaRPr/>
+          </a:p>
+          <a:p>
+            <a:pPr marL="0" lvl="0" indent="0" algn="l" rtl="0">
+              <a:spcBef>
+                <a:spcPts val="0"/>
+              </a:spcBef>
+              <a:spcAft>
+                <a:spcPts val="0"/>
+              </a:spcAft>
+              <a:buNone/>
+            </a:pPr>
+            <a:r>
+              <a:rPr lang="en"/>
+              <a:t>…. Use font “size” to lock dimensions</a:t>
+            </a:r>
+            <a:endParaRPr/>
+          </a:p>
+          <a:p>
+            <a:pPr marL="0" lvl="0" indent="0" algn="l" rtl="0">
+              <a:spcBef>
+                <a:spcPts val="0"/>
+              </a:spcBef>
+              <a:spcAft>
+                <a:spcPts val="0"/>
+              </a:spcAft>
+              <a:buNone/>
+            </a:pPr>
+            <a:r>
+              <a:rPr lang="en"/>
+              <a:t>…edit color hex code to match</a:t>
+            </a:r>
+            <a:endParaRPr/>
+          </a:p>
+          <a:p>
+            <a:pPr marL="0" lvl="0" indent="0" algn="l" rtl="0">
+              <a:spcBef>
+                <a:spcPts val="0"/>
+              </a:spcBef>
+              <a:spcAft>
+                <a:spcPts val="0"/>
+              </a:spcAft>
+              <a:buNone/>
+            </a:pPr>
+            <a:r>
+              <a:rPr lang="en"/>
+              <a:t>Use different paths to get text to flip to bottom half of circle</a:t>
+            </a:r>
             <a:endParaRPr/>
           </a:p>
         </p:txBody>
@@ -603,7 +749,7 @@
       </p:grpSpPr>
       <p:sp>
         <p:nvSpPr>
-          <p:cNvPr id="87" name="Google Shape;87;g36fabb257ff_0_9:notes"/>
+          <p:cNvPr id="87" name="Google Shape;87;g3a0fcf5ac6f_0_99:notes"/>
           <p:cNvSpPr>
             <a:spLocks noGrp="1" noRot="1" noChangeAspect="1"/>
           </p:cNvSpPr>
@@ -644,7 +790,7 @@
       </p:sp>
       <p:sp>
         <p:nvSpPr>
-          <p:cNvPr id="88" name="Google Shape;88;g36fabb257ff_0_9:notes"/>
+          <p:cNvPr id="88" name="Google Shape;88;g3a0fcf5ac6f_0_99:notes"/>
           <p:cNvSpPr txBox="1">
             <a:spLocks noGrp="1"/>
           </p:cNvSpPr>
@@ -754,12 +900,8 @@
               <a:buNone/>
             </a:pPr>
             <a:r>
-              <a:rPr lang="en" b="1"/>
-              <a:t>Asap - Italic</a:t>
-            </a:r>
-            <a:r>
               <a:rPr lang="en"/>
-              <a:t> (font for Action-to-Data) . . . use default for others</a:t>
+              <a:t>(font for Action-to-Data) . . . use default for others</a:t>
             </a:r>
             <a:endParaRPr/>
           </a:p>
@@ -966,7 +1108,7 @@
           <a:p>
             <a:fld id="{79B19490-57C7-44C6-A80B-21AF9873DCB2}" type="datetimeFigureOut">
               <a:rPr lang="en-US" smtClean="0"/>
-              <a:t>11/5/2025</a:t>
+              <a:t>11/8/2025</a:t>
             </a:fld>
             <a:endParaRPr lang="en-US"/>
           </a:p>
@@ -1134,7 +1276,7 @@
           <a:p>
             <a:fld id="{79B19490-57C7-44C6-A80B-21AF9873DCB2}" type="datetimeFigureOut">
               <a:rPr lang="en-US" smtClean="0"/>
-              <a:t>11/5/2025</a:t>
+              <a:t>11/8/2025</a:t>
             </a:fld>
             <a:endParaRPr lang="en-US"/>
           </a:p>
@@ -1312,7 +1454,7 @@
           <a:p>
             <a:fld id="{79B19490-57C7-44C6-A80B-21AF9873DCB2}" type="datetimeFigureOut">
               <a:rPr lang="en-US" smtClean="0"/>
-              <a:t>11/5/2025</a:t>
+              <a:t>11/8/2025</a:t>
             </a:fld>
             <a:endParaRPr lang="en-US"/>
           </a:p>
@@ -2668,7 +2810,7 @@
     </p:spTree>
     <p:extLst>
       <p:ext uri="{BB962C8B-B14F-4D97-AF65-F5344CB8AC3E}">
-        <p14:creationId xmlns:p14="http://schemas.microsoft.com/office/powerpoint/2010/main" val="1075453057"/>
+        <p14:creationId xmlns:p14="http://schemas.microsoft.com/office/powerpoint/2010/main" val="2784937373"/>
       </p:ext>
     </p:extLst>
   </p:cSld>
@@ -2785,7 +2927,7 @@
           <a:p>
             <a:fld id="{79B19490-57C7-44C6-A80B-21AF9873DCB2}" type="datetimeFigureOut">
               <a:rPr lang="en-US" smtClean="0"/>
-              <a:t>11/5/2025</a:t>
+              <a:t>11/8/2025</a:t>
             </a:fld>
             <a:endParaRPr lang="en-US"/>
           </a:p>
@@ -3030,7 +3172,7 @@
           <a:p>
             <a:fld id="{79B19490-57C7-44C6-A80B-21AF9873DCB2}" type="datetimeFigureOut">
               <a:rPr lang="en-US" smtClean="0"/>
-              <a:t>11/5/2025</a:t>
+              <a:t>11/8/2025</a:t>
             </a:fld>
             <a:endParaRPr lang="en-US"/>
           </a:p>
@@ -3259,7 +3401,7 @@
           <a:p>
             <a:fld id="{79B19490-57C7-44C6-A80B-21AF9873DCB2}" type="datetimeFigureOut">
               <a:rPr lang="en-US" smtClean="0"/>
-              <a:t>11/5/2025</a:t>
+              <a:t>11/8/2025</a:t>
             </a:fld>
             <a:endParaRPr lang="en-US"/>
           </a:p>
@@ -3623,7 +3765,7 @@
           <a:p>
             <a:fld id="{79B19490-57C7-44C6-A80B-21AF9873DCB2}" type="datetimeFigureOut">
               <a:rPr lang="en-US" smtClean="0"/>
-              <a:t>11/5/2025</a:t>
+              <a:t>11/8/2025</a:t>
             </a:fld>
             <a:endParaRPr lang="en-US"/>
           </a:p>
@@ -3740,7 +3882,7 @@
           <a:p>
             <a:fld id="{79B19490-57C7-44C6-A80B-21AF9873DCB2}" type="datetimeFigureOut">
               <a:rPr lang="en-US" smtClean="0"/>
-              <a:t>11/5/2025</a:t>
+              <a:t>11/8/2025</a:t>
             </a:fld>
             <a:endParaRPr lang="en-US"/>
           </a:p>
@@ -3835,7 +3977,7 @@
           <a:p>
             <a:fld id="{79B19490-57C7-44C6-A80B-21AF9873DCB2}" type="datetimeFigureOut">
               <a:rPr lang="en-US" smtClean="0"/>
-              <a:t>11/5/2025</a:t>
+              <a:t>11/8/2025</a:t>
             </a:fld>
             <a:endParaRPr lang="en-US"/>
           </a:p>
@@ -4110,7 +4252,7 @@
           <a:p>
             <a:fld id="{79B19490-57C7-44C6-A80B-21AF9873DCB2}" type="datetimeFigureOut">
               <a:rPr lang="en-US" smtClean="0"/>
-              <a:t>11/5/2025</a:t>
+              <a:t>11/8/2025</a:t>
             </a:fld>
             <a:endParaRPr lang="en-US"/>
           </a:p>
@@ -4362,7 +4504,7 @@
           <a:p>
             <a:fld id="{79B19490-57C7-44C6-A80B-21AF9873DCB2}" type="datetimeFigureOut">
               <a:rPr lang="en-US" smtClean="0"/>
-              <a:t>11/5/2025</a:t>
+              <a:t>11/8/2025</a:t>
             </a:fld>
             <a:endParaRPr lang="en-US"/>
           </a:p>
@@ -4573,7 +4715,7 @@
           <a:p>
             <a:fld id="{79B19490-57C7-44C6-A80B-21AF9873DCB2}" type="datetimeFigureOut">
               <a:rPr lang="en-US" smtClean="0"/>
-              <a:t>11/5/2025</a:t>
+              <a:t>11/8/2025</a:t>
             </a:fld>
             <a:endParaRPr lang="en-US"/>
           </a:p>
@@ -6526,6 +6668,875 @@
 </file>
 
 <file path=ppt/slides/slide11.xml><?xml version="1.0" encoding="utf-8"?>
+<p:sld xmlns:a="http://schemas.openxmlformats.org/drawingml/2006/main" xmlns:r="http://schemas.openxmlformats.org/officeDocument/2006/relationships" xmlns:p="http://schemas.openxmlformats.org/presentationml/2006/main">
+  <p:cSld>
+    <p:spTree>
+      <p:nvGrpSpPr>
+        <p:cNvPr id="1" name="">
+          <a:extLst>
+            <a:ext uri="{FF2B5EF4-FFF2-40B4-BE49-F238E27FC236}">
+              <a16:creationId xmlns:a16="http://schemas.microsoft.com/office/drawing/2014/main" id="{B7B44695-EF0A-641D-DA81-ED91B2ABACA1}"/>
+            </a:ext>
+          </a:extLst>
+        </p:cNvPr>
+        <p:cNvGrpSpPr/>
+        <p:nvPr/>
+      </p:nvGrpSpPr>
+      <p:grpSpPr>
+        <a:xfrm>
+          <a:off x="0" y="0"/>
+          <a:ext cx="0" cy="0"/>
+          <a:chOff x="0" y="0"/>
+          <a:chExt cx="0" cy="0"/>
+        </a:xfrm>
+      </p:grpSpPr>
+      <p:sp>
+        <p:nvSpPr>
+          <p:cNvPr id="2" name="Title 1">
+            <a:extLst>
+              <a:ext uri="{FF2B5EF4-FFF2-40B4-BE49-F238E27FC236}">
+                <a16:creationId xmlns:a16="http://schemas.microsoft.com/office/drawing/2014/main" id="{1C3316C0-0018-BC7B-C961-107BB1B5D0FE}"/>
+              </a:ext>
+            </a:extLst>
+          </p:cNvPr>
+          <p:cNvSpPr>
+            <a:spLocks noGrp="1"/>
+          </p:cNvSpPr>
+          <p:nvPr>
+            <p:ph type="title"/>
+          </p:nvPr>
+        </p:nvSpPr>
+        <p:spPr/>
+        <p:txBody>
+          <a:bodyPr/>
+          <a:lstStyle/>
+          <a:p>
+            <a:r>
+              <a:rPr lang="en-US" dirty="0"/>
+              <a:t>CQL Ingestion Integration</a:t>
+            </a:r>
+          </a:p>
+        </p:txBody>
+      </p:sp>
+      <p:sp>
+        <p:nvSpPr>
+          <p:cNvPr id="29" name="Rectangle: Rounded Corners 28">
+            <a:extLst>
+              <a:ext uri="{FF2B5EF4-FFF2-40B4-BE49-F238E27FC236}">
+                <a16:creationId xmlns:a16="http://schemas.microsoft.com/office/drawing/2014/main" id="{775EF1C2-2D48-A4D4-F5EC-1628EE4618D2}"/>
+              </a:ext>
+            </a:extLst>
+          </p:cNvPr>
+          <p:cNvSpPr/>
+          <p:nvPr/>
+        </p:nvSpPr>
+        <p:spPr>
+          <a:xfrm>
+            <a:off x="3221381" y="2298071"/>
+            <a:ext cx="3733779" cy="1985290"/>
+          </a:xfrm>
+          <a:prstGeom prst="roundRect">
+            <a:avLst>
+              <a:gd name="adj" fmla="val 7657"/>
+            </a:avLst>
+          </a:prstGeom>
+          <a:noFill/>
+        </p:spPr>
+        <p:style>
+          <a:lnRef idx="2">
+            <a:schemeClr val="accent1">
+              <a:shade val="50000"/>
+            </a:schemeClr>
+          </a:lnRef>
+          <a:fillRef idx="1">
+            <a:schemeClr val="accent1"/>
+          </a:fillRef>
+          <a:effectRef idx="0">
+            <a:schemeClr val="accent1"/>
+          </a:effectRef>
+          <a:fontRef idx="minor">
+            <a:schemeClr val="lt1"/>
+          </a:fontRef>
+        </p:style>
+        <p:txBody>
+          <a:bodyPr rtlCol="0" anchor="ctr"/>
+          <a:lstStyle/>
+          <a:p>
+            <a:pPr algn="ctr"/>
+            <a:endParaRPr lang="en-US" b="1"/>
+          </a:p>
+        </p:txBody>
+      </p:sp>
+      <p:sp>
+        <p:nvSpPr>
+          <p:cNvPr id="30" name="TextBox 29">
+            <a:extLst>
+              <a:ext uri="{FF2B5EF4-FFF2-40B4-BE49-F238E27FC236}">
+                <a16:creationId xmlns:a16="http://schemas.microsoft.com/office/drawing/2014/main" id="{486C475F-8359-1983-6447-3F8A37134EA5}"/>
+              </a:ext>
+            </a:extLst>
+          </p:cNvPr>
+          <p:cNvSpPr txBox="1"/>
+          <p:nvPr/>
+        </p:nvSpPr>
+        <p:spPr>
+          <a:xfrm>
+            <a:off x="3221381" y="1875410"/>
+            <a:ext cx="3733779" cy="369332"/>
+          </a:xfrm>
+          <a:prstGeom prst="rect">
+            <a:avLst/>
+          </a:prstGeom>
+          <a:noFill/>
+        </p:spPr>
+        <p:txBody>
+          <a:bodyPr wrap="none" rtlCol="0">
+            <a:spAutoFit/>
+          </a:bodyPr>
+          <a:lstStyle/>
+          <a:p>
+            <a:r>
+              <a:rPr lang="en-US" b="1" dirty="0"/>
+              <a:t>Clinical Reasoning-enabled EMR/CDR</a:t>
+            </a:r>
+          </a:p>
+        </p:txBody>
+      </p:sp>
+      <p:sp>
+        <p:nvSpPr>
+          <p:cNvPr id="31" name="Flowchart: Document 30">
+            <a:extLst>
+              <a:ext uri="{FF2B5EF4-FFF2-40B4-BE49-F238E27FC236}">
+                <a16:creationId xmlns:a16="http://schemas.microsoft.com/office/drawing/2014/main" id="{D8EB496E-B997-65CF-915A-6DF07C4A2631}"/>
+              </a:ext>
+            </a:extLst>
+          </p:cNvPr>
+          <p:cNvSpPr/>
+          <p:nvPr/>
+        </p:nvSpPr>
+        <p:spPr>
+          <a:xfrm>
+            <a:off x="8731846" y="2422687"/>
+            <a:ext cx="528638" cy="628650"/>
+          </a:xfrm>
+          <a:prstGeom prst="flowChartDocument">
+            <a:avLst/>
+          </a:prstGeom>
+          <a:noFill/>
+        </p:spPr>
+        <p:style>
+          <a:lnRef idx="2">
+            <a:schemeClr val="accent1">
+              <a:shade val="50000"/>
+            </a:schemeClr>
+          </a:lnRef>
+          <a:fillRef idx="1">
+            <a:schemeClr val="accent1"/>
+          </a:fillRef>
+          <a:effectRef idx="0">
+            <a:schemeClr val="accent1"/>
+          </a:effectRef>
+          <a:fontRef idx="minor">
+            <a:schemeClr val="lt1"/>
+          </a:fontRef>
+        </p:style>
+        <p:txBody>
+          <a:bodyPr rtlCol="0" anchor="ctr"/>
+          <a:lstStyle/>
+          <a:p>
+            <a:pPr algn="ctr"/>
+            <a:endParaRPr lang="en-US" b="1"/>
+          </a:p>
+        </p:txBody>
+      </p:sp>
+      <p:sp>
+        <p:nvSpPr>
+          <p:cNvPr id="32" name="TextBox 31">
+            <a:extLst>
+              <a:ext uri="{FF2B5EF4-FFF2-40B4-BE49-F238E27FC236}">
+                <a16:creationId xmlns:a16="http://schemas.microsoft.com/office/drawing/2014/main" id="{60A43B93-DC5E-CEAF-3387-1F0318F64F57}"/>
+              </a:ext>
+            </a:extLst>
+          </p:cNvPr>
+          <p:cNvSpPr txBox="1"/>
+          <p:nvPr/>
+        </p:nvSpPr>
+        <p:spPr>
+          <a:xfrm>
+            <a:off x="8305602" y="2053355"/>
+            <a:ext cx="1553567" cy="369332"/>
+          </a:xfrm>
+          <a:prstGeom prst="rect">
+            <a:avLst/>
+          </a:prstGeom>
+          <a:noFill/>
+        </p:spPr>
+        <p:txBody>
+          <a:bodyPr wrap="none" rtlCol="0">
+            <a:spAutoFit/>
+          </a:bodyPr>
+          <a:lstStyle/>
+          <a:p>
+            <a:r>
+              <a:rPr lang="en-US" b="1" dirty="0" err="1"/>
+              <a:t>PlanDefinition</a:t>
+            </a:r>
+            <a:endParaRPr lang="en-US" b="1" dirty="0"/>
+          </a:p>
+        </p:txBody>
+      </p:sp>
+      <p:sp>
+        <p:nvSpPr>
+          <p:cNvPr id="33" name="Flowchart: Document 32">
+            <a:extLst>
+              <a:ext uri="{FF2B5EF4-FFF2-40B4-BE49-F238E27FC236}">
+                <a16:creationId xmlns:a16="http://schemas.microsoft.com/office/drawing/2014/main" id="{6E03E973-6B41-74E8-DF4A-0C2BBB048609}"/>
+              </a:ext>
+            </a:extLst>
+          </p:cNvPr>
+          <p:cNvSpPr/>
+          <p:nvPr/>
+        </p:nvSpPr>
+        <p:spPr>
+          <a:xfrm>
+            <a:off x="9228656" y="3441551"/>
+            <a:ext cx="528638" cy="628650"/>
+          </a:xfrm>
+          <a:prstGeom prst="flowChartDocument">
+            <a:avLst/>
+          </a:prstGeom>
+          <a:noFill/>
+        </p:spPr>
+        <p:style>
+          <a:lnRef idx="2">
+            <a:schemeClr val="accent1">
+              <a:shade val="50000"/>
+            </a:schemeClr>
+          </a:lnRef>
+          <a:fillRef idx="1">
+            <a:schemeClr val="accent1"/>
+          </a:fillRef>
+          <a:effectRef idx="0">
+            <a:schemeClr val="accent1"/>
+          </a:effectRef>
+          <a:fontRef idx="minor">
+            <a:schemeClr val="lt1"/>
+          </a:fontRef>
+        </p:style>
+        <p:txBody>
+          <a:bodyPr rtlCol="0" anchor="ctr"/>
+          <a:lstStyle/>
+          <a:p>
+            <a:pPr algn="ctr"/>
+            <a:endParaRPr lang="en-US" b="1"/>
+          </a:p>
+        </p:txBody>
+      </p:sp>
+      <p:sp>
+        <p:nvSpPr>
+          <p:cNvPr id="34" name="Flowchart: Document 33">
+            <a:extLst>
+              <a:ext uri="{FF2B5EF4-FFF2-40B4-BE49-F238E27FC236}">
+                <a16:creationId xmlns:a16="http://schemas.microsoft.com/office/drawing/2014/main" id="{C5A89A65-CCBD-173C-FF11-292ADB3511F7}"/>
+              </a:ext>
+            </a:extLst>
+          </p:cNvPr>
+          <p:cNvSpPr/>
+          <p:nvPr/>
+        </p:nvSpPr>
+        <p:spPr>
+          <a:xfrm>
+            <a:off x="9310809" y="3518821"/>
+            <a:ext cx="528638" cy="628650"/>
+          </a:xfrm>
+          <a:prstGeom prst="flowChartDocument">
+            <a:avLst/>
+          </a:prstGeom>
+          <a:solidFill>
+            <a:schemeClr val="bg1"/>
+          </a:solidFill>
+        </p:spPr>
+        <p:style>
+          <a:lnRef idx="2">
+            <a:schemeClr val="accent1">
+              <a:shade val="50000"/>
+            </a:schemeClr>
+          </a:lnRef>
+          <a:fillRef idx="1">
+            <a:schemeClr val="accent1"/>
+          </a:fillRef>
+          <a:effectRef idx="0">
+            <a:schemeClr val="accent1"/>
+          </a:effectRef>
+          <a:fontRef idx="minor">
+            <a:schemeClr val="lt1"/>
+          </a:fontRef>
+        </p:style>
+        <p:txBody>
+          <a:bodyPr rtlCol="0" anchor="ctr"/>
+          <a:lstStyle/>
+          <a:p>
+            <a:pPr algn="ctr"/>
+            <a:endParaRPr lang="en-US" b="1"/>
+          </a:p>
+        </p:txBody>
+      </p:sp>
+      <p:sp>
+        <p:nvSpPr>
+          <p:cNvPr id="35" name="TextBox 34">
+            <a:extLst>
+              <a:ext uri="{FF2B5EF4-FFF2-40B4-BE49-F238E27FC236}">
+                <a16:creationId xmlns:a16="http://schemas.microsoft.com/office/drawing/2014/main" id="{9F4D335A-073C-C8C6-C55F-8A30BDD6F392}"/>
+              </a:ext>
+            </a:extLst>
+          </p:cNvPr>
+          <p:cNvSpPr txBox="1"/>
+          <p:nvPr/>
+        </p:nvSpPr>
+        <p:spPr>
+          <a:xfrm>
+            <a:off x="8870640" y="3077556"/>
+            <a:ext cx="1426673" cy="369332"/>
+          </a:xfrm>
+          <a:prstGeom prst="rect">
+            <a:avLst/>
+          </a:prstGeom>
+          <a:noFill/>
+        </p:spPr>
+        <p:txBody>
+          <a:bodyPr wrap="none" rtlCol="0">
+            <a:spAutoFit/>
+          </a:bodyPr>
+          <a:lstStyle/>
+          <a:p>
+            <a:r>
+              <a:rPr lang="en-US" b="1" dirty="0"/>
+              <a:t>CQL Libraries</a:t>
+            </a:r>
+          </a:p>
+        </p:txBody>
+      </p:sp>
+      <p:sp>
+        <p:nvSpPr>
+          <p:cNvPr id="3" name="Arrow: Right 2">
+            <a:extLst>
+              <a:ext uri="{FF2B5EF4-FFF2-40B4-BE49-F238E27FC236}">
+                <a16:creationId xmlns:a16="http://schemas.microsoft.com/office/drawing/2014/main" id="{24C39CB0-99B6-3B7B-A19D-A698AFA5370B}"/>
+              </a:ext>
+            </a:extLst>
+          </p:cNvPr>
+          <p:cNvSpPr/>
+          <p:nvPr/>
+        </p:nvSpPr>
+        <p:spPr>
+          <a:xfrm rot="10800000">
+            <a:off x="7097799" y="3096237"/>
+            <a:ext cx="1421669" cy="165985"/>
+          </a:xfrm>
+          <a:prstGeom prst="rightArrow">
+            <a:avLst/>
+          </a:prstGeom>
+          <a:solidFill>
+            <a:schemeClr val="bg1"/>
+          </a:solidFill>
+        </p:spPr>
+        <p:style>
+          <a:lnRef idx="2">
+            <a:schemeClr val="accent1">
+              <a:shade val="50000"/>
+            </a:schemeClr>
+          </a:lnRef>
+          <a:fillRef idx="1">
+            <a:schemeClr val="accent1"/>
+          </a:fillRef>
+          <a:effectRef idx="0">
+            <a:schemeClr val="accent1"/>
+          </a:effectRef>
+          <a:fontRef idx="minor">
+            <a:schemeClr val="lt1"/>
+          </a:fontRef>
+        </p:style>
+        <p:txBody>
+          <a:bodyPr rtlCol="0" anchor="ctr"/>
+          <a:lstStyle/>
+          <a:p>
+            <a:pPr algn="ctr"/>
+            <a:endParaRPr lang="en-US" b="1">
+              <a:solidFill>
+                <a:schemeClr val="tx1"/>
+              </a:solidFill>
+            </a:endParaRPr>
+          </a:p>
+        </p:txBody>
+      </p:sp>
+      <p:sp>
+        <p:nvSpPr>
+          <p:cNvPr id="5" name="TextBox 4">
+            <a:extLst>
+              <a:ext uri="{FF2B5EF4-FFF2-40B4-BE49-F238E27FC236}">
+                <a16:creationId xmlns:a16="http://schemas.microsoft.com/office/drawing/2014/main" id="{7F4C6442-8D4E-1EA9-A5E3-F63F31359606}"/>
+              </a:ext>
+            </a:extLst>
+          </p:cNvPr>
+          <p:cNvSpPr txBox="1"/>
+          <p:nvPr/>
+        </p:nvSpPr>
+        <p:spPr>
+          <a:xfrm>
+            <a:off x="7066925" y="2730108"/>
+            <a:ext cx="1516505" cy="369332"/>
+          </a:xfrm>
+          <a:prstGeom prst="rect">
+            <a:avLst/>
+          </a:prstGeom>
+          <a:noFill/>
+        </p:spPr>
+        <p:txBody>
+          <a:bodyPr wrap="none" rtlCol="0">
+            <a:spAutoFit/>
+          </a:bodyPr>
+          <a:lstStyle/>
+          <a:p>
+            <a:r>
+              <a:rPr lang="en-US" b="1" dirty="0"/>
+              <a:t>Import/Ingest</a:t>
+            </a:r>
+          </a:p>
+        </p:txBody>
+      </p:sp>
+      <p:pic>
+        <p:nvPicPr>
+          <p:cNvPr id="47" name="Picture 46">
+            <a:extLst>
+              <a:ext uri="{FF2B5EF4-FFF2-40B4-BE49-F238E27FC236}">
+                <a16:creationId xmlns:a16="http://schemas.microsoft.com/office/drawing/2014/main" id="{271CE2EE-BB69-2642-2083-7F98616595BB}"/>
+              </a:ext>
+            </a:extLst>
+          </p:cNvPr>
+          <p:cNvPicPr>
+            <a:picLocks noChangeAspect="1"/>
+          </p:cNvPicPr>
+          <p:nvPr/>
+        </p:nvPicPr>
+        <p:blipFill>
+          <a:blip r:embed="rId2" cstate="print">
+            <a:extLst>
+              <a:ext uri="{28A0092B-C50C-407E-A947-70E740481C1C}">
+                <a14:useLocalDpi xmlns:a14="http://schemas.microsoft.com/office/drawing/2010/main" val="0"/>
+              </a:ext>
+            </a:extLst>
+          </a:blip>
+          <a:stretch>
+            <a:fillRect/>
+          </a:stretch>
+        </p:blipFill>
+        <p:spPr>
+          <a:xfrm>
+            <a:off x="2480966" y="2274652"/>
+            <a:ext cx="628650" cy="628650"/>
+          </a:xfrm>
+          <a:prstGeom prst="rect">
+            <a:avLst/>
+          </a:prstGeom>
+        </p:spPr>
+      </p:pic>
+      <p:pic>
+        <p:nvPicPr>
+          <p:cNvPr id="48" name="Picture 47">
+            <a:extLst>
+              <a:ext uri="{FF2B5EF4-FFF2-40B4-BE49-F238E27FC236}">
+                <a16:creationId xmlns:a16="http://schemas.microsoft.com/office/drawing/2014/main" id="{B548E5F3-F80C-ECA4-F6A9-9182BE3204A2}"/>
+              </a:ext>
+            </a:extLst>
+          </p:cNvPr>
+          <p:cNvPicPr>
+            <a:picLocks noChangeAspect="1"/>
+          </p:cNvPicPr>
+          <p:nvPr/>
+        </p:nvPicPr>
+        <p:blipFill>
+          <a:blip r:embed="rId3">
+            <a:extLst>
+              <a:ext uri="{28A0092B-C50C-407E-A947-70E740481C1C}">
+                <a14:useLocalDpi xmlns:a14="http://schemas.microsoft.com/office/drawing/2010/main" val="0"/>
+              </a:ext>
+            </a:extLst>
+          </a:blip>
+          <a:stretch>
+            <a:fillRect/>
+          </a:stretch>
+        </p:blipFill>
+        <p:spPr>
+          <a:xfrm>
+            <a:off x="7503869" y="3349071"/>
+            <a:ext cx="695791" cy="488534"/>
+          </a:xfrm>
+          <a:prstGeom prst="rect">
+            <a:avLst/>
+          </a:prstGeom>
+        </p:spPr>
+      </p:pic>
+      <p:sp>
+        <p:nvSpPr>
+          <p:cNvPr id="4" name="Rectangle: Rounded Corners 3">
+            <a:extLst>
+              <a:ext uri="{FF2B5EF4-FFF2-40B4-BE49-F238E27FC236}">
+                <a16:creationId xmlns:a16="http://schemas.microsoft.com/office/drawing/2014/main" id="{C0441A47-D096-638D-55AF-F9FC1BBBE0DF}"/>
+              </a:ext>
+            </a:extLst>
+          </p:cNvPr>
+          <p:cNvSpPr/>
+          <p:nvPr/>
+        </p:nvSpPr>
+        <p:spPr>
+          <a:xfrm>
+            <a:off x="422297" y="2596874"/>
+            <a:ext cx="1828801" cy="1184607"/>
+          </a:xfrm>
+          <a:prstGeom prst="roundRect">
+            <a:avLst/>
+          </a:prstGeom>
+          <a:noFill/>
+        </p:spPr>
+        <p:style>
+          <a:lnRef idx="2">
+            <a:schemeClr val="accent1">
+              <a:shade val="50000"/>
+            </a:schemeClr>
+          </a:lnRef>
+          <a:fillRef idx="1">
+            <a:schemeClr val="accent1"/>
+          </a:fillRef>
+          <a:effectRef idx="0">
+            <a:schemeClr val="accent1"/>
+          </a:effectRef>
+          <a:fontRef idx="minor">
+            <a:schemeClr val="lt1"/>
+          </a:fontRef>
+        </p:style>
+        <p:txBody>
+          <a:bodyPr rtlCol="0" anchor="ctr"/>
+          <a:lstStyle/>
+          <a:p>
+            <a:pPr algn="ctr"/>
+            <a:r>
+              <a:rPr lang="en-US" b="1" dirty="0">
+                <a:solidFill>
+                  <a:schemeClr val="tx1"/>
+                </a:solidFill>
+              </a:rPr>
+              <a:t>Clinical Application</a:t>
+            </a:r>
+          </a:p>
+        </p:txBody>
+      </p:sp>
+      <p:sp>
+        <p:nvSpPr>
+          <p:cNvPr id="8" name="Arrow: Right 7">
+            <a:extLst>
+              <a:ext uri="{FF2B5EF4-FFF2-40B4-BE49-F238E27FC236}">
+                <a16:creationId xmlns:a16="http://schemas.microsoft.com/office/drawing/2014/main" id="{1C0D6BAD-4FA5-823D-C29F-63BACC339EE6}"/>
+              </a:ext>
+            </a:extLst>
+          </p:cNvPr>
+          <p:cNvSpPr/>
+          <p:nvPr/>
+        </p:nvSpPr>
+        <p:spPr>
+          <a:xfrm>
+            <a:off x="2281972" y="2911999"/>
+            <a:ext cx="904682" cy="184238"/>
+          </a:xfrm>
+          <a:prstGeom prst="rightArrow">
+            <a:avLst/>
+          </a:prstGeom>
+          <a:solidFill>
+            <a:schemeClr val="bg1"/>
+          </a:solidFill>
+        </p:spPr>
+        <p:style>
+          <a:lnRef idx="2">
+            <a:schemeClr val="accent1">
+              <a:shade val="50000"/>
+            </a:schemeClr>
+          </a:lnRef>
+          <a:fillRef idx="1">
+            <a:schemeClr val="accent1"/>
+          </a:fillRef>
+          <a:effectRef idx="0">
+            <a:schemeClr val="accent1"/>
+          </a:effectRef>
+          <a:fontRef idx="minor">
+            <a:schemeClr val="lt1"/>
+          </a:fontRef>
+        </p:style>
+        <p:txBody>
+          <a:bodyPr rtlCol="0" anchor="ctr"/>
+          <a:lstStyle/>
+          <a:p>
+            <a:pPr algn="ctr"/>
+            <a:endParaRPr lang="en-US" b="1">
+              <a:solidFill>
+                <a:schemeClr val="tx1"/>
+              </a:solidFill>
+            </a:endParaRPr>
+          </a:p>
+        </p:txBody>
+      </p:sp>
+      <p:sp>
+        <p:nvSpPr>
+          <p:cNvPr id="9" name="Arrow: Right 8">
+            <a:extLst>
+              <a:ext uri="{FF2B5EF4-FFF2-40B4-BE49-F238E27FC236}">
+                <a16:creationId xmlns:a16="http://schemas.microsoft.com/office/drawing/2014/main" id="{6B1614D1-5589-373F-4272-CDC8AB748CF6}"/>
+              </a:ext>
+            </a:extLst>
+          </p:cNvPr>
+          <p:cNvSpPr/>
+          <p:nvPr/>
+        </p:nvSpPr>
+        <p:spPr>
+          <a:xfrm rot="10800000">
+            <a:off x="2273085" y="3198597"/>
+            <a:ext cx="904682" cy="184238"/>
+          </a:xfrm>
+          <a:prstGeom prst="rightArrow">
+            <a:avLst/>
+          </a:prstGeom>
+          <a:solidFill>
+            <a:schemeClr val="bg1"/>
+          </a:solidFill>
+        </p:spPr>
+        <p:style>
+          <a:lnRef idx="2">
+            <a:schemeClr val="accent1">
+              <a:shade val="50000"/>
+            </a:schemeClr>
+          </a:lnRef>
+          <a:fillRef idx="1">
+            <a:schemeClr val="accent1"/>
+          </a:fillRef>
+          <a:effectRef idx="0">
+            <a:schemeClr val="accent1"/>
+          </a:effectRef>
+          <a:fontRef idx="minor">
+            <a:schemeClr val="lt1"/>
+          </a:fontRef>
+        </p:style>
+        <p:txBody>
+          <a:bodyPr rtlCol="0" anchor="ctr"/>
+          <a:lstStyle/>
+          <a:p>
+            <a:pPr algn="ctr"/>
+            <a:endParaRPr lang="en-US" b="1">
+              <a:solidFill>
+                <a:schemeClr val="tx1"/>
+              </a:solidFill>
+            </a:endParaRPr>
+          </a:p>
+        </p:txBody>
+      </p:sp>
+      <p:pic>
+        <p:nvPicPr>
+          <p:cNvPr id="10" name="Picture 9">
+            <a:extLst>
+              <a:ext uri="{FF2B5EF4-FFF2-40B4-BE49-F238E27FC236}">
+                <a16:creationId xmlns:a16="http://schemas.microsoft.com/office/drawing/2014/main" id="{57FA5D39-C5B7-F38B-0B9C-555BAC719591}"/>
+              </a:ext>
+            </a:extLst>
+          </p:cNvPr>
+          <p:cNvPicPr>
+            <a:picLocks noChangeAspect="1"/>
+          </p:cNvPicPr>
+          <p:nvPr/>
+        </p:nvPicPr>
+        <p:blipFill>
+          <a:blip r:embed="rId4" cstate="print">
+            <a:extLst>
+              <a:ext uri="{28A0092B-C50C-407E-A947-70E740481C1C}">
+                <a14:useLocalDpi xmlns:a14="http://schemas.microsoft.com/office/drawing/2010/main" val="0"/>
+              </a:ext>
+            </a:extLst>
+          </a:blip>
+          <a:stretch>
+            <a:fillRect/>
+          </a:stretch>
+        </p:blipFill>
+        <p:spPr>
+          <a:xfrm>
+            <a:off x="5755284" y="2422687"/>
+            <a:ext cx="754025" cy="744016"/>
+          </a:xfrm>
+          <a:prstGeom prst="rect">
+            <a:avLst/>
+          </a:prstGeom>
+        </p:spPr>
+      </p:pic>
+      <p:sp>
+        <p:nvSpPr>
+          <p:cNvPr id="11" name="TextBox 10">
+            <a:extLst>
+              <a:ext uri="{FF2B5EF4-FFF2-40B4-BE49-F238E27FC236}">
+                <a16:creationId xmlns:a16="http://schemas.microsoft.com/office/drawing/2014/main" id="{D44AEBC3-4CD4-2830-32B5-DF948BFA13E2}"/>
+              </a:ext>
+            </a:extLst>
+          </p:cNvPr>
+          <p:cNvSpPr txBox="1"/>
+          <p:nvPr/>
+        </p:nvSpPr>
+        <p:spPr>
+          <a:xfrm>
+            <a:off x="5166867" y="2858151"/>
+            <a:ext cx="1256414" cy="923330"/>
+          </a:xfrm>
+          <a:prstGeom prst="rect">
+            <a:avLst/>
+          </a:prstGeom>
+          <a:noFill/>
+        </p:spPr>
+        <p:txBody>
+          <a:bodyPr wrap="square" rtlCol="0">
+            <a:spAutoFit/>
+          </a:bodyPr>
+          <a:lstStyle/>
+          <a:p>
+            <a:r>
+              <a:rPr lang="en-US" b="1" dirty="0"/>
+              <a:t>Clinical Reasoning Engine</a:t>
+            </a:r>
+          </a:p>
+        </p:txBody>
+      </p:sp>
+      <p:sp>
+        <p:nvSpPr>
+          <p:cNvPr id="12" name="Cylinder 11">
+            <a:extLst>
+              <a:ext uri="{FF2B5EF4-FFF2-40B4-BE49-F238E27FC236}">
+                <a16:creationId xmlns:a16="http://schemas.microsoft.com/office/drawing/2014/main" id="{819B7200-73E0-B21C-1F88-2907E0D0D91C}"/>
+              </a:ext>
+            </a:extLst>
+          </p:cNvPr>
+          <p:cNvSpPr/>
+          <p:nvPr/>
+        </p:nvSpPr>
+        <p:spPr>
+          <a:xfrm>
+            <a:off x="3816425" y="2965537"/>
+            <a:ext cx="939452" cy="463463"/>
+          </a:xfrm>
+          <a:prstGeom prst="can">
+            <a:avLst/>
+          </a:prstGeom>
+          <a:solidFill>
+            <a:schemeClr val="bg1"/>
+          </a:solidFill>
+        </p:spPr>
+        <p:style>
+          <a:lnRef idx="2">
+            <a:schemeClr val="accent1">
+              <a:shade val="50000"/>
+            </a:schemeClr>
+          </a:lnRef>
+          <a:fillRef idx="1">
+            <a:schemeClr val="accent1"/>
+          </a:fillRef>
+          <a:effectRef idx="0">
+            <a:schemeClr val="accent1"/>
+          </a:effectRef>
+          <a:fontRef idx="minor">
+            <a:schemeClr val="lt1"/>
+          </a:fontRef>
+        </p:style>
+        <p:txBody>
+          <a:bodyPr rtlCol="0" anchor="ctr"/>
+          <a:lstStyle/>
+          <a:p>
+            <a:pPr algn="ctr"/>
+            <a:r>
+              <a:rPr lang="en-US" b="1" dirty="0">
+                <a:solidFill>
+                  <a:schemeClr val="tx1"/>
+                </a:solidFill>
+              </a:rPr>
+              <a:t>CDR</a:t>
+            </a:r>
+          </a:p>
+        </p:txBody>
+      </p:sp>
+      <p:sp>
+        <p:nvSpPr>
+          <p:cNvPr id="13" name="TextBox 12">
+            <a:extLst>
+              <a:ext uri="{FF2B5EF4-FFF2-40B4-BE49-F238E27FC236}">
+                <a16:creationId xmlns:a16="http://schemas.microsoft.com/office/drawing/2014/main" id="{9E10D4DE-BC5C-F1FB-CBDC-C378F6979A41}"/>
+              </a:ext>
+            </a:extLst>
+          </p:cNvPr>
+          <p:cNvSpPr txBox="1"/>
+          <p:nvPr/>
+        </p:nvSpPr>
+        <p:spPr>
+          <a:xfrm>
+            <a:off x="422297" y="4541127"/>
+            <a:ext cx="3098477" cy="923330"/>
+          </a:xfrm>
+          <a:prstGeom prst="rect">
+            <a:avLst/>
+          </a:prstGeom>
+          <a:noFill/>
+        </p:spPr>
+        <p:txBody>
+          <a:bodyPr wrap="none" rtlCol="0">
+            <a:spAutoFit/>
+          </a:bodyPr>
+          <a:lstStyle/>
+          <a:p>
+            <a:r>
+              <a:rPr lang="en-US" dirty="0"/>
+              <a:t>GET Observation/?code=123</a:t>
+            </a:r>
+          </a:p>
+          <a:p>
+            <a:r>
+              <a:rPr lang="en-US" dirty="0"/>
+              <a:t>POST </a:t>
+            </a:r>
+            <a:r>
+              <a:rPr lang="en-US" dirty="0" err="1"/>
+              <a:t>MedicationRequest</a:t>
+            </a:r>
+            <a:endParaRPr lang="en-US" dirty="0"/>
+          </a:p>
+          <a:p>
+            <a:r>
+              <a:rPr lang="en-US" dirty="0"/>
+              <a:t>GET </a:t>
+            </a:r>
+            <a:r>
+              <a:rPr lang="en-US" dirty="0" err="1"/>
+              <a:t>PlanDefinition</a:t>
+            </a:r>
+            <a:r>
+              <a:rPr lang="en-US" dirty="0"/>
+              <a:t>/123/$apply</a:t>
+            </a:r>
+          </a:p>
+        </p:txBody>
+      </p:sp>
+    </p:spTree>
+    <p:extLst>
+      <p:ext uri="{BB962C8B-B14F-4D97-AF65-F5344CB8AC3E}">
+        <p14:creationId xmlns:p14="http://schemas.microsoft.com/office/powerpoint/2010/main" val="2104095440"/>
+      </p:ext>
+    </p:extLst>
+  </p:cSld>
+  <p:clrMapOvr>
+    <a:masterClrMapping/>
+  </p:clrMapOvr>
+</p:sld>
+</file>
+
+<file path=ppt/slides/slide12.xml><?xml version="1.0" encoding="utf-8"?>
 <p:sld xmlns:a="http://schemas.openxmlformats.org/drawingml/2006/main" xmlns:r="http://schemas.openxmlformats.org/officeDocument/2006/relationships" xmlns:p="http://schemas.openxmlformats.org/presentationml/2006/main">
   <p:cSld>
     <p:spTree>
@@ -10844,7 +11855,7 @@
 </p:sld>
 </file>
 
-<file path=ppt/slides/slide12.xml><?xml version="1.0" encoding="utf-8"?>
+<file path=ppt/slides/slide13.xml><?xml version="1.0" encoding="utf-8"?>
 <p:sld xmlns:a="http://schemas.openxmlformats.org/drawingml/2006/main" xmlns:r="http://schemas.openxmlformats.org/officeDocument/2006/relationships" xmlns:p="http://schemas.openxmlformats.org/presentationml/2006/main">
   <p:cSld>
     <p:spTree>
@@ -11153,7 +12164,7 @@
 </p:sld>
 </file>
 
-<file path=ppt/slides/slide13.xml><?xml version="1.0" encoding="utf-8"?>
+<file path=ppt/slides/slide14.xml><?xml version="1.0" encoding="utf-8"?>
 <p:sld xmlns:a="http://schemas.openxmlformats.org/drawingml/2006/main" xmlns:r="http://schemas.openxmlformats.org/officeDocument/2006/relationships" xmlns:p="http://schemas.openxmlformats.org/presentationml/2006/main">
   <p:cSld>
     <p:spTree>
@@ -12931,7 +13942,7 @@
 </p:sld>
 </file>
 
-<file path=ppt/slides/slide14.xml><?xml version="1.0" encoding="utf-8"?>
+<file path=ppt/slides/slide15.xml><?xml version="1.0" encoding="utf-8"?>
 <p:sld xmlns:a="http://schemas.openxmlformats.org/drawingml/2006/main" xmlns:r="http://schemas.openxmlformats.org/officeDocument/2006/relationships" xmlns:p="http://schemas.openxmlformats.org/presentationml/2006/main">
   <p:cSld>
     <p:spTree>
@@ -13239,7 +14250,7 @@
 </p:sld>
 </file>
 
-<file path=ppt/slides/slide15.xml><?xml version="1.0" encoding="utf-8"?>
+<file path=ppt/slides/slide16.xml><?xml version="1.0" encoding="utf-8"?>
 <p:sld xmlns:a="http://schemas.openxmlformats.org/drawingml/2006/main" xmlns:r="http://schemas.openxmlformats.org/officeDocument/2006/relationships" xmlns:p="http://schemas.openxmlformats.org/presentationml/2006/main">
   <p:cSld>
     <p:spTree>
@@ -14759,7 +15770,7 @@
 </p:sld>
 </file>
 
-<file path=ppt/slides/slide16.xml><?xml version="1.0" encoding="utf-8"?>
+<file path=ppt/slides/slide17.xml><?xml version="1.0" encoding="utf-8"?>
 <p:sld xmlns:a="http://schemas.openxmlformats.org/drawingml/2006/main" xmlns:r="http://schemas.openxmlformats.org/officeDocument/2006/relationships" xmlns:p="http://schemas.openxmlformats.org/presentationml/2006/main">
   <p:cSld>
     <p:spTree>
@@ -14784,8 +15795,8 @@
         </p:nvSpPr>
         <p:spPr>
           <a:xfrm>
-            <a:off x="166567" y="5999767"/>
-            <a:ext cx="1655200" cy="615513"/>
+            <a:off x="176100" y="6095268"/>
+            <a:ext cx="2218400" cy="615513"/>
           </a:xfrm>
           <a:prstGeom prst="rect">
             <a:avLst/>
@@ -14807,7 +15818,7 @@
                   <a:schemeClr val="dk2"/>
                 </a:solidFill>
               </a:rPr>
-              <a:t>Image</a:t>
+              <a:t>Image - 11/6</a:t>
             </a:r>
             <a:endParaRPr sz="2400">
               <a:solidFill>
@@ -14823,17 +15834,18 @@
           <p:cNvPicPr preferRelativeResize="0"/>
           <p:nvPr/>
         </p:nvPicPr>
-        <p:blipFill rotWithShape="1">
+        <p:blipFill>
           <a:blip r:embed="rId3">
             <a:alphaModFix/>
           </a:blip>
-          <a:srcRect l="4460" t="2674" r="12316" b="2834"/>
-          <a:stretch/>
+          <a:stretch>
+            <a:fillRect/>
+          </a:stretch>
         </p:blipFill>
         <p:spPr>
           <a:xfrm>
-            <a:off x="2951585" y="284600"/>
-            <a:ext cx="6288831" cy="6288800"/>
+            <a:off x="2597701" y="203201"/>
+            <a:ext cx="6451599" cy="6451599"/>
           </a:xfrm>
           <a:prstGeom prst="rect">
             <a:avLst/>
@@ -14852,7 +15864,7 @@
 </p:sld>
 </file>
 
-<file path=ppt/slides/slide17.xml><?xml version="1.0" encoding="utf-8"?>
+<file path=ppt/slides/slide18.xml><?xml version="1.0" encoding="utf-8"?>
 <p:sld xmlns:a="http://schemas.openxmlformats.org/drawingml/2006/main" xmlns:r="http://schemas.openxmlformats.org/officeDocument/2006/relationships" xmlns:p="http://schemas.openxmlformats.org/presentationml/2006/main">
   <p:cSld>
     <p:spTree>
@@ -14869,1140 +15881,976 @@
           <a:chExt cx="0" cy="0"/>
         </a:xfrm>
       </p:grpSpPr>
-      <p:grpSp>
-        <p:nvGrpSpPr>
+      <p:sp>
+        <p:nvSpPr>
           <p:cNvPr id="90" name="Google Shape;90;p19"/>
-          <p:cNvGrpSpPr/>
-          <p:nvPr/>
-        </p:nvGrpSpPr>
-        <p:grpSpPr>
-          <a:xfrm>
-            <a:off x="2759543" y="230268"/>
-            <a:ext cx="6716496" cy="6866960"/>
-            <a:chOff x="2069657" y="172701"/>
-            <a:chExt cx="5037372" cy="5150220"/>
-          </a:xfrm>
-        </p:grpSpPr>
-        <p:grpSp>
-          <p:nvGrpSpPr>
-            <p:cNvPr id="91" name="Google Shape;91;p19"/>
-            <p:cNvGrpSpPr/>
-            <p:nvPr/>
-          </p:nvGrpSpPr>
-          <p:grpSpPr>
-            <a:xfrm>
-              <a:off x="2069657" y="172701"/>
-              <a:ext cx="5037372" cy="5150220"/>
-              <a:chOff x="2069657" y="172701"/>
-              <a:chExt cx="5037372" cy="5150220"/>
-            </a:xfrm>
-          </p:grpSpPr>
-          <p:grpSp>
-            <p:nvGrpSpPr>
-              <p:cNvPr id="92" name="Google Shape;92;p19"/>
-              <p:cNvGrpSpPr/>
-              <p:nvPr/>
-            </p:nvGrpSpPr>
-            <p:grpSpPr>
-              <a:xfrm>
-                <a:off x="2151781" y="172701"/>
-                <a:ext cx="4955248" cy="5150220"/>
-                <a:chOff x="4408792" y="172701"/>
-                <a:chExt cx="4955248" cy="5150220"/>
-              </a:xfrm>
-            </p:grpSpPr>
-            <p:sp>
-              <p:nvSpPr>
-                <p:cNvPr id="93" name="Google Shape;93;p19"/>
-                <p:cNvSpPr/>
-                <p:nvPr/>
-              </p:nvSpPr>
-              <p:spPr>
-                <a:xfrm>
-                  <a:off x="4742875" y="746400"/>
-                  <a:ext cx="3886200" cy="3886200"/>
-                </a:xfrm>
-                <a:prstGeom prst="ellipse">
-                  <a:avLst/>
-                </a:prstGeom>
-                <a:noFill/>
-                <a:ln w="11150" cap="flat" cmpd="sng">
-                  <a:solidFill>
-                    <a:schemeClr val="dk2"/>
-                  </a:solidFill>
-                  <a:prstDash val="dot"/>
-                  <a:round/>
-                  <a:headEnd type="none" w="sm" len="sm"/>
-                  <a:tailEnd type="none" w="sm" len="sm"/>
-                </a:ln>
-              </p:spPr>
-              <p:txBody>
-                <a:bodyPr spcFirstLastPara="1" wrap="square" lIns="142300" tIns="142300" rIns="142300" bIns="142300" anchor="ctr" anchorCtr="0">
-                  <a:noAutofit/>
-                </a:bodyPr>
-                <a:lstStyle/>
-                <a:p>
-                  <a:pPr algn="ctr"/>
-                  <a:endParaRPr sz="2179"/>
-                </a:p>
-              </p:txBody>
-            </p:sp>
-            <p:sp>
-              <p:nvSpPr>
-                <p:cNvPr id="94" name="Google Shape;94;p19"/>
-                <p:cNvSpPr/>
-                <p:nvPr/>
-              </p:nvSpPr>
-              <p:spPr>
-                <a:xfrm>
-                  <a:off x="4857175" y="860700"/>
-                  <a:ext cx="3657600" cy="3657600"/>
-                </a:xfrm>
-                <a:prstGeom prst="flowChartOr">
-                  <a:avLst/>
-                </a:prstGeom>
+          <p:cNvSpPr/>
+          <p:nvPr/>
+        </p:nvSpPr>
+        <p:spPr>
+          <a:xfrm>
+            <a:off x="3464303" y="1173400"/>
+            <a:ext cx="4876800" cy="4876800"/>
+          </a:xfrm>
+          <a:prstGeom prst="flowChartOr">
+            <a:avLst/>
+          </a:prstGeom>
+          <a:solidFill>
+            <a:srgbClr val="C0CCE0"/>
+          </a:solidFill>
+          <a:ln w="28575" cap="flat" cmpd="sng">
+            <a:solidFill>
+              <a:schemeClr val="lt1"/>
+            </a:solidFill>
+            <a:prstDash val="solid"/>
+            <a:round/>
+            <a:headEnd type="none" w="sm" len="sm"/>
+            <a:tailEnd type="none" w="sm" len="sm"/>
+          </a:ln>
+        </p:spPr>
+        <p:txBody>
+          <a:bodyPr spcFirstLastPara="1" wrap="square" lIns="121900" tIns="121900" rIns="121900" bIns="121900" anchor="ctr" anchorCtr="0">
+            <a:noAutofit/>
+          </a:bodyPr>
+          <a:lstStyle/>
+          <a:p>
+            <a:pPr algn="ctr"/>
+            <a:endParaRPr sz="2400"/>
+          </a:p>
+        </p:txBody>
+      </p:sp>
+      <p:pic>
+        <p:nvPicPr>
+          <p:cNvPr id="91" name="Google Shape;91;p19"/>
+          <p:cNvPicPr preferRelativeResize="0"/>
+          <p:nvPr/>
+        </p:nvPicPr>
+        <p:blipFill>
+          <a:blip r:embed="rId3">
+            <a:alphaModFix/>
+          </a:blip>
+          <a:stretch>
+            <a:fillRect/>
+          </a:stretch>
+        </p:blipFill>
+        <p:spPr>
+          <a:xfrm>
+            <a:off x="2859633" y="584201"/>
+            <a:ext cx="6071568" cy="6071601"/>
+          </a:xfrm>
+          <a:prstGeom prst="rect">
+            <a:avLst/>
+          </a:prstGeom>
+          <a:noFill/>
+          <a:ln>
+            <a:noFill/>
+          </a:ln>
+        </p:spPr>
+      </p:pic>
+      <p:pic>
+        <p:nvPicPr>
+          <p:cNvPr id="92" name="Google Shape;92;p19"/>
+          <p:cNvPicPr preferRelativeResize="0"/>
+          <p:nvPr/>
+        </p:nvPicPr>
+        <p:blipFill>
+          <a:blip r:embed="rId4">
+            <a:alphaModFix/>
+          </a:blip>
+          <a:stretch>
+            <a:fillRect/>
+          </a:stretch>
+        </p:blipFill>
+        <p:spPr>
+          <a:xfrm rot="-7729510">
+            <a:off x="4378876" y="1671258"/>
+            <a:ext cx="4945193" cy="2754285"/>
+          </a:xfrm>
+          <a:prstGeom prst="rect">
+            <a:avLst/>
+          </a:prstGeom>
+          <a:noFill/>
+          <a:ln>
+            <a:noFill/>
+          </a:ln>
+        </p:spPr>
+      </p:pic>
+      <p:sp>
+        <p:nvSpPr>
+          <p:cNvPr id="93" name="Google Shape;93;p19"/>
+          <p:cNvSpPr/>
+          <p:nvPr/>
+        </p:nvSpPr>
+        <p:spPr>
+          <a:xfrm>
+            <a:off x="3312985" y="1023633"/>
+            <a:ext cx="5181600" cy="5181600"/>
+          </a:xfrm>
+          <a:prstGeom prst="ellipse">
+            <a:avLst/>
+          </a:prstGeom>
+          <a:noFill/>
+          <a:ln w="11150" cap="flat" cmpd="sng">
+            <a:solidFill>
+              <a:schemeClr val="dk2"/>
+            </a:solidFill>
+            <a:prstDash val="dot"/>
+            <a:round/>
+            <a:headEnd type="none" w="sm" len="sm"/>
+            <a:tailEnd type="none" w="sm" len="sm"/>
+          </a:ln>
+        </p:spPr>
+        <p:txBody>
+          <a:bodyPr spcFirstLastPara="1" wrap="square" lIns="142300" tIns="142300" rIns="142300" bIns="142300" anchor="ctr" anchorCtr="0">
+            <a:noAutofit/>
+          </a:bodyPr>
+          <a:lstStyle/>
+          <a:p>
+            <a:pPr algn="ctr"/>
+            <a:endParaRPr sz="2179"/>
+          </a:p>
+        </p:txBody>
+      </p:sp>
+      <p:sp>
+        <p:nvSpPr>
+          <p:cNvPr id="94" name="Google Shape;94;p19"/>
+          <p:cNvSpPr/>
+          <p:nvPr/>
+        </p:nvSpPr>
+        <p:spPr>
+          <a:xfrm rot="10800000">
+            <a:off x="3465401" y="1176045"/>
+            <a:ext cx="4876800" cy="4876800"/>
+          </a:xfrm>
+          <a:prstGeom prst="pie">
+            <a:avLst>
+              <a:gd name="adj1" fmla="val 10769458"/>
+              <a:gd name="adj2" fmla="val 16200000"/>
+            </a:avLst>
+          </a:prstGeom>
+          <a:solidFill>
+            <a:srgbClr val="FEE1D3"/>
+          </a:solidFill>
+          <a:ln w="29775" cap="flat" cmpd="sng">
+            <a:solidFill>
+              <a:schemeClr val="lt1"/>
+            </a:solidFill>
+            <a:prstDash val="solid"/>
+            <a:round/>
+            <a:headEnd type="none" w="sm" len="sm"/>
+            <a:tailEnd type="none" w="sm" len="sm"/>
+          </a:ln>
+        </p:spPr>
+        <p:txBody>
+          <a:bodyPr spcFirstLastPara="1" wrap="square" lIns="339100" tIns="339100" rIns="339100" bIns="339100" anchor="ctr" anchorCtr="0">
+            <a:noAutofit/>
+          </a:bodyPr>
+          <a:lstStyle/>
+          <a:p>
+            <a:pPr algn="ctr"/>
+            <a:endParaRPr sz="5192"/>
+          </a:p>
+        </p:txBody>
+      </p:sp>
+      <p:sp>
+        <p:nvSpPr>
+          <p:cNvPr id="95" name="Google Shape;95;p19"/>
+          <p:cNvSpPr/>
+          <p:nvPr/>
+        </p:nvSpPr>
+        <p:spPr>
+          <a:xfrm rot="10800000" flipH="1">
+            <a:off x="3465401" y="1176045"/>
+            <a:ext cx="4876800" cy="4876800"/>
+          </a:xfrm>
+          <a:prstGeom prst="pie">
+            <a:avLst>
+              <a:gd name="adj1" fmla="val 10768123"/>
+              <a:gd name="adj2" fmla="val 16200000"/>
+            </a:avLst>
+          </a:prstGeom>
+          <a:solidFill>
+            <a:srgbClr val="E4EDDB"/>
+          </a:solidFill>
+          <a:ln w="29775" cap="flat" cmpd="sng">
+            <a:solidFill>
+              <a:schemeClr val="lt1"/>
+            </a:solidFill>
+            <a:prstDash val="solid"/>
+            <a:round/>
+            <a:headEnd type="none" w="sm" len="sm"/>
+            <a:tailEnd type="none" w="sm" len="sm"/>
+          </a:ln>
+        </p:spPr>
+        <p:txBody>
+          <a:bodyPr spcFirstLastPara="1" wrap="square" lIns="339100" tIns="339100" rIns="339100" bIns="339100" anchor="ctr" anchorCtr="0">
+            <a:noAutofit/>
+          </a:bodyPr>
+          <a:lstStyle/>
+          <a:p>
+            <a:pPr algn="ctr"/>
+            <a:endParaRPr sz="5192"/>
+          </a:p>
+        </p:txBody>
+      </p:sp>
+      <p:sp>
+        <p:nvSpPr>
+          <p:cNvPr id="96" name="Google Shape;96;p19"/>
+          <p:cNvSpPr/>
+          <p:nvPr/>
+        </p:nvSpPr>
+        <p:spPr>
+          <a:xfrm flipH="1">
+            <a:off x="3465401" y="1168145"/>
+            <a:ext cx="4876800" cy="4876800"/>
+          </a:xfrm>
+          <a:prstGeom prst="pie">
+            <a:avLst>
+              <a:gd name="adj1" fmla="val 10819412"/>
+              <a:gd name="adj2" fmla="val 16200000"/>
+            </a:avLst>
+          </a:prstGeom>
+          <a:solidFill>
+            <a:srgbClr val="CAD1D8"/>
+          </a:solidFill>
+          <a:ln w="29775" cap="flat" cmpd="sng">
+            <a:solidFill>
+              <a:schemeClr val="lt1"/>
+            </a:solidFill>
+            <a:prstDash val="solid"/>
+            <a:round/>
+            <a:headEnd type="none" w="sm" len="sm"/>
+            <a:tailEnd type="none" w="sm" len="sm"/>
+          </a:ln>
+        </p:spPr>
+        <p:txBody>
+          <a:bodyPr spcFirstLastPara="1" wrap="square" lIns="339100" tIns="339100" rIns="339100" bIns="339100" anchor="ctr" anchorCtr="0">
+            <a:noAutofit/>
+          </a:bodyPr>
+          <a:lstStyle/>
+          <a:p>
+            <a:pPr algn="ctr"/>
+            <a:endParaRPr sz="5192"/>
+          </a:p>
+        </p:txBody>
+      </p:sp>
+      <p:sp>
+        <p:nvSpPr>
+          <p:cNvPr id="97" name="Google Shape;97;p19"/>
+          <p:cNvSpPr/>
+          <p:nvPr/>
+        </p:nvSpPr>
+        <p:spPr>
+          <a:xfrm>
+            <a:off x="3770185" y="1480833"/>
+            <a:ext cx="4267200" cy="4267200"/>
+          </a:xfrm>
+          <a:prstGeom prst="flowChartOr">
+            <a:avLst/>
+          </a:prstGeom>
+          <a:solidFill>
+            <a:srgbClr val="305698"/>
+          </a:solidFill>
+          <a:ln w="25000" cap="flat" cmpd="sng">
+            <a:solidFill>
+              <a:schemeClr val="lt1"/>
+            </a:solidFill>
+            <a:prstDash val="solid"/>
+            <a:round/>
+            <a:headEnd type="none" w="sm" len="sm"/>
+            <a:tailEnd type="none" w="sm" len="sm"/>
+          </a:ln>
+        </p:spPr>
+        <p:txBody>
+          <a:bodyPr spcFirstLastPara="1" wrap="square" lIns="106667" tIns="106667" rIns="106667" bIns="106667" anchor="ctr" anchorCtr="0">
+            <a:noAutofit/>
+          </a:bodyPr>
+          <a:lstStyle/>
+          <a:p>
+            <a:pPr algn="ctr"/>
+            <a:endParaRPr sz="1632"/>
+          </a:p>
+        </p:txBody>
+      </p:sp>
+      <p:sp>
+        <p:nvSpPr>
+          <p:cNvPr id="98" name="Google Shape;98;p19"/>
+          <p:cNvSpPr/>
+          <p:nvPr/>
+        </p:nvSpPr>
+        <p:spPr>
+          <a:xfrm flipH="1">
+            <a:off x="3770201" y="1480845"/>
+            <a:ext cx="4267200" cy="4267200"/>
+          </a:xfrm>
+          <a:prstGeom prst="pie">
+            <a:avLst>
+              <a:gd name="adj1" fmla="val 10768123"/>
+              <a:gd name="adj2" fmla="val 16200000"/>
+            </a:avLst>
+          </a:prstGeom>
+          <a:solidFill>
+            <a:srgbClr val="1F295B"/>
+          </a:solidFill>
+          <a:ln w="26050" cap="flat" cmpd="sng">
+            <a:solidFill>
+              <a:schemeClr val="lt1"/>
+            </a:solidFill>
+            <a:prstDash val="solid"/>
+            <a:round/>
+            <a:headEnd type="none" w="sm" len="sm"/>
+            <a:tailEnd type="none" w="sm" len="sm"/>
+          </a:ln>
+        </p:spPr>
+        <p:txBody>
+          <a:bodyPr spcFirstLastPara="1" wrap="square" lIns="296733" tIns="296733" rIns="296733" bIns="296733" anchor="ctr" anchorCtr="0">
+            <a:noAutofit/>
+          </a:bodyPr>
+          <a:lstStyle/>
+          <a:p>
+            <a:pPr algn="ctr"/>
+            <a:endParaRPr sz="4543"/>
+          </a:p>
+        </p:txBody>
+      </p:sp>
+      <p:sp>
+        <p:nvSpPr>
+          <p:cNvPr id="99" name="Google Shape;99;p19"/>
+          <p:cNvSpPr/>
+          <p:nvPr/>
+        </p:nvSpPr>
+        <p:spPr>
+          <a:xfrm rot="10800000">
+            <a:off x="3770201" y="1472945"/>
+            <a:ext cx="4267200" cy="4267200"/>
+          </a:xfrm>
+          <a:prstGeom prst="pie">
+            <a:avLst>
+              <a:gd name="adj1" fmla="val 10788092"/>
+              <a:gd name="adj2" fmla="val 16200000"/>
+            </a:avLst>
+          </a:prstGeom>
+          <a:solidFill>
+            <a:srgbClr val="EE7B2F"/>
+          </a:solidFill>
+          <a:ln w="26050" cap="flat" cmpd="sng">
+            <a:solidFill>
+              <a:schemeClr val="lt1"/>
+            </a:solidFill>
+            <a:prstDash val="solid"/>
+            <a:round/>
+            <a:headEnd type="none" w="sm" len="sm"/>
+            <a:tailEnd type="none" w="sm" len="sm"/>
+          </a:ln>
+        </p:spPr>
+        <p:txBody>
+          <a:bodyPr spcFirstLastPara="1" wrap="square" lIns="296733" tIns="296733" rIns="296733" bIns="296733" anchor="ctr" anchorCtr="0">
+            <a:noAutofit/>
+          </a:bodyPr>
+          <a:lstStyle/>
+          <a:p>
+            <a:pPr algn="ctr"/>
+            <a:endParaRPr sz="4543"/>
+          </a:p>
+        </p:txBody>
+      </p:sp>
+      <p:sp>
+        <p:nvSpPr>
+          <p:cNvPr id="100" name="Google Shape;100;p19"/>
+          <p:cNvSpPr/>
+          <p:nvPr/>
+        </p:nvSpPr>
+        <p:spPr>
+          <a:xfrm rot="10800000" flipH="1">
+            <a:off x="3770201" y="1480845"/>
+            <a:ext cx="4267200" cy="4267200"/>
+          </a:xfrm>
+          <a:prstGeom prst="pie">
+            <a:avLst>
+              <a:gd name="adj1" fmla="val 10768123"/>
+              <a:gd name="adj2" fmla="val 16200000"/>
+            </a:avLst>
+          </a:prstGeom>
+          <a:solidFill>
+            <a:srgbClr val="71AD49"/>
+          </a:solidFill>
+          <a:ln w="26050" cap="flat" cmpd="sng">
+            <a:solidFill>
+              <a:schemeClr val="lt1"/>
+            </a:solidFill>
+            <a:prstDash val="solid"/>
+            <a:round/>
+            <a:headEnd type="none" w="sm" len="sm"/>
+            <a:tailEnd type="none" w="sm" len="sm"/>
+          </a:ln>
+        </p:spPr>
+        <p:txBody>
+          <a:bodyPr spcFirstLastPara="1" wrap="square" lIns="296733" tIns="296733" rIns="296733" bIns="296733" anchor="ctr" anchorCtr="0">
+            <a:noAutofit/>
+          </a:bodyPr>
+          <a:lstStyle/>
+          <a:p>
+            <a:pPr algn="ctr"/>
+            <a:endParaRPr sz="4543"/>
+          </a:p>
+        </p:txBody>
+      </p:sp>
+      <p:sp>
+        <p:nvSpPr>
+          <p:cNvPr id="101" name="Google Shape;101;p19"/>
+          <p:cNvSpPr txBox="1"/>
+          <p:nvPr/>
+        </p:nvSpPr>
+        <p:spPr>
+          <a:xfrm>
+            <a:off x="176100" y="6095268"/>
+            <a:ext cx="2218400" cy="615513"/>
+          </a:xfrm>
+          <a:prstGeom prst="rect">
+            <a:avLst/>
+          </a:prstGeom>
+          <a:noFill/>
+          <a:ln>
+            <a:noFill/>
+          </a:ln>
+        </p:spPr>
+        <p:txBody>
+          <a:bodyPr spcFirstLastPara="1" wrap="square" lIns="121900" tIns="121900" rIns="121900" bIns="121900" anchor="t" anchorCtr="0">
+            <a:spAutoFit/>
+          </a:bodyPr>
+          <a:lstStyle/>
+          <a:p>
+            <a:r>
+              <a:rPr lang="en" sz="2400">
                 <a:solidFill>
-                  <a:srgbClr val="C0CCE0"/>
+                  <a:schemeClr val="dk2"/>
                 </a:solidFill>
-                <a:ln w="28575" cap="flat" cmpd="sng">
-                  <a:solidFill>
-                    <a:schemeClr val="lt1"/>
-                  </a:solidFill>
-                  <a:prstDash val="solid"/>
-                  <a:round/>
-                  <a:headEnd type="none" w="sm" len="sm"/>
-                  <a:tailEnd type="none" w="sm" len="sm"/>
-                </a:ln>
-              </p:spPr>
-              <p:txBody>
-                <a:bodyPr spcFirstLastPara="1" wrap="square" lIns="121900" tIns="121900" rIns="121900" bIns="121900" anchor="ctr" anchorCtr="0">
-                  <a:noAutofit/>
-                </a:bodyPr>
-                <a:lstStyle/>
-                <a:p>
-                  <a:pPr algn="ctr"/>
-                  <a:endParaRPr sz="2400"/>
-                </a:p>
-              </p:txBody>
-            </p:sp>
-            <p:sp>
-              <p:nvSpPr>
-                <p:cNvPr id="95" name="Google Shape;95;p19"/>
-                <p:cNvSpPr/>
-                <p:nvPr/>
-              </p:nvSpPr>
-              <p:spPr>
-                <a:xfrm flipH="1">
-                  <a:off x="4857187" y="854784"/>
-                  <a:ext cx="3657600" cy="3657600"/>
-                </a:xfrm>
-                <a:prstGeom prst="pie">
-                  <a:avLst>
-                    <a:gd name="adj1" fmla="val 10768123"/>
-                    <a:gd name="adj2" fmla="val 16200000"/>
-                  </a:avLst>
-                </a:prstGeom>
-                <a:solidFill>
-                  <a:srgbClr val="CAD1D8"/>
-                </a:solidFill>
-                <a:ln w="29775" cap="flat" cmpd="sng">
-                  <a:solidFill>
-                    <a:schemeClr val="lt1"/>
-                  </a:solidFill>
-                  <a:prstDash val="solid"/>
-                  <a:round/>
-                  <a:headEnd type="none" w="sm" len="sm"/>
-                  <a:tailEnd type="none" w="sm" len="sm"/>
-                </a:ln>
-              </p:spPr>
-              <p:txBody>
-                <a:bodyPr spcFirstLastPara="1" wrap="square" lIns="339100" tIns="339100" rIns="339100" bIns="339100" anchor="ctr" anchorCtr="0">
-                  <a:noAutofit/>
-                </a:bodyPr>
-                <a:lstStyle/>
-                <a:p>
-                  <a:pPr algn="ctr"/>
-                  <a:endParaRPr sz="5192"/>
-                </a:p>
-              </p:txBody>
-            </p:sp>
-            <p:sp>
-              <p:nvSpPr>
-                <p:cNvPr id="96" name="Google Shape;96;p19"/>
-                <p:cNvSpPr/>
-                <p:nvPr/>
-              </p:nvSpPr>
-              <p:spPr>
-                <a:xfrm rot="10800000" flipH="1">
-                  <a:off x="4857186" y="860709"/>
-                  <a:ext cx="3657600" cy="3657600"/>
-                </a:xfrm>
-                <a:prstGeom prst="pie">
-                  <a:avLst>
-                    <a:gd name="adj1" fmla="val 10768123"/>
-                    <a:gd name="adj2" fmla="val 16200000"/>
-                  </a:avLst>
-                </a:prstGeom>
-                <a:solidFill>
-                  <a:srgbClr val="E4EDDB"/>
-                </a:solidFill>
-                <a:ln w="29775" cap="flat" cmpd="sng">
-                  <a:solidFill>
-                    <a:schemeClr val="lt1"/>
-                  </a:solidFill>
-                  <a:prstDash val="solid"/>
-                  <a:round/>
-                  <a:headEnd type="none" w="sm" len="sm"/>
-                  <a:tailEnd type="none" w="sm" len="sm"/>
-                </a:ln>
-              </p:spPr>
-              <p:txBody>
-                <a:bodyPr spcFirstLastPara="1" wrap="square" lIns="339100" tIns="339100" rIns="339100" bIns="339100" anchor="ctr" anchorCtr="0">
-                  <a:noAutofit/>
-                </a:bodyPr>
-                <a:lstStyle/>
-                <a:p>
-                  <a:pPr algn="ctr"/>
-                  <a:endParaRPr sz="5192"/>
-                </a:p>
-              </p:txBody>
-            </p:sp>
-            <p:sp>
-              <p:nvSpPr>
-                <p:cNvPr id="97" name="Google Shape;97;p19"/>
-                <p:cNvSpPr/>
-                <p:nvPr/>
-              </p:nvSpPr>
-              <p:spPr>
-                <a:xfrm rot="10800000">
-                  <a:off x="4857187" y="860709"/>
-                  <a:ext cx="3657600" cy="3657600"/>
-                </a:xfrm>
-                <a:prstGeom prst="pie">
-                  <a:avLst>
-                    <a:gd name="adj1" fmla="val 10768123"/>
-                    <a:gd name="adj2" fmla="val 16200000"/>
-                  </a:avLst>
-                </a:prstGeom>
-                <a:solidFill>
-                  <a:srgbClr val="FEE1D3"/>
-                </a:solidFill>
-                <a:ln w="29775" cap="flat" cmpd="sng">
-                  <a:solidFill>
-                    <a:schemeClr val="lt1"/>
-                  </a:solidFill>
-                  <a:prstDash val="solid"/>
-                  <a:round/>
-                  <a:headEnd type="none" w="sm" len="sm"/>
-                  <a:tailEnd type="none" w="sm" len="sm"/>
-                </a:ln>
-              </p:spPr>
-              <p:txBody>
-                <a:bodyPr spcFirstLastPara="1" wrap="square" lIns="339100" tIns="339100" rIns="339100" bIns="339100" anchor="ctr" anchorCtr="0">
-                  <a:noAutofit/>
-                </a:bodyPr>
-                <a:lstStyle/>
-                <a:p>
-                  <a:pPr algn="ctr"/>
-                  <a:endParaRPr sz="5192"/>
-                </a:p>
-              </p:txBody>
-            </p:sp>
-            <p:sp>
-              <p:nvSpPr>
-                <p:cNvPr id="98" name="Google Shape;98;p19"/>
-                <p:cNvSpPr/>
-                <p:nvPr/>
-              </p:nvSpPr>
-              <p:spPr>
-                <a:xfrm>
-                  <a:off x="5085775" y="1089300"/>
-                  <a:ext cx="3200400" cy="3200400"/>
-                </a:xfrm>
-                <a:prstGeom prst="flowChartOr">
-                  <a:avLst/>
-                </a:prstGeom>
-                <a:solidFill>
-                  <a:srgbClr val="305698"/>
-                </a:solidFill>
-                <a:ln w="25000" cap="flat" cmpd="sng">
-                  <a:solidFill>
-                    <a:schemeClr val="lt1"/>
-                  </a:solidFill>
-                  <a:prstDash val="solid"/>
-                  <a:round/>
-                  <a:headEnd type="none" w="sm" len="sm"/>
-                  <a:tailEnd type="none" w="sm" len="sm"/>
-                </a:ln>
-              </p:spPr>
-              <p:txBody>
-                <a:bodyPr spcFirstLastPara="1" wrap="square" lIns="106667" tIns="106667" rIns="106667" bIns="106667" anchor="ctr" anchorCtr="0">
-                  <a:noAutofit/>
-                </a:bodyPr>
-                <a:lstStyle/>
-                <a:p>
-                  <a:pPr algn="ctr"/>
-                  <a:endParaRPr sz="1632"/>
-                </a:p>
-              </p:txBody>
-            </p:sp>
-            <p:sp>
-              <p:nvSpPr>
-                <p:cNvPr id="99" name="Google Shape;99;p19"/>
-                <p:cNvSpPr/>
-                <p:nvPr/>
-              </p:nvSpPr>
-              <p:spPr>
-                <a:xfrm flipH="1">
-                  <a:off x="5085787" y="1089309"/>
-                  <a:ext cx="3200400" cy="3200400"/>
-                </a:xfrm>
-                <a:prstGeom prst="pie">
-                  <a:avLst>
-                    <a:gd name="adj1" fmla="val 10768123"/>
-                    <a:gd name="adj2" fmla="val 16200000"/>
-                  </a:avLst>
-                </a:prstGeom>
-                <a:solidFill>
-                  <a:srgbClr val="1F295B"/>
-                </a:solidFill>
-                <a:ln w="26050" cap="flat" cmpd="sng">
-                  <a:solidFill>
-                    <a:schemeClr val="lt1"/>
-                  </a:solidFill>
-                  <a:prstDash val="solid"/>
-                  <a:round/>
-                  <a:headEnd type="none" w="sm" len="sm"/>
-                  <a:tailEnd type="none" w="sm" len="sm"/>
-                </a:ln>
-              </p:spPr>
-              <p:txBody>
-                <a:bodyPr spcFirstLastPara="1" wrap="square" lIns="296733" tIns="296733" rIns="296733" bIns="296733" anchor="ctr" anchorCtr="0">
-                  <a:noAutofit/>
-                </a:bodyPr>
-                <a:lstStyle/>
-                <a:p>
-                  <a:pPr algn="ctr"/>
-                  <a:endParaRPr sz="4543"/>
-                </a:p>
-              </p:txBody>
-            </p:sp>
-            <p:sp>
-              <p:nvSpPr>
-                <p:cNvPr id="100" name="Google Shape;100;p19"/>
-                <p:cNvSpPr/>
-                <p:nvPr/>
-              </p:nvSpPr>
-              <p:spPr>
-                <a:xfrm rot="10800000" flipH="1">
-                  <a:off x="5085786" y="1089309"/>
-                  <a:ext cx="3200400" cy="3200400"/>
-                </a:xfrm>
-                <a:prstGeom prst="pie">
-                  <a:avLst>
-                    <a:gd name="adj1" fmla="val 10768123"/>
-                    <a:gd name="adj2" fmla="val 16200000"/>
-                  </a:avLst>
-                </a:prstGeom>
-                <a:solidFill>
-                  <a:srgbClr val="71AD49"/>
-                </a:solidFill>
-                <a:ln w="26050" cap="flat" cmpd="sng">
-                  <a:solidFill>
-                    <a:schemeClr val="lt1"/>
-                  </a:solidFill>
-                  <a:prstDash val="solid"/>
-                  <a:round/>
-                  <a:headEnd type="none" w="sm" len="sm"/>
-                  <a:tailEnd type="none" w="sm" len="sm"/>
-                </a:ln>
-              </p:spPr>
-              <p:txBody>
-                <a:bodyPr spcFirstLastPara="1" wrap="square" lIns="296733" tIns="296733" rIns="296733" bIns="296733" anchor="ctr" anchorCtr="0">
-                  <a:noAutofit/>
-                </a:bodyPr>
-                <a:lstStyle/>
-                <a:p>
-                  <a:pPr algn="ctr"/>
-                  <a:endParaRPr sz="4543"/>
-                </a:p>
-              </p:txBody>
-            </p:sp>
-            <p:sp>
-              <p:nvSpPr>
-                <p:cNvPr id="101" name="Google Shape;101;p19"/>
-                <p:cNvSpPr/>
-                <p:nvPr/>
-              </p:nvSpPr>
-              <p:spPr>
-                <a:xfrm rot="10800000">
-                  <a:off x="5085787" y="1083384"/>
-                  <a:ext cx="3200400" cy="3200400"/>
-                </a:xfrm>
-                <a:prstGeom prst="pie">
-                  <a:avLst>
-                    <a:gd name="adj1" fmla="val 10768123"/>
-                    <a:gd name="adj2" fmla="val 16200000"/>
-                  </a:avLst>
-                </a:prstGeom>
-                <a:solidFill>
-                  <a:srgbClr val="EE7B2F"/>
-                </a:solidFill>
-                <a:ln w="26050" cap="flat" cmpd="sng">
-                  <a:solidFill>
-                    <a:schemeClr val="lt1"/>
-                  </a:solidFill>
-                  <a:prstDash val="solid"/>
-                  <a:round/>
-                  <a:headEnd type="none" w="sm" len="sm"/>
-                  <a:tailEnd type="none" w="sm" len="sm"/>
-                </a:ln>
-              </p:spPr>
-              <p:txBody>
-                <a:bodyPr spcFirstLastPara="1" wrap="square" lIns="296733" tIns="296733" rIns="296733" bIns="296733" anchor="ctr" anchorCtr="0">
-                  <a:noAutofit/>
-                </a:bodyPr>
-                <a:lstStyle/>
-                <a:p>
-                  <a:pPr algn="ctr"/>
-                  <a:endParaRPr sz="4543"/>
-                </a:p>
-              </p:txBody>
-            </p:sp>
-            <p:pic>
-              <p:nvPicPr>
-                <p:cNvPr id="102" name="Google Shape;102;p19" title="EBM (1).png"/>
-                <p:cNvPicPr preferRelativeResize="0"/>
-                <p:nvPr/>
-              </p:nvPicPr>
-              <p:blipFill>
-                <a:blip r:embed="rId3">
-                  <a:alphaModFix/>
-                </a:blip>
-                <a:stretch>
-                  <a:fillRect/>
-                </a:stretch>
-              </p:blipFill>
-              <p:spPr>
-                <a:xfrm>
-                  <a:off x="5540875" y="1538475"/>
-                  <a:ext cx="2290200" cy="2290200"/>
-                </a:xfrm>
-                <a:prstGeom prst="ellipse">
-                  <a:avLst/>
-                </a:prstGeom>
-                <a:noFill/>
-                <a:ln>
-                  <a:noFill/>
-                </a:ln>
-              </p:spPr>
-            </p:pic>
-            <p:pic>
-              <p:nvPicPr>
-                <p:cNvPr id="103" name="Google Shape;103;p19"/>
-                <p:cNvPicPr preferRelativeResize="0"/>
-                <p:nvPr/>
-              </p:nvPicPr>
-              <p:blipFill>
-                <a:blip r:embed="rId4">
-                  <a:alphaModFix/>
-                </a:blip>
-                <a:stretch>
-                  <a:fillRect/>
-                </a:stretch>
-              </p:blipFill>
-              <p:spPr>
-                <a:xfrm rot="1769116">
-                  <a:off x="4927740" y="910274"/>
-                  <a:ext cx="2861725" cy="2861725"/>
-                </a:xfrm>
-                <a:prstGeom prst="rect">
-                  <a:avLst/>
-                </a:prstGeom>
-                <a:noFill/>
-                <a:ln>
-                  <a:noFill/>
-                </a:ln>
-              </p:spPr>
-            </p:pic>
-            <p:pic>
-              <p:nvPicPr>
-                <p:cNvPr id="104" name="Google Shape;104;p19"/>
-                <p:cNvPicPr preferRelativeResize="0"/>
-                <p:nvPr/>
-              </p:nvPicPr>
-              <p:blipFill>
-                <a:blip r:embed="rId5">
-                  <a:alphaModFix/>
-                </a:blip>
-                <a:stretch>
-                  <a:fillRect/>
-                </a:stretch>
-              </p:blipFill>
-              <p:spPr>
-                <a:xfrm rot="6693886">
-                  <a:off x="5773310" y="913823"/>
-                  <a:ext cx="2527642" cy="2527642"/>
-                </a:xfrm>
-                <a:prstGeom prst="rect">
-                  <a:avLst/>
-                </a:prstGeom>
-                <a:noFill/>
-                <a:ln>
-                  <a:noFill/>
-                </a:ln>
-              </p:spPr>
-            </p:pic>
-            <p:pic>
-              <p:nvPicPr>
-                <p:cNvPr id="105" name="Google Shape;105;p19"/>
-                <p:cNvPicPr preferRelativeResize="0"/>
-                <p:nvPr/>
-              </p:nvPicPr>
-              <p:blipFill>
-                <a:blip r:embed="rId6">
-                  <a:alphaModFix/>
-                </a:blip>
-                <a:stretch>
-                  <a:fillRect/>
-                </a:stretch>
-              </p:blipFill>
-              <p:spPr>
-                <a:xfrm rot="-2029044">
-                  <a:off x="5238118" y="2466140"/>
-                  <a:ext cx="3624800" cy="2018875"/>
-                </a:xfrm>
-                <a:prstGeom prst="rect">
-                  <a:avLst/>
-                </a:prstGeom>
-                <a:noFill/>
-                <a:ln>
-                  <a:noFill/>
-                </a:ln>
-              </p:spPr>
-            </p:pic>
-            <p:pic>
-              <p:nvPicPr>
-                <p:cNvPr id="106" name="Google Shape;106;p19"/>
-                <p:cNvPicPr preferRelativeResize="0"/>
-                <p:nvPr/>
-              </p:nvPicPr>
-              <p:blipFill>
-                <a:blip r:embed="rId7">
-                  <a:alphaModFix/>
-                </a:blip>
-                <a:stretch>
-                  <a:fillRect/>
-                </a:stretch>
-              </p:blipFill>
-              <p:spPr>
-                <a:xfrm rot="-7729510">
-                  <a:off x="5542292" y="1232118"/>
-                  <a:ext cx="3708895" cy="2065714"/>
-                </a:xfrm>
-                <a:prstGeom prst="rect">
-                  <a:avLst/>
-                </a:prstGeom>
-                <a:noFill/>
-                <a:ln>
-                  <a:noFill/>
-                </a:ln>
-              </p:spPr>
-            </p:pic>
-          </p:grpSp>
-          <p:sp>
-            <p:nvSpPr>
-              <p:cNvPr id="107" name="Google Shape;107;p19"/>
-              <p:cNvSpPr txBox="1"/>
-              <p:nvPr/>
-            </p:nvSpPr>
-            <p:spPr>
-              <a:xfrm rot="18002361">
-                <a:off x="2857100" y="1967627"/>
-                <a:ext cx="803644" cy="153841"/>
-              </a:xfrm>
-              <a:prstGeom prst="rect">
-                <a:avLst/>
-              </a:prstGeom>
-              <a:noFill/>
-              <a:ln>
-                <a:noFill/>
-              </a:ln>
-            </p:spPr>
-            <p:txBody>
-              <a:bodyPr spcFirstLastPara="1" wrap="square" lIns="0" tIns="0" rIns="0" bIns="0" anchor="t" anchorCtr="0">
-                <a:spAutoFit/>
-              </a:bodyPr>
-              <a:lstStyle/>
-              <a:p>
-                <a:r>
-                  <a:rPr lang="en" sz="1333">
-                    <a:solidFill>
-                      <a:schemeClr val="lt1"/>
-                    </a:solidFill>
-                  </a:rPr>
-                  <a:t>Measurement</a:t>
-                </a:r>
-                <a:endParaRPr sz="1333">
-                  <a:solidFill>
-                    <a:schemeClr val="lt1"/>
-                  </a:solidFill>
-                </a:endParaRPr>
-              </a:p>
-            </p:txBody>
-          </p:sp>
-          <p:sp>
-            <p:nvSpPr>
-              <p:cNvPr id="108" name="Google Shape;108;p19"/>
-              <p:cNvSpPr txBox="1"/>
-              <p:nvPr/>
-            </p:nvSpPr>
-            <p:spPr>
-              <a:xfrm rot="20399580">
-                <a:off x="3642409" y="1372598"/>
-                <a:ext cx="553291" cy="153841"/>
-              </a:xfrm>
-              <a:prstGeom prst="rect">
-                <a:avLst/>
-              </a:prstGeom>
-              <a:noFill/>
-              <a:ln>
-                <a:noFill/>
-              </a:ln>
-            </p:spPr>
-            <p:txBody>
-              <a:bodyPr spcFirstLastPara="1" wrap="square" lIns="0" tIns="0" rIns="0" bIns="0" anchor="t" anchorCtr="0">
-                <a:spAutoFit/>
-              </a:bodyPr>
-              <a:lstStyle/>
-              <a:p>
-                <a:r>
-                  <a:rPr lang="en" sz="1333">
-                    <a:solidFill>
-                      <a:schemeClr val="lt1"/>
-                    </a:solidFill>
-                  </a:rPr>
-                  <a:t>Analysis</a:t>
-                </a:r>
-                <a:endParaRPr sz="1333">
-                  <a:solidFill>
-                    <a:schemeClr val="lt1"/>
-                  </a:solidFill>
-                </a:endParaRPr>
-              </a:p>
-            </p:txBody>
-          </p:sp>
-          <p:sp>
-            <p:nvSpPr>
-              <p:cNvPr id="109" name="Google Shape;109;p19"/>
-              <p:cNvSpPr txBox="1"/>
-              <p:nvPr/>
-            </p:nvSpPr>
-            <p:spPr>
-              <a:xfrm rot="1193697">
-                <a:off x="4649927" y="1372599"/>
-                <a:ext cx="632977" cy="153841"/>
-              </a:xfrm>
-              <a:prstGeom prst="rect">
-                <a:avLst/>
-              </a:prstGeom>
-              <a:noFill/>
-              <a:ln>
-                <a:noFill/>
-              </a:ln>
-            </p:spPr>
-            <p:txBody>
-              <a:bodyPr spcFirstLastPara="1" wrap="square" lIns="0" tIns="0" rIns="0" bIns="0" anchor="t" anchorCtr="0">
-                <a:spAutoFit/>
-              </a:bodyPr>
-              <a:lstStyle/>
-              <a:p>
-                <a:r>
-                  <a:rPr lang="en" sz="1333">
-                    <a:solidFill>
-                      <a:schemeClr val="lt1"/>
-                    </a:solidFill>
-                  </a:rPr>
-                  <a:t>Guidelines</a:t>
-                </a:r>
-                <a:endParaRPr sz="1333">
-                  <a:solidFill>
-                    <a:schemeClr val="lt1"/>
-                  </a:solidFill>
-                </a:endParaRPr>
-              </a:p>
-            </p:txBody>
-          </p:sp>
-          <p:sp>
-            <p:nvSpPr>
-              <p:cNvPr id="110" name="Google Shape;110;p19"/>
-              <p:cNvSpPr txBox="1"/>
-              <p:nvPr/>
-            </p:nvSpPr>
-            <p:spPr>
-              <a:xfrm rot="3598626">
-                <a:off x="5337240" y="1900018"/>
-                <a:ext cx="582796" cy="307681"/>
-              </a:xfrm>
-              <a:prstGeom prst="rect">
-                <a:avLst/>
-              </a:prstGeom>
-              <a:noFill/>
-              <a:ln>
-                <a:noFill/>
-              </a:ln>
-            </p:spPr>
-            <p:txBody>
-              <a:bodyPr spcFirstLastPara="1" wrap="square" lIns="0" tIns="0" rIns="0" bIns="0" anchor="t" anchorCtr="0">
-                <a:spAutoFit/>
-              </a:bodyPr>
-              <a:lstStyle/>
-              <a:p>
-                <a:pPr algn="ctr"/>
-                <a:r>
-                  <a:rPr lang="en" sz="1333">
-                    <a:solidFill>
-                      <a:schemeClr val="lt1"/>
-                    </a:solidFill>
-                  </a:rPr>
-                  <a:t>Decision</a:t>
-                </a:r>
-                <a:endParaRPr sz="1333">
-                  <a:solidFill>
-                    <a:schemeClr val="lt1"/>
-                  </a:solidFill>
-                </a:endParaRPr>
-              </a:p>
-              <a:p>
-                <a:pPr algn="ctr"/>
-                <a:r>
-                  <a:rPr lang="en" sz="1333">
-                    <a:solidFill>
-                      <a:schemeClr val="lt1"/>
-                    </a:solidFill>
-                  </a:rPr>
-                  <a:t>Support</a:t>
-                </a:r>
-                <a:endParaRPr sz="1333">
-                  <a:solidFill>
-                    <a:schemeClr val="lt1"/>
-                  </a:solidFill>
-                </a:endParaRPr>
-              </a:p>
-            </p:txBody>
-          </p:sp>
-          <p:sp>
-            <p:nvSpPr>
-              <p:cNvPr id="111" name="Google Shape;111;p19"/>
-              <p:cNvSpPr txBox="1"/>
-              <p:nvPr/>
-            </p:nvSpPr>
-            <p:spPr>
-              <a:xfrm rot="1193697">
-                <a:off x="3588541" y="3850856"/>
-                <a:ext cx="632977" cy="153841"/>
-              </a:xfrm>
-              <a:prstGeom prst="rect">
-                <a:avLst/>
-              </a:prstGeom>
-              <a:noFill/>
-              <a:ln>
-                <a:noFill/>
-              </a:ln>
-            </p:spPr>
-            <p:txBody>
-              <a:bodyPr spcFirstLastPara="1" wrap="square" lIns="0" tIns="0" rIns="0" bIns="0" anchor="t" anchorCtr="0">
-                <a:spAutoFit/>
-              </a:bodyPr>
-              <a:lstStyle/>
-              <a:p>
-                <a:r>
-                  <a:rPr lang="en" sz="1333">
-                    <a:solidFill>
-                      <a:schemeClr val="lt1"/>
-                    </a:solidFill>
-                  </a:rPr>
-                  <a:t>Collection</a:t>
-                </a:r>
-                <a:endParaRPr sz="1333">
-                  <a:solidFill>
-                    <a:schemeClr val="lt1"/>
-                  </a:solidFill>
-                </a:endParaRPr>
-              </a:p>
-            </p:txBody>
-          </p:sp>
-          <p:sp>
-            <p:nvSpPr>
-              <p:cNvPr id="112" name="Google Shape;112;p19"/>
-              <p:cNvSpPr txBox="1"/>
-              <p:nvPr/>
-            </p:nvSpPr>
-            <p:spPr>
-              <a:xfrm rot="3598626">
-                <a:off x="2952757" y="3228270"/>
-                <a:ext cx="582796" cy="153841"/>
-              </a:xfrm>
-              <a:prstGeom prst="rect">
-                <a:avLst/>
-              </a:prstGeom>
-              <a:noFill/>
-              <a:ln>
-                <a:noFill/>
-              </a:ln>
-            </p:spPr>
-            <p:txBody>
-              <a:bodyPr spcFirstLastPara="1" wrap="square" lIns="0" tIns="0" rIns="0" bIns="0" anchor="t" anchorCtr="0">
-                <a:spAutoFit/>
-              </a:bodyPr>
-              <a:lstStyle/>
-              <a:p>
-                <a:pPr algn="ctr"/>
-                <a:r>
-                  <a:rPr lang="en" sz="1333">
-                    <a:solidFill>
-                      <a:schemeClr val="lt1"/>
-                    </a:solidFill>
-                  </a:rPr>
-                  <a:t>Reporting</a:t>
-                </a:r>
-                <a:endParaRPr sz="1333">
-                  <a:solidFill>
-                    <a:schemeClr val="lt1"/>
-                  </a:solidFill>
-                </a:endParaRPr>
-              </a:p>
-            </p:txBody>
-          </p:sp>
-          <p:sp>
-            <p:nvSpPr>
-              <p:cNvPr id="113" name="Google Shape;113;p19"/>
-              <p:cNvSpPr txBox="1"/>
-              <p:nvPr/>
-            </p:nvSpPr>
-            <p:spPr>
-              <a:xfrm rot="18000994">
-                <a:off x="5169158" y="3116484"/>
-                <a:ext cx="918140" cy="307681"/>
-              </a:xfrm>
-              <a:prstGeom prst="rect">
-                <a:avLst/>
-              </a:prstGeom>
-              <a:noFill/>
-              <a:ln>
-                <a:noFill/>
-              </a:ln>
-            </p:spPr>
-            <p:txBody>
-              <a:bodyPr spcFirstLastPara="1" wrap="square" lIns="0" tIns="0" rIns="0" bIns="0" anchor="t" anchorCtr="0">
-                <a:spAutoFit/>
-              </a:bodyPr>
-              <a:lstStyle/>
-              <a:p>
-                <a:pPr algn="ctr"/>
-                <a:r>
-                  <a:rPr lang="en" sz="1333">
-                    <a:solidFill>
-                      <a:schemeClr val="lt1"/>
-                    </a:solidFill>
-                  </a:rPr>
-                  <a:t>Workflow</a:t>
-                </a:r>
-                <a:endParaRPr sz="1333">
-                  <a:solidFill>
-                    <a:schemeClr val="lt1"/>
-                  </a:solidFill>
-                </a:endParaRPr>
-              </a:p>
-              <a:p>
-                <a:pPr algn="ctr"/>
-                <a:r>
-                  <a:rPr lang="en" sz="1333">
-                    <a:solidFill>
-                      <a:schemeClr val="lt1"/>
-                    </a:solidFill>
-                  </a:rPr>
-                  <a:t>Implementation</a:t>
-                </a:r>
-                <a:endParaRPr sz="1333">
-                  <a:solidFill>
-                    <a:schemeClr val="lt1"/>
-                  </a:solidFill>
-                </a:endParaRPr>
-              </a:p>
-            </p:txBody>
-          </p:sp>
-          <p:sp>
-            <p:nvSpPr>
-              <p:cNvPr id="114" name="Google Shape;114;p19"/>
-              <p:cNvSpPr txBox="1"/>
-              <p:nvPr/>
-            </p:nvSpPr>
-            <p:spPr>
-              <a:xfrm rot="20399580">
-                <a:off x="4686624" y="3787167"/>
-                <a:ext cx="553291" cy="307681"/>
-              </a:xfrm>
-              <a:prstGeom prst="rect">
-                <a:avLst/>
-              </a:prstGeom>
-              <a:noFill/>
-              <a:ln>
-                <a:noFill/>
-              </a:ln>
-            </p:spPr>
-            <p:txBody>
-              <a:bodyPr spcFirstLastPara="1" wrap="square" lIns="0" tIns="0" rIns="0" bIns="0" anchor="t" anchorCtr="0">
-                <a:spAutoFit/>
-              </a:bodyPr>
-              <a:lstStyle/>
-              <a:p>
-                <a:pPr algn="ctr"/>
-                <a:r>
-                  <a:rPr lang="en" sz="1333">
-                    <a:solidFill>
-                      <a:schemeClr val="lt1"/>
-                    </a:solidFill>
-                  </a:rPr>
-                  <a:t>Clinical</a:t>
-                </a:r>
-                <a:endParaRPr sz="1333">
-                  <a:solidFill>
-                    <a:schemeClr val="lt1"/>
-                  </a:solidFill>
-                </a:endParaRPr>
-              </a:p>
-              <a:p>
-                <a:pPr algn="ctr"/>
-                <a:r>
-                  <a:rPr lang="en" sz="1333">
-                    <a:solidFill>
-                      <a:schemeClr val="lt1"/>
-                    </a:solidFill>
-                  </a:rPr>
-                  <a:t>Care</a:t>
-                </a:r>
-                <a:endParaRPr sz="1333">
-                  <a:solidFill>
-                    <a:schemeClr val="lt1"/>
-                  </a:solidFill>
-                </a:endParaRPr>
-              </a:p>
-            </p:txBody>
-          </p:sp>
-          <p:sp>
-            <p:nvSpPr>
-              <p:cNvPr id="115" name="Google Shape;115;p19"/>
-              <p:cNvSpPr/>
-              <p:nvPr/>
-            </p:nvSpPr>
-            <p:spPr>
-              <a:xfrm rot="5400000">
-                <a:off x="4343136" y="702075"/>
-                <a:ext cx="91500" cy="91500"/>
-              </a:xfrm>
-              <a:prstGeom prst="triangle">
-                <a:avLst>
-                  <a:gd name="adj" fmla="val 50000"/>
-                </a:avLst>
-              </a:prstGeom>
+              </a:rPr>
+              <a:t>Editable - 11/6</a:t>
+            </a:r>
+            <a:endParaRPr sz="2400">
               <a:solidFill>
                 <a:schemeClr val="dk2"/>
               </a:solidFill>
-              <a:ln w="19050" cap="flat" cmpd="sng">
+            </a:endParaRPr>
+          </a:p>
+        </p:txBody>
+      </p:sp>
+      <p:sp>
+        <p:nvSpPr>
+          <p:cNvPr id="102" name="Google Shape;102;p19"/>
+          <p:cNvSpPr txBox="1"/>
+          <p:nvPr/>
+        </p:nvSpPr>
+        <p:spPr>
+          <a:xfrm rot="-3840531">
+            <a:off x="3838221" y="2498062"/>
+            <a:ext cx="1071577" cy="205121"/>
+          </a:xfrm>
+          <a:prstGeom prst="rect">
+            <a:avLst/>
+          </a:prstGeom>
+          <a:noFill/>
+          <a:ln>
+            <a:noFill/>
+          </a:ln>
+        </p:spPr>
+        <p:txBody>
+          <a:bodyPr spcFirstLastPara="1" wrap="square" lIns="0" tIns="0" rIns="0" bIns="0" anchor="t" anchorCtr="0">
+            <a:spAutoFit/>
+          </a:bodyPr>
+          <a:lstStyle/>
+          <a:p>
+            <a:r>
+              <a:rPr lang="en" sz="1333">
                 <a:solidFill>
                   <a:schemeClr val="lt1"/>
                 </a:solidFill>
-                <a:prstDash val="solid"/>
-                <a:round/>
-                <a:headEnd type="none" w="sm" len="sm"/>
-                <a:tailEnd type="none" w="sm" len="sm"/>
-              </a:ln>
-            </p:spPr>
-            <p:txBody>
-              <a:bodyPr spcFirstLastPara="1" wrap="square" lIns="112000" tIns="112000" rIns="112000" bIns="112000" anchor="ctr" anchorCtr="0">
-                <a:noAutofit/>
-              </a:bodyPr>
-              <a:lstStyle/>
-              <a:p>
-                <a:pPr algn="ctr"/>
-                <a:endParaRPr sz="1716"/>
-              </a:p>
-            </p:txBody>
-          </p:sp>
-          <p:sp>
-            <p:nvSpPr>
-              <p:cNvPr id="116" name="Google Shape;116;p19"/>
-              <p:cNvSpPr/>
-              <p:nvPr/>
-            </p:nvSpPr>
-            <p:spPr>
-              <a:xfrm rot="10800000">
-                <a:off x="6326363" y="2583344"/>
-                <a:ext cx="91500" cy="91500"/>
-              </a:xfrm>
-              <a:prstGeom prst="triangle">
-                <a:avLst>
-                  <a:gd name="adj" fmla="val 50000"/>
-                </a:avLst>
-              </a:prstGeom>
+              </a:rPr>
+              <a:t>Analytics</a:t>
+            </a:r>
+            <a:endParaRPr sz="1333">
               <a:solidFill>
-                <a:schemeClr val="dk2"/>
+                <a:schemeClr val="lt1"/>
               </a:solidFill>
-              <a:ln w="19050" cap="flat" cmpd="sng">
+            </a:endParaRPr>
+          </a:p>
+        </p:txBody>
+      </p:sp>
+      <p:sp>
+        <p:nvSpPr>
+          <p:cNvPr id="103" name="Google Shape;103;p19"/>
+          <p:cNvSpPr txBox="1"/>
+          <p:nvPr/>
+        </p:nvSpPr>
+        <p:spPr>
+          <a:xfrm rot="-1200420">
+            <a:off x="4856546" y="1830130"/>
+            <a:ext cx="737721" cy="205121"/>
+          </a:xfrm>
+          <a:prstGeom prst="rect">
+            <a:avLst/>
+          </a:prstGeom>
+          <a:noFill/>
+          <a:ln>
+            <a:noFill/>
+          </a:ln>
+        </p:spPr>
+        <p:txBody>
+          <a:bodyPr spcFirstLastPara="1" wrap="square" lIns="0" tIns="0" rIns="0" bIns="0" anchor="t" anchorCtr="0">
+            <a:spAutoFit/>
+          </a:bodyPr>
+          <a:lstStyle/>
+          <a:p>
+            <a:r>
+              <a:rPr lang="en" sz="1333">
                 <a:solidFill>
                   <a:schemeClr val="lt1"/>
                 </a:solidFill>
-                <a:prstDash val="solid"/>
-                <a:round/>
-                <a:headEnd type="none" w="sm" len="sm"/>
-                <a:tailEnd type="none" w="sm" len="sm"/>
-              </a:ln>
-            </p:spPr>
-            <p:txBody>
-              <a:bodyPr spcFirstLastPara="1" wrap="square" lIns="112000" tIns="112000" rIns="112000" bIns="112000" anchor="ctr" anchorCtr="0">
-                <a:noAutofit/>
-              </a:bodyPr>
-              <a:lstStyle/>
-              <a:p>
-                <a:pPr algn="ctr"/>
-                <a:endParaRPr sz="1716"/>
-              </a:p>
-            </p:txBody>
-          </p:sp>
-          <p:sp>
-            <p:nvSpPr>
-              <p:cNvPr id="117" name="Google Shape;117;p19"/>
-              <p:cNvSpPr/>
-              <p:nvPr/>
-            </p:nvSpPr>
-            <p:spPr>
-              <a:xfrm rot="-5400000" flipH="1">
-                <a:off x="4418193" y="4584446"/>
-                <a:ext cx="91500" cy="91500"/>
-              </a:xfrm>
-              <a:prstGeom prst="triangle">
-                <a:avLst>
-                  <a:gd name="adj" fmla="val 50000"/>
-                </a:avLst>
-              </a:prstGeom>
+              </a:rPr>
+              <a:t>Synthesis</a:t>
+            </a:r>
+            <a:endParaRPr sz="1333">
               <a:solidFill>
-                <a:schemeClr val="dk2"/>
+                <a:schemeClr val="lt1"/>
               </a:solidFill>
-              <a:ln w="19050" cap="flat" cmpd="sng">
+            </a:endParaRPr>
+          </a:p>
+        </p:txBody>
+      </p:sp>
+      <p:sp>
+        <p:nvSpPr>
+          <p:cNvPr id="104" name="Google Shape;104;p19"/>
+          <p:cNvSpPr txBox="1"/>
+          <p:nvPr/>
+        </p:nvSpPr>
+        <p:spPr>
+          <a:xfrm rot="1605039">
+            <a:off x="6104576" y="1745655"/>
+            <a:ext cx="1159720" cy="410241"/>
+          </a:xfrm>
+          <a:prstGeom prst="rect">
+            <a:avLst/>
+          </a:prstGeom>
+          <a:noFill/>
+          <a:ln>
+            <a:noFill/>
+          </a:ln>
+        </p:spPr>
+        <p:txBody>
+          <a:bodyPr spcFirstLastPara="1" wrap="square" lIns="0" tIns="0" rIns="0" bIns="0" anchor="t" anchorCtr="0">
+            <a:spAutoFit/>
+          </a:bodyPr>
+          <a:lstStyle/>
+          <a:p>
+            <a:pPr algn="ctr"/>
+            <a:r>
+              <a:rPr lang="en" sz="1333">
                 <a:solidFill>
                   <a:schemeClr val="lt1"/>
                 </a:solidFill>
-                <a:prstDash val="solid"/>
-                <a:round/>
-                <a:headEnd type="none" w="sm" len="sm"/>
-                <a:tailEnd type="none" w="sm" len="sm"/>
-              </a:ln>
-            </p:spPr>
-            <p:txBody>
-              <a:bodyPr spcFirstLastPara="1" wrap="square" lIns="112000" tIns="112000" rIns="112000" bIns="112000" anchor="ctr" anchorCtr="0">
-                <a:noAutofit/>
-              </a:bodyPr>
-              <a:lstStyle/>
-              <a:p>
-                <a:pPr algn="ctr"/>
-                <a:endParaRPr sz="1716"/>
-              </a:p>
-            </p:txBody>
-          </p:sp>
-          <p:pic>
-            <p:nvPicPr>
-              <p:cNvPr id="118" name="Google Shape;118;p19"/>
-              <p:cNvPicPr preferRelativeResize="0"/>
-              <p:nvPr/>
-            </p:nvPicPr>
-            <p:blipFill>
-              <a:blip r:embed="rId8">
-                <a:alphaModFix/>
-              </a:blip>
-              <a:stretch>
-                <a:fillRect/>
-              </a:stretch>
-            </p:blipFill>
-            <p:spPr>
-              <a:xfrm rot="6898124">
-                <a:off x="3891347" y="1671880"/>
-                <a:ext cx="3200360" cy="1781578"/>
-              </a:xfrm>
-              <a:prstGeom prst="rect">
-                <a:avLst/>
-              </a:prstGeom>
-              <a:noFill/>
-              <a:ln>
-                <a:noFill/>
-              </a:ln>
-            </p:spPr>
-          </p:pic>
-          <p:pic>
-            <p:nvPicPr>
-              <p:cNvPr id="119" name="Google Shape;119;p19"/>
-              <p:cNvPicPr preferRelativeResize="0"/>
-              <p:nvPr/>
-            </p:nvPicPr>
-            <p:blipFill>
-              <a:blip r:embed="rId9">
-                <a:alphaModFix/>
-              </a:blip>
-              <a:stretch>
-                <a:fillRect/>
-              </a:stretch>
-            </p:blipFill>
-            <p:spPr>
-              <a:xfrm rot="-765429">
-                <a:off x="2069657" y="1028243"/>
-                <a:ext cx="3198703" cy="1781556"/>
-              </a:xfrm>
-              <a:prstGeom prst="rect">
-                <a:avLst/>
-              </a:prstGeom>
-              <a:noFill/>
-              <a:ln>
-                <a:noFill/>
-              </a:ln>
-            </p:spPr>
-          </p:pic>
-          <p:pic>
-            <p:nvPicPr>
-              <p:cNvPr id="120" name="Google Shape;120;p19"/>
-              <p:cNvPicPr preferRelativeResize="0"/>
-              <p:nvPr/>
-            </p:nvPicPr>
-            <p:blipFill>
-              <a:blip r:embed="rId10">
-                <a:alphaModFix/>
-              </a:blip>
-              <a:stretch>
-                <a:fillRect/>
-              </a:stretch>
-            </p:blipFill>
-            <p:spPr>
-              <a:xfrm rot="-5890520">
-                <a:off x="3799275" y="2316050"/>
-                <a:ext cx="3198702" cy="1781556"/>
-              </a:xfrm>
-              <a:prstGeom prst="rect">
-                <a:avLst/>
-              </a:prstGeom>
-              <a:noFill/>
-              <a:ln>
-                <a:noFill/>
-              </a:ln>
-            </p:spPr>
-          </p:pic>
-        </p:grpSp>
+              </a:rPr>
+              <a:t>Guidelines/ Protocols</a:t>
+            </a:r>
+            <a:endParaRPr sz="1333">
+              <a:solidFill>
+                <a:schemeClr val="lt1"/>
+              </a:solidFill>
+            </a:endParaRPr>
+          </a:p>
+        </p:txBody>
+      </p:sp>
+      <p:sp>
+        <p:nvSpPr>
+          <p:cNvPr id="105" name="Google Shape;105;p19"/>
+          <p:cNvSpPr txBox="1"/>
+          <p:nvPr/>
+        </p:nvSpPr>
+        <p:spPr>
+          <a:xfrm rot="3598626">
+            <a:off x="7116320" y="2533358"/>
+            <a:ext cx="777061" cy="410241"/>
+          </a:xfrm>
+          <a:prstGeom prst="rect">
+            <a:avLst/>
+          </a:prstGeom>
+          <a:noFill/>
+          <a:ln>
+            <a:noFill/>
+          </a:ln>
+        </p:spPr>
+        <p:txBody>
+          <a:bodyPr spcFirstLastPara="1" wrap="square" lIns="0" tIns="0" rIns="0" bIns="0" anchor="t" anchorCtr="0">
+            <a:spAutoFit/>
+          </a:bodyPr>
+          <a:lstStyle/>
+          <a:p>
+            <a:pPr algn="ctr"/>
+            <a:r>
+              <a:rPr lang="en" sz="1333">
+                <a:solidFill>
+                  <a:schemeClr val="lt1"/>
+                </a:solidFill>
+              </a:rPr>
+              <a:t>Decision</a:t>
+            </a:r>
+            <a:endParaRPr sz="1333">
+              <a:solidFill>
+                <a:schemeClr val="lt1"/>
+              </a:solidFill>
+            </a:endParaRPr>
+          </a:p>
+          <a:p>
+            <a:pPr algn="ctr"/>
+            <a:r>
+              <a:rPr lang="en" sz="1333">
+                <a:solidFill>
+                  <a:schemeClr val="lt1"/>
+                </a:solidFill>
+              </a:rPr>
+              <a:t>Support</a:t>
+            </a:r>
+            <a:endParaRPr sz="1333">
+              <a:solidFill>
+                <a:schemeClr val="lt1"/>
+              </a:solidFill>
+            </a:endParaRPr>
+          </a:p>
+        </p:txBody>
+      </p:sp>
+      <p:sp>
+        <p:nvSpPr>
+          <p:cNvPr id="106" name="Google Shape;106;p19"/>
+          <p:cNvSpPr txBox="1"/>
+          <p:nvPr/>
+        </p:nvSpPr>
+        <p:spPr>
+          <a:xfrm rot="1193203">
+            <a:off x="4623596" y="5116380"/>
+            <a:ext cx="1178264" cy="205121"/>
+          </a:xfrm>
+          <a:prstGeom prst="rect">
+            <a:avLst/>
+          </a:prstGeom>
+          <a:noFill/>
+          <a:ln>
+            <a:noFill/>
+          </a:ln>
+        </p:spPr>
+        <p:txBody>
+          <a:bodyPr spcFirstLastPara="1" wrap="square" lIns="0" tIns="0" rIns="0" bIns="0" anchor="t" anchorCtr="0">
+            <a:spAutoFit/>
+          </a:bodyPr>
+          <a:lstStyle/>
+          <a:p>
+            <a:r>
+              <a:rPr lang="en" sz="1333">
+                <a:solidFill>
+                  <a:schemeClr val="lt1"/>
+                </a:solidFill>
+              </a:rPr>
+              <a:t>Measurement</a:t>
+            </a:r>
+            <a:endParaRPr sz="1333">
+              <a:solidFill>
+                <a:schemeClr val="lt1"/>
+              </a:solidFill>
+            </a:endParaRPr>
+          </a:p>
+        </p:txBody>
+      </p:sp>
+      <p:sp>
+        <p:nvSpPr>
+          <p:cNvPr id="107" name="Google Shape;107;p19"/>
+          <p:cNvSpPr txBox="1"/>
+          <p:nvPr/>
+        </p:nvSpPr>
+        <p:spPr>
+          <a:xfrm rot="3598626">
+            <a:off x="3937010" y="4304360"/>
+            <a:ext cx="777061" cy="205121"/>
+          </a:xfrm>
+          <a:prstGeom prst="rect">
+            <a:avLst/>
+          </a:prstGeom>
+          <a:noFill/>
+          <a:ln>
+            <a:noFill/>
+          </a:ln>
+        </p:spPr>
+        <p:txBody>
+          <a:bodyPr spcFirstLastPara="1" wrap="square" lIns="0" tIns="0" rIns="0" bIns="0" anchor="t" anchorCtr="0">
+            <a:spAutoFit/>
+          </a:bodyPr>
+          <a:lstStyle/>
+          <a:p>
+            <a:pPr algn="ctr"/>
+            <a:r>
+              <a:rPr lang="en" sz="1333">
+                <a:solidFill>
+                  <a:schemeClr val="lt1"/>
+                </a:solidFill>
+              </a:rPr>
+              <a:t>Reporting</a:t>
+            </a:r>
+            <a:endParaRPr sz="1333">
+              <a:solidFill>
+                <a:schemeClr val="lt1"/>
+              </a:solidFill>
+            </a:endParaRPr>
+          </a:p>
+        </p:txBody>
+      </p:sp>
+      <p:sp>
+        <p:nvSpPr>
+          <p:cNvPr id="108" name="Google Shape;108;p19"/>
+          <p:cNvSpPr txBox="1"/>
+          <p:nvPr/>
+        </p:nvSpPr>
+        <p:spPr>
+          <a:xfrm rot="-3599006">
+            <a:off x="6981011" y="4104154"/>
+            <a:ext cx="1224187" cy="615361"/>
+          </a:xfrm>
+          <a:prstGeom prst="rect">
+            <a:avLst/>
+          </a:prstGeom>
+          <a:noFill/>
+          <a:ln>
+            <a:noFill/>
+          </a:ln>
+        </p:spPr>
+        <p:txBody>
+          <a:bodyPr spcFirstLastPara="1" wrap="square" lIns="0" tIns="0" rIns="0" bIns="0" anchor="t" anchorCtr="0">
+            <a:spAutoFit/>
+          </a:bodyPr>
+          <a:lstStyle/>
+          <a:p>
+            <a:pPr algn="ctr"/>
+            <a:r>
+              <a:rPr lang="en" sz="1333">
+                <a:solidFill>
+                  <a:schemeClr val="lt1"/>
+                </a:solidFill>
+              </a:rPr>
+              <a:t>Process Improvement</a:t>
+            </a:r>
+            <a:endParaRPr sz="1333">
+              <a:solidFill>
+                <a:schemeClr val="lt1"/>
+              </a:solidFill>
+            </a:endParaRPr>
+          </a:p>
+          <a:p>
+            <a:pPr algn="ctr"/>
+            <a:endParaRPr sz="1333">
+              <a:solidFill>
+                <a:schemeClr val="lt1"/>
+              </a:solidFill>
+            </a:endParaRPr>
+          </a:p>
+        </p:txBody>
+      </p:sp>
+      <p:sp>
+        <p:nvSpPr>
+          <p:cNvPr id="109" name="Google Shape;109;p19"/>
+          <p:cNvSpPr txBox="1"/>
+          <p:nvPr/>
+        </p:nvSpPr>
+        <p:spPr>
+          <a:xfrm rot="-1200420">
+            <a:off x="6248833" y="5049556"/>
+            <a:ext cx="737721" cy="410241"/>
+          </a:xfrm>
+          <a:prstGeom prst="rect">
+            <a:avLst/>
+          </a:prstGeom>
+          <a:noFill/>
+          <a:ln>
+            <a:noFill/>
+          </a:ln>
+        </p:spPr>
+        <p:txBody>
+          <a:bodyPr spcFirstLastPara="1" wrap="square" lIns="0" tIns="0" rIns="0" bIns="0" anchor="t" anchorCtr="0">
+            <a:spAutoFit/>
+          </a:bodyPr>
+          <a:lstStyle/>
+          <a:p>
+            <a:pPr algn="ctr"/>
+            <a:r>
+              <a:rPr lang="en" sz="1333">
+                <a:solidFill>
+                  <a:schemeClr val="lt1"/>
+                </a:solidFill>
+              </a:rPr>
+              <a:t>Clinical</a:t>
+            </a:r>
+            <a:endParaRPr sz="1333">
+              <a:solidFill>
+                <a:schemeClr val="lt1"/>
+              </a:solidFill>
+            </a:endParaRPr>
+          </a:p>
+          <a:p>
+            <a:pPr algn="ctr"/>
+            <a:r>
+              <a:rPr lang="en" sz="1333">
+                <a:solidFill>
+                  <a:schemeClr val="lt1"/>
+                </a:solidFill>
+              </a:rPr>
+              <a:t>Care</a:t>
+            </a:r>
+            <a:endParaRPr sz="1333">
+              <a:solidFill>
+                <a:schemeClr val="lt1"/>
+              </a:solidFill>
+            </a:endParaRPr>
+          </a:p>
+        </p:txBody>
+      </p:sp>
+      <p:sp>
+        <p:nvSpPr>
+          <p:cNvPr id="110" name="Google Shape;110;p19"/>
+          <p:cNvSpPr/>
+          <p:nvPr/>
+        </p:nvSpPr>
+        <p:spPr>
+          <a:xfrm rot="5400000">
+            <a:off x="5790848" y="957267"/>
+            <a:ext cx="122000" cy="122000"/>
+          </a:xfrm>
+          <a:prstGeom prst="triangle">
+            <a:avLst>
+              <a:gd name="adj" fmla="val 50000"/>
+            </a:avLst>
+          </a:prstGeom>
+          <a:solidFill>
+            <a:schemeClr val="dk2"/>
+          </a:solidFill>
+          <a:ln w="19050" cap="flat" cmpd="sng">
+            <a:solidFill>
+              <a:schemeClr val="lt1"/>
+            </a:solidFill>
+            <a:prstDash val="solid"/>
+            <a:round/>
+            <a:headEnd type="none" w="sm" len="sm"/>
+            <a:tailEnd type="none" w="sm" len="sm"/>
+          </a:ln>
+        </p:spPr>
+        <p:txBody>
+          <a:bodyPr spcFirstLastPara="1" wrap="square" lIns="112000" tIns="112000" rIns="112000" bIns="112000" anchor="ctr" anchorCtr="0">
+            <a:noAutofit/>
+          </a:bodyPr>
+          <a:lstStyle/>
+          <a:p>
+            <a:pPr algn="ctr"/>
+            <a:endParaRPr sz="1716"/>
+          </a:p>
+        </p:txBody>
+      </p:sp>
+      <p:sp>
+        <p:nvSpPr>
+          <p:cNvPr id="111" name="Google Shape;111;p19"/>
+          <p:cNvSpPr/>
+          <p:nvPr/>
+        </p:nvSpPr>
+        <p:spPr>
+          <a:xfrm rot="10800000">
+            <a:off x="8435151" y="3444459"/>
+            <a:ext cx="122000" cy="122000"/>
+          </a:xfrm>
+          <a:prstGeom prst="triangle">
+            <a:avLst>
+              <a:gd name="adj" fmla="val 50000"/>
+            </a:avLst>
+          </a:prstGeom>
+          <a:solidFill>
+            <a:schemeClr val="dk2"/>
+          </a:solidFill>
+          <a:ln w="19050" cap="flat" cmpd="sng">
+            <a:solidFill>
+              <a:schemeClr val="lt1"/>
+            </a:solidFill>
+            <a:prstDash val="solid"/>
+            <a:round/>
+            <a:headEnd type="none" w="sm" len="sm"/>
+            <a:tailEnd type="none" w="sm" len="sm"/>
+          </a:ln>
+        </p:spPr>
+        <p:txBody>
+          <a:bodyPr spcFirstLastPara="1" wrap="square" lIns="112000" tIns="112000" rIns="112000" bIns="112000" anchor="ctr" anchorCtr="0">
+            <a:noAutofit/>
+          </a:bodyPr>
+          <a:lstStyle/>
+          <a:p>
+            <a:pPr algn="ctr"/>
+            <a:endParaRPr sz="1716"/>
+          </a:p>
+        </p:txBody>
+      </p:sp>
+      <p:sp>
+        <p:nvSpPr>
+          <p:cNvPr id="112" name="Google Shape;112;p19"/>
+          <p:cNvSpPr/>
+          <p:nvPr/>
+        </p:nvSpPr>
+        <p:spPr>
+          <a:xfrm rot="-5400000" flipH="1">
+            <a:off x="5890924" y="6144345"/>
+            <a:ext cx="122000" cy="122000"/>
+          </a:xfrm>
+          <a:prstGeom prst="triangle">
+            <a:avLst>
+              <a:gd name="adj" fmla="val 50000"/>
+            </a:avLst>
+          </a:prstGeom>
+          <a:solidFill>
+            <a:schemeClr val="dk2"/>
+          </a:solidFill>
+          <a:ln w="19050" cap="flat" cmpd="sng">
+            <a:solidFill>
+              <a:schemeClr val="lt1"/>
+            </a:solidFill>
+            <a:prstDash val="solid"/>
+            <a:round/>
+            <a:headEnd type="none" w="sm" len="sm"/>
+            <a:tailEnd type="none" w="sm" len="sm"/>
+          </a:ln>
+        </p:spPr>
+        <p:txBody>
+          <a:bodyPr spcFirstLastPara="1" wrap="square" lIns="112000" tIns="112000" rIns="112000" bIns="112000" anchor="ctr" anchorCtr="0">
+            <a:noAutofit/>
+          </a:bodyPr>
+          <a:lstStyle/>
+          <a:p>
+            <a:pPr algn="ctr"/>
+            <a:endParaRPr sz="1716"/>
+          </a:p>
+        </p:txBody>
+      </p:sp>
+      <p:grpSp>
+        <p:nvGrpSpPr>
+          <p:cNvPr id="113" name="Google Shape;113;p19"/>
+          <p:cNvGrpSpPr/>
+          <p:nvPr/>
+        </p:nvGrpSpPr>
+        <p:grpSpPr>
+          <a:xfrm>
+            <a:off x="4195843" y="1904923"/>
+            <a:ext cx="3413760" cy="3413760"/>
+            <a:chOff x="3157619" y="1431380"/>
+            <a:chExt cx="2560320" cy="2560320"/>
+          </a:xfrm>
+        </p:grpSpPr>
         <p:pic>
           <p:nvPicPr>
-            <p:cNvPr id="121" name="Google Shape;121;p19" title="EBM (1).png"/>
+            <p:cNvPr id="114" name="Google Shape;114;p19"/>
             <p:cNvPicPr preferRelativeResize="0"/>
             <p:nvPr/>
           </p:nvPicPr>
           <p:blipFill>
-            <a:blip r:embed="rId3">
+            <a:blip r:embed="rId5">
               <a:alphaModFix/>
             </a:blip>
             <a:stretch>
@@ -16011,7 +16859,7 @@
           </p:blipFill>
           <p:spPr>
             <a:xfrm flipH="1">
-              <a:off x="3291667" y="1539771"/>
+              <a:off x="3284025" y="1565838"/>
               <a:ext cx="2286000" cy="2286000"/>
             </a:xfrm>
             <a:prstGeom prst="ellipse">
@@ -16023,16 +16871,305 @@
             </a:ln>
           </p:spPr>
         </p:pic>
-        <p:sp>
-          <p:nvSpPr>
-            <p:cNvPr id="122" name="Google Shape;122;p19"/>
-            <p:cNvSpPr txBox="1"/>
+        <p:grpSp>
+          <p:nvGrpSpPr>
+            <p:cNvPr id="115" name="Google Shape;115;p19"/>
+            <p:cNvGrpSpPr/>
             <p:nvPr/>
-          </p:nvSpPr>
+          </p:nvGrpSpPr>
+          <p:grpSpPr>
+            <a:xfrm>
+              <a:off x="3157619" y="1431380"/>
+              <a:ext cx="2560320" cy="2560320"/>
+              <a:chOff x="3157619" y="1431380"/>
+              <a:chExt cx="2560320" cy="2560320"/>
+            </a:xfrm>
+          </p:grpSpPr>
+          <p:pic>
+            <p:nvPicPr>
+              <p:cNvPr id="116" name="Google Shape;116;p19"/>
+              <p:cNvPicPr preferRelativeResize="0"/>
+              <p:nvPr/>
+            </p:nvPicPr>
+            <p:blipFill>
+              <a:blip r:embed="rId6">
+                <a:alphaModFix/>
+              </a:blip>
+              <a:stretch>
+                <a:fillRect/>
+              </a:stretch>
+            </p:blipFill>
+            <p:spPr>
+              <a:xfrm rot="3480000">
+                <a:off x="3157619" y="1431380"/>
+                <a:ext cx="2560320" cy="2560320"/>
+              </a:xfrm>
+              <a:prstGeom prst="rect">
+                <a:avLst/>
+              </a:prstGeom>
+              <a:noFill/>
+              <a:ln>
+                <a:noFill/>
+              </a:ln>
+            </p:spPr>
+          </p:pic>
+          <p:grpSp>
+            <p:nvGrpSpPr>
+              <p:cNvPr id="117" name="Google Shape;117;p19"/>
+              <p:cNvGrpSpPr/>
+              <p:nvPr/>
+            </p:nvGrpSpPr>
+            <p:grpSpPr>
+              <a:xfrm>
+                <a:off x="3725378" y="2086944"/>
+                <a:ext cx="1425668" cy="1304203"/>
+                <a:chOff x="3743260" y="2063498"/>
+                <a:chExt cx="1425668" cy="1304203"/>
+              </a:xfrm>
+            </p:grpSpPr>
+            <p:sp>
+              <p:nvSpPr>
+                <p:cNvPr id="118" name="Google Shape;118;p19"/>
+                <p:cNvSpPr txBox="1"/>
+                <p:nvPr/>
+              </p:nvSpPr>
+              <p:spPr>
+                <a:xfrm rot="21596460">
+                  <a:off x="4003728" y="3244542"/>
+                  <a:ext cx="582600" cy="123159"/>
+                </a:xfrm>
+                <a:prstGeom prst="rect">
+                  <a:avLst/>
+                </a:prstGeom>
+                <a:noFill/>
+                <a:ln>
+                  <a:noFill/>
+                </a:ln>
+              </p:spPr>
+              <p:txBody>
+                <a:bodyPr spcFirstLastPara="1" wrap="square" lIns="0" tIns="0" rIns="0" bIns="0" anchor="t" anchorCtr="0">
+                  <a:spAutoFit/>
+                </a:bodyPr>
+                <a:lstStyle/>
+                <a:p>
+                  <a:pPr algn="ctr"/>
+                  <a:r>
+                    <a:rPr lang="en" sz="1067">
+                      <a:solidFill>
+                        <a:srgbClr val="808080"/>
+                      </a:solidFill>
+                    </a:rPr>
+                    <a:t>Patient</a:t>
+                  </a:r>
+                  <a:endParaRPr sz="1067">
+                    <a:solidFill>
+                      <a:srgbClr val="808080"/>
+                    </a:solidFill>
+                  </a:endParaRPr>
+                </a:p>
+              </p:txBody>
+            </p:sp>
+            <p:sp>
+              <p:nvSpPr>
+                <p:cNvPr id="119" name="Google Shape;119;p19"/>
+                <p:cNvSpPr txBox="1"/>
+                <p:nvPr/>
+              </p:nvSpPr>
+              <p:spPr>
+                <a:xfrm rot="21596460">
+                  <a:off x="4586328" y="3060357"/>
+                  <a:ext cx="582600" cy="123159"/>
+                </a:xfrm>
+                <a:prstGeom prst="rect">
+                  <a:avLst/>
+                </a:prstGeom>
+                <a:noFill/>
+                <a:ln>
+                  <a:noFill/>
+                </a:ln>
+              </p:spPr>
+              <p:txBody>
+                <a:bodyPr spcFirstLastPara="1" wrap="square" lIns="0" tIns="0" rIns="0" bIns="0" anchor="t" anchorCtr="0">
+                  <a:spAutoFit/>
+                </a:bodyPr>
+                <a:lstStyle/>
+                <a:p>
+                  <a:pPr algn="ctr"/>
+                  <a:r>
+                    <a:rPr lang="en" sz="1067">
+                      <a:solidFill>
+                        <a:srgbClr val="808080"/>
+                      </a:solidFill>
+                    </a:rPr>
+                    <a:t>Provider</a:t>
+                  </a:r>
+                  <a:endParaRPr sz="1067">
+                    <a:solidFill>
+                      <a:srgbClr val="808080"/>
+                    </a:solidFill>
+                  </a:endParaRPr>
+                </a:p>
+              </p:txBody>
+            </p:sp>
+            <p:sp>
+              <p:nvSpPr>
+                <p:cNvPr id="120" name="Google Shape;120;p19"/>
+                <p:cNvSpPr txBox="1"/>
+                <p:nvPr/>
+              </p:nvSpPr>
+              <p:spPr>
+                <a:xfrm rot="21596460">
+                  <a:off x="3743260" y="2228200"/>
+                  <a:ext cx="582600" cy="123159"/>
+                </a:xfrm>
+                <a:prstGeom prst="rect">
+                  <a:avLst/>
+                </a:prstGeom>
+                <a:noFill/>
+                <a:ln>
+                  <a:noFill/>
+                </a:ln>
+              </p:spPr>
+              <p:txBody>
+                <a:bodyPr spcFirstLastPara="1" wrap="square" lIns="0" tIns="0" rIns="0" bIns="0" anchor="t" anchorCtr="0">
+                  <a:spAutoFit/>
+                </a:bodyPr>
+                <a:lstStyle/>
+                <a:p>
+                  <a:pPr algn="ctr"/>
+                  <a:r>
+                    <a:rPr lang="en" sz="1067">
+                      <a:solidFill>
+                        <a:srgbClr val="808080"/>
+                      </a:solidFill>
+                    </a:rPr>
+                    <a:t>Population</a:t>
+                  </a:r>
+                  <a:endParaRPr sz="1067">
+                    <a:solidFill>
+                      <a:srgbClr val="808080"/>
+                    </a:solidFill>
+                  </a:endParaRPr>
+                </a:p>
+              </p:txBody>
+            </p:sp>
+            <p:sp>
+              <p:nvSpPr>
+                <p:cNvPr id="121" name="Google Shape;121;p19"/>
+                <p:cNvSpPr txBox="1"/>
+                <p:nvPr/>
+              </p:nvSpPr>
+              <p:spPr>
+                <a:xfrm rot="21596460">
+                  <a:off x="4421602" y="2063498"/>
+                  <a:ext cx="582600" cy="123159"/>
+                </a:xfrm>
+                <a:prstGeom prst="rect">
+                  <a:avLst/>
+                </a:prstGeom>
+                <a:noFill/>
+                <a:ln>
+                  <a:noFill/>
+                </a:ln>
+              </p:spPr>
+              <p:txBody>
+                <a:bodyPr spcFirstLastPara="1" wrap="square" lIns="0" tIns="0" rIns="0" bIns="0" anchor="t" anchorCtr="0">
+                  <a:spAutoFit/>
+                </a:bodyPr>
+                <a:lstStyle/>
+                <a:p>
+                  <a:pPr algn="ctr"/>
+                  <a:r>
+                    <a:rPr lang="en" sz="1067">
+                      <a:solidFill>
+                        <a:srgbClr val="808080"/>
+                      </a:solidFill>
+                    </a:rPr>
+                    <a:t>Public</a:t>
+                  </a:r>
+                  <a:endParaRPr sz="1067">
+                    <a:solidFill>
+                      <a:srgbClr val="808080"/>
+                    </a:solidFill>
+                  </a:endParaRPr>
+                </a:p>
+              </p:txBody>
+            </p:sp>
+          </p:grpSp>
+        </p:grpSp>
+      </p:grpSp>
+      <p:sp>
+        <p:nvSpPr>
+          <p:cNvPr id="122" name="Google Shape;122;p19"/>
+          <p:cNvSpPr/>
+          <p:nvPr/>
+        </p:nvSpPr>
+        <p:spPr>
+          <a:xfrm>
+            <a:off x="3248264" y="3524765"/>
+            <a:ext cx="122000" cy="122000"/>
+          </a:xfrm>
+          <a:prstGeom prst="triangle">
+            <a:avLst>
+              <a:gd name="adj" fmla="val 50000"/>
+            </a:avLst>
+          </a:prstGeom>
+          <a:solidFill>
+            <a:schemeClr val="dk2"/>
+          </a:solidFill>
+          <a:ln w="19050" cap="flat" cmpd="sng">
+            <a:solidFill>
+              <a:schemeClr val="lt1"/>
+            </a:solidFill>
+            <a:prstDash val="solid"/>
+            <a:round/>
+            <a:headEnd type="none" w="sm" len="sm"/>
+            <a:tailEnd type="none" w="sm" len="sm"/>
+          </a:ln>
+        </p:spPr>
+        <p:txBody>
+          <a:bodyPr spcFirstLastPara="1" wrap="square" lIns="112000" tIns="112000" rIns="112000" bIns="112000" anchor="ctr" anchorCtr="0">
+            <a:noAutofit/>
+          </a:bodyPr>
+          <a:lstStyle/>
+          <a:p>
+            <a:pPr algn="ctr"/>
+            <a:endParaRPr sz="1716"/>
+          </a:p>
+        </p:txBody>
+      </p:sp>
+      <p:grpSp>
+        <p:nvGrpSpPr>
+          <p:cNvPr id="123" name="Google Shape;123;p19"/>
+          <p:cNvGrpSpPr/>
+          <p:nvPr/>
+        </p:nvGrpSpPr>
+        <p:grpSpPr>
+          <a:xfrm>
+            <a:off x="2859076" y="258701"/>
+            <a:ext cx="6606997" cy="6866960"/>
+            <a:chOff x="2150656" y="194026"/>
+            <a:chExt cx="4955248" cy="5150220"/>
+          </a:xfrm>
+        </p:grpSpPr>
+        <p:pic>
+          <p:nvPicPr>
+            <p:cNvPr id="124" name="Google Shape;124;p19"/>
+            <p:cNvPicPr preferRelativeResize="0"/>
+            <p:nvPr/>
+          </p:nvPicPr>
+          <p:blipFill>
+            <a:blip r:embed="rId7">
+              <a:alphaModFix/>
+            </a:blip>
+            <a:stretch>
+              <a:fillRect/>
+            </a:stretch>
+          </p:blipFill>
           <p:spPr>
-            <a:xfrm rot="21596460">
-              <a:off x="4003728" y="3244542"/>
-              <a:ext cx="582600" cy="123159"/>
+            <a:xfrm rot="6693886">
+              <a:off x="3515175" y="935148"/>
+              <a:ext cx="2527642" cy="2527642"/>
             </a:xfrm>
             <a:prstGeom prst="rect">
               <a:avLst/>
@@ -16042,39 +17179,25 @@
               <a:noFill/>
             </a:ln>
           </p:spPr>
-          <p:txBody>
-            <a:bodyPr spcFirstLastPara="1" wrap="square" lIns="0" tIns="0" rIns="0" bIns="0" anchor="t" anchorCtr="0">
-              <a:spAutoFit/>
-            </a:bodyPr>
-            <a:lstStyle/>
-            <a:p>
-              <a:pPr algn="ctr"/>
-              <a:r>
-                <a:rPr lang="en" sz="1067">
-                  <a:solidFill>
-                    <a:srgbClr val="808080"/>
-                  </a:solidFill>
-                </a:rPr>
-                <a:t>Patient</a:t>
-              </a:r>
-              <a:endParaRPr sz="1067">
-                <a:solidFill>
-                  <a:srgbClr val="808080"/>
-                </a:solidFill>
-              </a:endParaRPr>
-            </a:p>
-          </p:txBody>
-        </p:sp>
-        <p:sp>
-          <p:nvSpPr>
-            <p:cNvPr id="123" name="Google Shape;123;p19"/>
-            <p:cNvSpPr txBox="1"/>
+        </p:pic>
+        <p:pic>
+          <p:nvPicPr>
+            <p:cNvPr id="125" name="Google Shape;125;p19"/>
+            <p:cNvPicPr preferRelativeResize="0"/>
             <p:nvPr/>
-          </p:nvSpPr>
+          </p:nvPicPr>
+          <p:blipFill>
+            <a:blip r:embed="rId8">
+              <a:alphaModFix/>
+            </a:blip>
+            <a:stretch>
+              <a:fillRect/>
+            </a:stretch>
+          </p:blipFill>
           <p:spPr>
-            <a:xfrm rot="21596460">
-              <a:off x="4586328" y="3060357"/>
-              <a:ext cx="582600" cy="123159"/>
+            <a:xfrm rot="1769116">
+              <a:off x="2669604" y="931599"/>
+              <a:ext cx="2861725" cy="2861725"/>
             </a:xfrm>
             <a:prstGeom prst="rect">
               <a:avLst/>
@@ -16084,39 +17207,25 @@
               <a:noFill/>
             </a:ln>
           </p:spPr>
-          <p:txBody>
-            <a:bodyPr spcFirstLastPara="1" wrap="square" lIns="0" tIns="0" rIns="0" bIns="0" anchor="t" anchorCtr="0">
-              <a:spAutoFit/>
-            </a:bodyPr>
-            <a:lstStyle/>
-            <a:p>
-              <a:pPr algn="ctr"/>
-              <a:r>
-                <a:rPr lang="en" sz="1067">
-                  <a:solidFill>
-                    <a:srgbClr val="808080"/>
-                  </a:solidFill>
-                </a:rPr>
-                <a:t>Provider</a:t>
-              </a:r>
-              <a:endParaRPr sz="1067">
-                <a:solidFill>
-                  <a:srgbClr val="808080"/>
-                </a:solidFill>
-              </a:endParaRPr>
-            </a:p>
-          </p:txBody>
-        </p:sp>
-        <p:sp>
-          <p:nvSpPr>
-            <p:cNvPr id="124" name="Google Shape;124;p19"/>
-            <p:cNvSpPr txBox="1"/>
+        </p:pic>
+        <p:pic>
+          <p:nvPicPr>
+            <p:cNvPr id="126" name="Google Shape;126;p19"/>
+            <p:cNvPicPr preferRelativeResize="0"/>
             <p:nvPr/>
-          </p:nvSpPr>
+          </p:nvPicPr>
+          <p:blipFill>
+            <a:blip r:embed="rId9">
+              <a:alphaModFix/>
+            </a:blip>
+            <a:stretch>
+              <a:fillRect/>
+            </a:stretch>
+          </p:blipFill>
           <p:spPr>
-            <a:xfrm rot="21596460">
-              <a:off x="3743260" y="2228200"/>
-              <a:ext cx="582600" cy="123159"/>
+            <a:xfrm rot="-2029044">
+              <a:off x="2979983" y="2487465"/>
+              <a:ext cx="3624800" cy="2018875"/>
             </a:xfrm>
             <a:prstGeom prst="rect">
               <a:avLst/>
@@ -16126,39 +17235,25 @@
               <a:noFill/>
             </a:ln>
           </p:spPr>
-          <p:txBody>
-            <a:bodyPr spcFirstLastPara="1" wrap="square" lIns="0" tIns="0" rIns="0" bIns="0" anchor="t" anchorCtr="0">
-              <a:spAutoFit/>
-            </a:bodyPr>
-            <a:lstStyle/>
-            <a:p>
-              <a:pPr algn="ctr"/>
-              <a:r>
-                <a:rPr lang="en" sz="1067">
-                  <a:solidFill>
-                    <a:srgbClr val="808080"/>
-                  </a:solidFill>
-                </a:rPr>
-                <a:t>Population</a:t>
-              </a:r>
-              <a:endParaRPr sz="1067">
-                <a:solidFill>
-                  <a:srgbClr val="808080"/>
-                </a:solidFill>
-              </a:endParaRPr>
-            </a:p>
-          </p:txBody>
-        </p:sp>
-        <p:sp>
-          <p:nvSpPr>
-            <p:cNvPr id="125" name="Google Shape;125;p19"/>
-            <p:cNvSpPr txBox="1"/>
+        </p:pic>
+        <p:pic>
+          <p:nvPicPr>
+            <p:cNvPr id="127" name="Google Shape;127;p19"/>
+            <p:cNvPicPr preferRelativeResize="0"/>
             <p:nvPr/>
-          </p:nvSpPr>
+          </p:nvPicPr>
+          <p:blipFill>
+            <a:blip r:embed="rId4">
+              <a:alphaModFix/>
+            </a:blip>
+            <a:stretch>
+              <a:fillRect/>
+            </a:stretch>
+          </p:blipFill>
           <p:spPr>
-            <a:xfrm rot="21596460">
-              <a:off x="4421602" y="2063498"/>
-              <a:ext cx="582600" cy="123159"/>
+            <a:xfrm rot="-7729510">
+              <a:off x="3284156" y="1253443"/>
+              <a:ext cx="3708895" cy="2065714"/>
             </a:xfrm>
             <a:prstGeom prst="rect">
               <a:avLst/>
@@ -16168,68 +17263,41 @@
               <a:noFill/>
             </a:ln>
           </p:spPr>
-          <p:txBody>
-            <a:bodyPr spcFirstLastPara="1" wrap="square" lIns="0" tIns="0" rIns="0" bIns="0" anchor="t" anchorCtr="0">
-              <a:spAutoFit/>
-            </a:bodyPr>
-            <a:lstStyle/>
-            <a:p>
-              <a:pPr algn="ctr"/>
-              <a:r>
-                <a:rPr lang="en" sz="1067">
-                  <a:solidFill>
-                    <a:srgbClr val="808080"/>
-                  </a:solidFill>
-                </a:rPr>
-                <a:t>Public</a:t>
-              </a:r>
-              <a:endParaRPr sz="1067">
-                <a:solidFill>
-                  <a:srgbClr val="808080"/>
-                </a:solidFill>
-              </a:endParaRPr>
-            </a:p>
-          </p:txBody>
-        </p:sp>
+        </p:pic>
       </p:grpSp>
       <p:sp>
         <p:nvSpPr>
-          <p:cNvPr id="126" name="Google Shape;126;p19"/>
-          <p:cNvSpPr txBox="1"/>
-          <p:nvPr/>
-        </p:nvSpPr>
-        <p:spPr>
-          <a:xfrm>
-            <a:off x="176100" y="6095267"/>
-            <a:ext cx="1655200" cy="615513"/>
+          <p:cNvPr id="128" name="Google Shape;128;p19"/>
+          <p:cNvSpPr/>
+          <p:nvPr/>
+        </p:nvSpPr>
+        <p:spPr>
+          <a:xfrm>
+            <a:off x="2725417" y="436533"/>
+            <a:ext cx="6340000" cy="6340000"/>
           </a:xfrm>
           <a:prstGeom prst="rect">
             <a:avLst/>
           </a:prstGeom>
           <a:noFill/>
-          <a:ln>
-            <a:noFill/>
+          <a:ln w="9900" cap="flat" cmpd="sng">
+            <a:solidFill>
+              <a:schemeClr val="dk2"/>
+            </a:solidFill>
+            <a:prstDash val="solid"/>
+            <a:round/>
+            <a:headEnd type="none" w="sm" len="sm"/>
+            <a:tailEnd type="none" w="sm" len="sm"/>
           </a:ln>
         </p:spPr>
         <p:txBody>
-          <a:bodyPr spcFirstLastPara="1" wrap="square" lIns="121900" tIns="121900" rIns="121900" bIns="121900" anchor="t" anchorCtr="0">
-            <a:spAutoFit/>
+          <a:bodyPr spcFirstLastPara="1" wrap="square" lIns="127267" tIns="127267" rIns="127267" bIns="127267" anchor="ctr" anchorCtr="0">
+            <a:noAutofit/>
           </a:bodyPr>
           <a:lstStyle/>
           <a:p>
-            <a:r>
-              <a:rPr lang="en" sz="2400">
-                <a:solidFill>
-                  <a:schemeClr val="dk2"/>
-                </a:solidFill>
-              </a:rPr>
-              <a:t>Editable</a:t>
-            </a:r>
-            <a:endParaRPr sz="2400">
-              <a:solidFill>
-                <a:schemeClr val="dk2"/>
-              </a:solidFill>
-            </a:endParaRPr>
+            <a:pPr algn="ctr"/>
+            <a:endParaRPr sz="1948"/>
           </a:p>
         </p:txBody>
       </p:sp>

</xml_diff>